<commit_message>
added files for tidy class exercise
</commit_message>
<xml_diff>
--- a/lectures/00-Introduction.pptx
+++ b/lectures/00-Introduction.pptx
@@ -5,7 +5,7 @@
     <p:sldMasterId id="2147483840" r:id="rId1"/>
   </p:sldMasterIdLst>
   <p:notesMasterIdLst>
-    <p:notesMasterId r:id="rId17"/>
+    <p:notesMasterId r:id="rId19"/>
   </p:notesMasterIdLst>
   <p:sldIdLst>
     <p:sldId id="256" r:id="rId2"/>
@@ -23,6 +23,8 @@
     <p:sldId id="271" r:id="rId14"/>
     <p:sldId id="272" r:id="rId15"/>
     <p:sldId id="273" r:id="rId16"/>
+    <p:sldId id="274" r:id="rId17"/>
+    <p:sldId id="275" r:id="rId18"/>
   </p:sldIdLst>
   <p:sldSz cx="12192000" cy="6858000"/>
   <p:notesSz cx="6858000" cy="9144000"/>
@@ -124,17 +126,17 @@
   <p:extLst>
     <p:ext uri="{EFAFB233-063F-42B5-8137-9DF3F51BA10A}">
       <p15:sldGuideLst xmlns:p15="http://schemas.microsoft.com/office/powerpoint/2012/main">
-        <p15:guide id="1" orient="horz" pos="2364" userDrawn="1">
+        <p15:guide id="1" orient="horz" pos="4058" userDrawn="1">
           <p15:clr>
             <a:srgbClr val="A4A3A4"/>
           </p15:clr>
         </p15:guide>
-        <p15:guide id="2" pos="4679" userDrawn="1">
+        <p15:guide id="2" pos="5995" userDrawn="1">
           <p15:clr>
             <a:srgbClr val="A4A3A4"/>
           </p15:clr>
         </p15:guide>
-        <p15:guide id="3" orient="horz" pos="3725" userDrawn="1">
+        <p15:guide id="3" orient="horz" pos="2999" userDrawn="1">
           <p15:clr>
             <a:srgbClr val="A4A3A4"/>
           </p15:clr>
@@ -9216,7 +9218,7 @@
           <a:p>
             <a:r>
               <a:rPr lang="en-US" dirty="0"/>
-              <a:t>Quiz – is this “tidy”?</a:t>
+              <a:t>Quiz – which is “tidy”?</a:t>
             </a:r>
             <a:endParaRPr lang="en-IL" dirty="0"/>
           </a:p>
@@ -9243,7 +9245,60 @@
           <a:bodyPr/>
           <a:lstStyle/>
           <a:p>
-            <a:endParaRPr lang="en-IL"/>
+            <a:r>
+              <a:rPr lang="en-US" dirty="0"/>
+              <a:t>Which of the following files are tidy? which are un-tidy? Explain.</a:t>
+            </a:r>
+          </a:p>
+          <a:p>
+            <a:r>
+              <a:rPr lang="en-US" dirty="0"/>
+              <a:t>The central Bureau of Statistics </a:t>
+            </a:r>
+          </a:p>
+          <a:p>
+            <a:pPr lvl="1"/>
+            <a:r>
+              <a:rPr lang="en-US" dirty="0"/>
+              <a:t>Population by group, religion, gender and age (/00-Introduction/st02_03.xls)</a:t>
+            </a:r>
+          </a:p>
+          <a:p>
+            <a:r>
+              <a:rPr lang="en-US" dirty="0"/>
+              <a:t>Ministry of Health </a:t>
+            </a:r>
+          </a:p>
+          <a:p>
+            <a:pPr lvl="1"/>
+            <a:r>
+              <a:rPr lang="en-US" dirty="0"/>
+              <a:t>Weekly Epidemiological report (/00-Introduction/IWER34_2019.xlsx)</a:t>
+            </a:r>
+          </a:p>
+          <a:p>
+            <a:r>
+              <a:rPr lang="en-US" dirty="0"/>
+              <a:t>Lego brick data (</a:t>
+            </a:r>
+            <a:r>
+              <a:rPr lang="en-US" dirty="0">
+                <a:hlinkClick r:id="rId2"/>
+              </a:rPr>
+              <a:t>rebrickable.com</a:t>
+            </a:r>
+            <a:r>
+              <a:rPr lang="en-US" dirty="0"/>
+              <a:t>)</a:t>
+            </a:r>
+          </a:p>
+          <a:p>
+            <a:pPr lvl="1"/>
+            <a:r>
+              <a:rPr lang="en-US" dirty="0"/>
+              <a:t>Lego parts (/00-Introduction/Lego_parts.csv)</a:t>
+            </a:r>
+            <a:endParaRPr lang="en-IL" dirty="0"/>
           </a:p>
         </p:txBody>
       </p:sp>
@@ -9263,7 +9318,12 @@
             <p:ph type="ftr" sz="quarter" idx="11"/>
           </p:nvPr>
         </p:nvSpPr>
-        <p:spPr/>
+        <p:spPr>
+          <a:xfrm>
+            <a:off x="1088136" y="6272784"/>
+            <a:ext cx="6327648" cy="365125"/>
+          </a:xfrm>
+        </p:spPr>
         <p:txBody>
           <a:bodyPr/>
           <a:lstStyle/>
@@ -9305,10 +9365,583 @@
           </a:p>
         </p:txBody>
       </p:sp>
+      <p:pic>
+        <p:nvPicPr>
+          <p:cNvPr id="7" name="Picture 6" descr="A close up of text on a black surface&#10;&#10;Description automatically generated">
+            <a:extLst>
+              <a:ext uri="{FF2B5EF4-FFF2-40B4-BE49-F238E27FC236}">
+                <a16:creationId xmlns:a16="http://schemas.microsoft.com/office/drawing/2014/main" id="{AF5FC1F0-3E2F-40ED-A54B-7E873A0D6098}"/>
+              </a:ext>
+            </a:extLst>
+          </p:cNvPr>
+          <p:cNvPicPr>
+            <a:picLocks noChangeAspect="1"/>
+          </p:cNvPicPr>
+          <p:nvPr/>
+        </p:nvPicPr>
+        <p:blipFill>
+          <a:blip r:embed="rId3"/>
+          <a:stretch>
+            <a:fillRect/>
+          </a:stretch>
+        </p:blipFill>
+        <p:spPr>
+          <a:xfrm>
+            <a:off x="9346438" y="4580509"/>
+            <a:ext cx="2057400" cy="2057400"/>
+          </a:xfrm>
+          <a:prstGeom prst="rect">
+            <a:avLst/>
+          </a:prstGeom>
+        </p:spPr>
+      </p:pic>
+      <p:sp>
+        <p:nvSpPr>
+          <p:cNvPr id="8" name="Action Button: Help 7">
+            <a:hlinkClick r:id="rId4" highlightClick="1"/>
+            <a:extLst>
+              <a:ext uri="{FF2B5EF4-FFF2-40B4-BE49-F238E27FC236}">
+                <a16:creationId xmlns:a16="http://schemas.microsoft.com/office/drawing/2014/main" id="{16E4738E-93EC-4DD7-B4CA-6CF5BBC314F0}"/>
+              </a:ext>
+            </a:extLst>
+          </p:cNvPr>
+          <p:cNvSpPr/>
+          <p:nvPr/>
+        </p:nvSpPr>
+        <p:spPr>
+          <a:xfrm>
+            <a:off x="11467465" y="5426646"/>
+            <a:ext cx="429768" cy="365125"/>
+          </a:xfrm>
+          <a:prstGeom prst="actionButtonHelp">
+            <a:avLst/>
+          </a:prstGeom>
+        </p:spPr>
+        <p:style>
+          <a:lnRef idx="2">
+            <a:schemeClr val="accent3">
+              <a:shade val="50000"/>
+            </a:schemeClr>
+          </a:lnRef>
+          <a:fillRef idx="1">
+            <a:schemeClr val="accent3"/>
+          </a:fillRef>
+          <a:effectRef idx="0">
+            <a:schemeClr val="accent3"/>
+          </a:effectRef>
+          <a:fontRef idx="minor">
+            <a:schemeClr val="lt1"/>
+          </a:fontRef>
+        </p:style>
+        <p:txBody>
+          <a:bodyPr rtlCol="0" anchor="ctr"/>
+          <a:lstStyle/>
+          <a:p>
+            <a:pPr algn="ctr"/>
+            <a:endParaRPr lang="en-IL"/>
+          </a:p>
+        </p:txBody>
+      </p:sp>
     </p:spTree>
     <p:extLst>
       <p:ext uri="{BB962C8B-B14F-4D97-AF65-F5344CB8AC3E}">
         <p14:creationId xmlns:p14="http://schemas.microsoft.com/office/powerpoint/2010/main" val="4065521403"/>
+      </p:ext>
+    </p:extLst>
+  </p:cSld>
+  <p:clrMapOvr>
+    <a:masterClrMapping/>
+  </p:clrMapOvr>
+</p:sld>
+</file>
+
+<file path=ppt/slides/slide16.xml><?xml version="1.0" encoding="utf-8"?>
+<p:sld xmlns:a="http://schemas.openxmlformats.org/drawingml/2006/main" xmlns:r="http://schemas.openxmlformats.org/officeDocument/2006/relationships" xmlns:p="http://schemas.openxmlformats.org/presentationml/2006/main">
+  <p:cSld>
+    <p:spTree>
+      <p:nvGrpSpPr>
+        <p:cNvPr id="1" name=""/>
+        <p:cNvGrpSpPr/>
+        <p:nvPr/>
+      </p:nvGrpSpPr>
+      <p:grpSpPr>
+        <a:xfrm>
+          <a:off x="0" y="0"/>
+          <a:ext cx="0" cy="0"/>
+          <a:chOff x="0" y="0"/>
+          <a:chExt cx="0" cy="0"/>
+        </a:xfrm>
+      </p:grpSpPr>
+      <p:sp>
+        <p:nvSpPr>
+          <p:cNvPr id="2" name="Title 1">
+            <a:extLst>
+              <a:ext uri="{FF2B5EF4-FFF2-40B4-BE49-F238E27FC236}">
+                <a16:creationId xmlns:a16="http://schemas.microsoft.com/office/drawing/2014/main" id="{747FE722-690F-4D21-8922-8A12E4C6256F}"/>
+              </a:ext>
+            </a:extLst>
+          </p:cNvPr>
+          <p:cNvSpPr>
+            <a:spLocks noGrp="1"/>
+          </p:cNvSpPr>
+          <p:nvPr>
+            <p:ph type="title"/>
+          </p:nvPr>
+        </p:nvSpPr>
+        <p:spPr/>
+        <p:txBody>
+          <a:bodyPr/>
+          <a:lstStyle/>
+          <a:p>
+            <a:r>
+              <a:rPr lang="en-US" dirty="0"/>
+              <a:t>Common Notations</a:t>
+            </a:r>
+            <a:endParaRPr lang="en-IL" dirty="0"/>
+          </a:p>
+        </p:txBody>
+      </p:sp>
+      <mc:AlternateContent xmlns:mc="http://schemas.openxmlformats.org/markup-compatibility/2006">
+        <mc:Choice xmlns:a14="http://schemas.microsoft.com/office/drawing/2010/main" Requires="a14">
+          <p:sp>
+            <p:nvSpPr>
+              <p:cNvPr id="3" name="Content Placeholder 2">
+                <a:extLst>
+                  <a:ext uri="{FF2B5EF4-FFF2-40B4-BE49-F238E27FC236}">
+                    <a16:creationId xmlns:a16="http://schemas.microsoft.com/office/drawing/2014/main" id="{CBA66C74-C282-42FC-AB10-34185CB58754}"/>
+                  </a:ext>
+                </a:extLst>
+              </p:cNvPr>
+              <p:cNvSpPr>
+                <a:spLocks noGrp="1"/>
+              </p:cNvSpPr>
+              <p:nvPr>
+                <p:ph idx="1"/>
+              </p:nvPr>
+            </p:nvSpPr>
+            <p:spPr/>
+            <p:txBody>
+              <a:bodyPr/>
+              <a:lstStyle/>
+              <a:p>
+                <a:r>
+                  <a:rPr lang="en-US" dirty="0"/>
+                  <a:t>The data matrix will usually be noted as </a:t>
+                </a:r>
+                <a14:m>
+                  <m:oMath xmlns:m="http://schemas.openxmlformats.org/officeDocument/2006/math">
+                    <m:r>
+                      <a:rPr lang="en-US" b="0" i="1" smtClean="0">
+                        <a:latin typeface="Cambria Math" panose="02040503050406030204" pitchFamily="18" charset="0"/>
+                      </a:rPr>
+                      <m:t>𝑋</m:t>
+                    </m:r>
+                  </m:oMath>
+                </a14:m>
+                <a:endParaRPr lang="en-US" dirty="0"/>
+              </a:p>
+              <a:p>
+                <a:r>
+                  <a:rPr lang="en-US" dirty="0"/>
+                  <a:t>The number of observations (rows) will be noted as </a:t>
+                </a:r>
+                <a14:m>
+                  <m:oMath xmlns:m="http://schemas.openxmlformats.org/officeDocument/2006/math">
+                    <m:r>
+                      <a:rPr lang="en-US" b="0" i="1" smtClean="0">
+                        <a:latin typeface="Cambria Math" panose="02040503050406030204" pitchFamily="18" charset="0"/>
+                      </a:rPr>
+                      <m:t>𝑛</m:t>
+                    </m:r>
+                  </m:oMath>
+                </a14:m>
+                <a:endParaRPr lang="en-US" dirty="0"/>
+              </a:p>
+              <a:p>
+                <a:r>
+                  <a:rPr lang="en-US" dirty="0"/>
+                  <a:t>The number of features (columns) will be noted as </a:t>
+                </a:r>
+                <a14:m>
+                  <m:oMath xmlns:m="http://schemas.openxmlformats.org/officeDocument/2006/math">
+                    <m:r>
+                      <a:rPr lang="en-US" b="0" i="1" smtClean="0">
+                        <a:latin typeface="Cambria Math" panose="02040503050406030204" pitchFamily="18" charset="0"/>
+                      </a:rPr>
+                      <m:t>𝑝</m:t>
+                    </m:r>
+                  </m:oMath>
+                </a14:m>
+                <a:endParaRPr lang="en-US" dirty="0"/>
+              </a:p>
+              <a:p>
+                <a:pPr lvl="1"/>
+                <a:r>
+                  <a:rPr lang="en-US" dirty="0"/>
+                  <a:t>Sometimes called variables</a:t>
+                </a:r>
+              </a:p>
+            </p:txBody>
+          </p:sp>
+        </mc:Choice>
+        <mc:Fallback>
+          <p:sp>
+            <p:nvSpPr>
+              <p:cNvPr id="3" name="Content Placeholder 2">
+                <a:extLst>
+                  <a:ext uri="{FF2B5EF4-FFF2-40B4-BE49-F238E27FC236}">
+                    <a16:creationId xmlns:a16="http://schemas.microsoft.com/office/drawing/2014/main" id="{CBA66C74-C282-42FC-AB10-34185CB58754}"/>
+                  </a:ext>
+                </a:extLst>
+              </p:cNvPr>
+              <p:cNvSpPr>
+                <a:spLocks noGrp="1" noRot="1" noChangeAspect="1" noMove="1" noResize="1" noEditPoints="1" noAdjustHandles="1" noChangeArrowheads="1" noChangeShapeType="1" noTextEdit="1"/>
+              </p:cNvSpPr>
+              <p:nvPr>
+                <p:ph idx="1"/>
+              </p:nvPr>
+            </p:nvSpPr>
+            <p:spPr>
+              <a:blipFill>
+                <a:blip r:embed="rId2"/>
+                <a:stretch>
+                  <a:fillRect l="-303" t="-1504"/>
+                </a:stretch>
+              </a:blipFill>
+            </p:spPr>
+            <p:txBody>
+              <a:bodyPr/>
+              <a:lstStyle/>
+              <a:p>
+                <a:r>
+                  <a:rPr lang="en-IL">
+                    <a:noFill/>
+                  </a:rPr>
+                  <a:t> </a:t>
+                </a:r>
+              </a:p>
+            </p:txBody>
+          </p:sp>
+        </mc:Fallback>
+      </mc:AlternateContent>
+      <p:sp>
+        <p:nvSpPr>
+          <p:cNvPr id="4" name="Footer Placeholder 3">
+            <a:extLst>
+              <a:ext uri="{FF2B5EF4-FFF2-40B4-BE49-F238E27FC236}">
+                <a16:creationId xmlns:a16="http://schemas.microsoft.com/office/drawing/2014/main" id="{3A00E435-00D9-4F13-8D42-C34116F6DB8E}"/>
+              </a:ext>
+            </a:extLst>
+          </p:cNvPr>
+          <p:cNvSpPr>
+            <a:spLocks noGrp="1"/>
+          </p:cNvSpPr>
+          <p:nvPr>
+            <p:ph type="ftr" sz="quarter" idx="11"/>
+          </p:nvPr>
+        </p:nvSpPr>
+        <p:spPr/>
+        <p:txBody>
+          <a:bodyPr/>
+          <a:lstStyle/>
+          <a:p>
+            <a:r>
+              <a:rPr lang="en-US"/>
+              <a:t>Materials by Adi Sarid https://adisarid.github.io and http://www.sarid-ins.com</a:t>
+            </a:r>
+            <a:endParaRPr lang="en-US" dirty="0"/>
+          </a:p>
+        </p:txBody>
+      </p:sp>
+      <p:sp>
+        <p:nvSpPr>
+          <p:cNvPr id="5" name="Slide Number Placeholder 4">
+            <a:extLst>
+              <a:ext uri="{FF2B5EF4-FFF2-40B4-BE49-F238E27FC236}">
+                <a16:creationId xmlns:a16="http://schemas.microsoft.com/office/drawing/2014/main" id="{60FDED73-3784-4CFA-A05E-B27BC39BF27B}"/>
+              </a:ext>
+            </a:extLst>
+          </p:cNvPr>
+          <p:cNvSpPr>
+            <a:spLocks noGrp="1"/>
+          </p:cNvSpPr>
+          <p:nvPr>
+            <p:ph type="sldNum" sz="quarter" idx="12"/>
+          </p:nvPr>
+        </p:nvSpPr>
+        <p:spPr/>
+        <p:txBody>
+          <a:bodyPr/>
+          <a:lstStyle/>
+          <a:p>
+            <a:fld id="{4FAB73BC-B049-4115-A692-8D63A059BFB8}" type="slidenum">
+              <a:rPr lang="en-US" smtClean="0"/>
+              <a:t>16</a:t>
+            </a:fld>
+            <a:endParaRPr lang="en-US" dirty="0"/>
+          </a:p>
+        </p:txBody>
+      </p:sp>
+    </p:spTree>
+    <p:extLst>
+      <p:ext uri="{BB962C8B-B14F-4D97-AF65-F5344CB8AC3E}">
+        <p14:creationId xmlns:p14="http://schemas.microsoft.com/office/powerpoint/2010/main" val="2721444203"/>
+      </p:ext>
+    </p:extLst>
+  </p:cSld>
+  <p:clrMapOvr>
+    <a:masterClrMapping/>
+  </p:clrMapOvr>
+</p:sld>
+</file>
+
+<file path=ppt/slides/slide17.xml><?xml version="1.0" encoding="utf-8"?>
+<p:sld xmlns:a="http://schemas.openxmlformats.org/drawingml/2006/main" xmlns:r="http://schemas.openxmlformats.org/officeDocument/2006/relationships" xmlns:p="http://schemas.openxmlformats.org/presentationml/2006/main">
+  <p:cSld>
+    <p:spTree>
+      <p:nvGrpSpPr>
+        <p:cNvPr id="1" name=""/>
+        <p:cNvGrpSpPr/>
+        <p:nvPr/>
+      </p:nvGrpSpPr>
+      <p:grpSpPr>
+        <a:xfrm>
+          <a:off x="0" y="0"/>
+          <a:ext cx="0" cy="0"/>
+          <a:chOff x="0" y="0"/>
+          <a:chExt cx="0" cy="0"/>
+        </a:xfrm>
+      </p:grpSpPr>
+      <p:sp>
+        <p:nvSpPr>
+          <p:cNvPr id="2" name="Title 1">
+            <a:extLst>
+              <a:ext uri="{FF2B5EF4-FFF2-40B4-BE49-F238E27FC236}">
+                <a16:creationId xmlns:a16="http://schemas.microsoft.com/office/drawing/2014/main" id="{74AD1AE2-823E-461E-9088-BEC6D99A662B}"/>
+              </a:ext>
+            </a:extLst>
+          </p:cNvPr>
+          <p:cNvSpPr>
+            <a:spLocks noGrp="1"/>
+          </p:cNvSpPr>
+          <p:nvPr>
+            <p:ph type="title"/>
+          </p:nvPr>
+        </p:nvSpPr>
+        <p:spPr/>
+        <p:txBody>
+          <a:bodyPr/>
+          <a:lstStyle/>
+          <a:p>
+            <a:r>
+              <a:rPr lang="en-US" dirty="0"/>
+              <a:t>Types of Variables</a:t>
+            </a:r>
+            <a:endParaRPr lang="en-IL" dirty="0"/>
+          </a:p>
+        </p:txBody>
+      </p:sp>
+      <p:sp>
+        <p:nvSpPr>
+          <p:cNvPr id="3" name="Content Placeholder 2">
+            <a:extLst>
+              <a:ext uri="{FF2B5EF4-FFF2-40B4-BE49-F238E27FC236}">
+                <a16:creationId xmlns:a16="http://schemas.microsoft.com/office/drawing/2014/main" id="{D0807EB1-8ECA-4CAE-B7E2-B60913C14059}"/>
+              </a:ext>
+            </a:extLst>
+          </p:cNvPr>
+          <p:cNvSpPr>
+            <a:spLocks noGrp="1"/>
+          </p:cNvSpPr>
+          <p:nvPr>
+            <p:ph idx="1"/>
+          </p:nvPr>
+        </p:nvSpPr>
+        <p:spPr/>
+        <p:txBody>
+          <a:bodyPr/>
+          <a:lstStyle/>
+          <a:p>
+            <a:pPr marL="0" indent="0">
+              <a:buNone/>
+            </a:pPr>
+            <a:r>
+              <a:rPr lang="en-US" dirty="0"/>
+              <a:t>The common types of variables include:</a:t>
+            </a:r>
+          </a:p>
+          <a:p>
+            <a:r>
+              <a:rPr lang="en-US" dirty="0"/>
+              <a:t>Numeric (integer, double)</a:t>
+            </a:r>
+          </a:p>
+          <a:p>
+            <a:r>
+              <a:rPr lang="en-US" dirty="0"/>
+              <a:t>Factor (category, ordinal)</a:t>
+            </a:r>
+          </a:p>
+          <a:p>
+            <a:r>
+              <a:rPr lang="en-US" dirty="0"/>
+              <a:t>Date or datetime (2020-01-30; 2020-01-30 13:25:00)</a:t>
+            </a:r>
+          </a:p>
+          <a:p>
+            <a:r>
+              <a:rPr lang="en-US" dirty="0"/>
+              <a:t>Logical (True/False)</a:t>
+            </a:r>
+          </a:p>
+          <a:p>
+            <a:r>
+              <a:rPr lang="en-US" dirty="0"/>
+              <a:t>Character</a:t>
+            </a:r>
+            <a:endParaRPr lang="en-IL" dirty="0"/>
+          </a:p>
+        </p:txBody>
+      </p:sp>
+      <p:sp>
+        <p:nvSpPr>
+          <p:cNvPr id="4" name="Footer Placeholder 3">
+            <a:extLst>
+              <a:ext uri="{FF2B5EF4-FFF2-40B4-BE49-F238E27FC236}">
+                <a16:creationId xmlns:a16="http://schemas.microsoft.com/office/drawing/2014/main" id="{015AA0BC-EC15-4716-8E53-47C68FCB7A4A}"/>
+              </a:ext>
+            </a:extLst>
+          </p:cNvPr>
+          <p:cNvSpPr>
+            <a:spLocks noGrp="1"/>
+          </p:cNvSpPr>
+          <p:nvPr>
+            <p:ph type="ftr" sz="quarter" idx="11"/>
+          </p:nvPr>
+        </p:nvSpPr>
+        <p:spPr/>
+        <p:txBody>
+          <a:bodyPr/>
+          <a:lstStyle/>
+          <a:p>
+            <a:r>
+              <a:rPr lang="en-US"/>
+              <a:t>Materials by Adi Sarid https://adisarid.github.io and http://www.sarid-ins.com</a:t>
+            </a:r>
+            <a:endParaRPr lang="en-US" dirty="0"/>
+          </a:p>
+        </p:txBody>
+      </p:sp>
+      <p:sp>
+        <p:nvSpPr>
+          <p:cNvPr id="5" name="Slide Number Placeholder 4">
+            <a:extLst>
+              <a:ext uri="{FF2B5EF4-FFF2-40B4-BE49-F238E27FC236}">
+                <a16:creationId xmlns:a16="http://schemas.microsoft.com/office/drawing/2014/main" id="{FEB83A34-9BF4-4114-8A97-D6374EC53CF3}"/>
+              </a:ext>
+            </a:extLst>
+          </p:cNvPr>
+          <p:cNvSpPr>
+            <a:spLocks noGrp="1"/>
+          </p:cNvSpPr>
+          <p:nvPr>
+            <p:ph type="sldNum" sz="quarter" idx="12"/>
+          </p:nvPr>
+        </p:nvSpPr>
+        <p:spPr/>
+        <p:txBody>
+          <a:bodyPr/>
+          <a:lstStyle/>
+          <a:p>
+            <a:fld id="{4FAB73BC-B049-4115-A692-8D63A059BFB8}" type="slidenum">
+              <a:rPr lang="en-US" smtClean="0"/>
+              <a:t>17</a:t>
+            </a:fld>
+            <a:endParaRPr lang="en-US" dirty="0"/>
+          </a:p>
+        </p:txBody>
+      </p:sp>
+      <p:sp>
+        <p:nvSpPr>
+          <p:cNvPr id="6" name="Action Button: Help 5">
+            <a:hlinkClick r:id="rId2" highlightClick="1"/>
+            <a:extLst>
+              <a:ext uri="{FF2B5EF4-FFF2-40B4-BE49-F238E27FC236}">
+                <a16:creationId xmlns:a16="http://schemas.microsoft.com/office/drawing/2014/main" id="{7D22949D-16FB-4427-85D4-E0FFB321C3CD}"/>
+              </a:ext>
+            </a:extLst>
+          </p:cNvPr>
+          <p:cNvSpPr/>
+          <p:nvPr/>
+        </p:nvSpPr>
+        <p:spPr>
+          <a:xfrm>
+            <a:off x="11467465" y="5426646"/>
+            <a:ext cx="429768" cy="365125"/>
+          </a:xfrm>
+          <a:prstGeom prst="actionButtonHelp">
+            <a:avLst/>
+          </a:prstGeom>
+        </p:spPr>
+        <p:style>
+          <a:lnRef idx="2">
+            <a:schemeClr val="accent3">
+              <a:shade val="50000"/>
+            </a:schemeClr>
+          </a:lnRef>
+          <a:fillRef idx="1">
+            <a:schemeClr val="accent3"/>
+          </a:fillRef>
+          <a:effectRef idx="0">
+            <a:schemeClr val="accent3"/>
+          </a:effectRef>
+          <a:fontRef idx="minor">
+            <a:schemeClr val="lt1"/>
+          </a:fontRef>
+        </p:style>
+        <p:txBody>
+          <a:bodyPr rtlCol="0" anchor="ctr"/>
+          <a:lstStyle/>
+          <a:p>
+            <a:pPr algn="ctr"/>
+            <a:endParaRPr lang="en-IL"/>
+          </a:p>
+        </p:txBody>
+      </p:sp>
+      <p:pic>
+        <p:nvPicPr>
+          <p:cNvPr id="9" name="Picture 8" descr="A close up of text on a black background&#10;&#10;Description automatically generated">
+            <a:extLst>
+              <a:ext uri="{FF2B5EF4-FFF2-40B4-BE49-F238E27FC236}">
+                <a16:creationId xmlns:a16="http://schemas.microsoft.com/office/drawing/2014/main" id="{69F63BED-ECB0-4C22-8B5C-C9A17515EA75}"/>
+              </a:ext>
+            </a:extLst>
+          </p:cNvPr>
+          <p:cNvPicPr>
+            <a:picLocks noChangeAspect="1"/>
+          </p:cNvPicPr>
+          <p:nvPr/>
+        </p:nvPicPr>
+        <p:blipFill>
+          <a:blip r:embed="rId3"/>
+          <a:stretch>
+            <a:fillRect/>
+          </a:stretch>
+        </p:blipFill>
+        <p:spPr>
+          <a:xfrm>
+            <a:off x="9358503" y="4615815"/>
+            <a:ext cx="1983105" cy="1983105"/>
+          </a:xfrm>
+          <a:prstGeom prst="rect">
+            <a:avLst/>
+          </a:prstGeom>
+        </p:spPr>
+      </p:pic>
+    </p:spTree>
+    <p:extLst>
+      <p:ext uri="{BB962C8B-B14F-4D97-AF65-F5344CB8AC3E}">
+        <p14:creationId xmlns:p14="http://schemas.microsoft.com/office/powerpoint/2010/main" val="580401401"/>
       </p:ext>
     </p:extLst>
   </p:cSld>

</xml_diff>

<commit_message>
working on summary and vis :construction:
</commit_message>
<xml_diff>
--- a/lectures/00-Introduction.pptx
+++ b/lectures/00-Introduction.pptx
@@ -5,7 +5,7 @@
     <p:sldMasterId id="2147483840" r:id="rId1"/>
   </p:sldMasterIdLst>
   <p:notesMasterIdLst>
-    <p:notesMasterId r:id="rId19"/>
+    <p:notesMasterId r:id="rId21"/>
   </p:notesMasterIdLst>
   <p:sldIdLst>
     <p:sldId id="256" r:id="rId2"/>
@@ -20,11 +20,13 @@
     <p:sldId id="270" r:id="rId11"/>
     <p:sldId id="266" r:id="rId12"/>
     <p:sldId id="267" r:id="rId13"/>
-    <p:sldId id="271" r:id="rId14"/>
+    <p:sldId id="278" r:id="rId14"/>
     <p:sldId id="272" r:id="rId15"/>
     <p:sldId id="273" r:id="rId16"/>
     <p:sldId id="274" r:id="rId17"/>
     <p:sldId id="275" r:id="rId18"/>
+    <p:sldId id="277" r:id="rId19"/>
+    <p:sldId id="276" r:id="rId20"/>
   </p:sldIdLst>
   <p:sldSz cx="12192000" cy="6858000"/>
   <p:notesSz cx="6858000" cy="9144000"/>
@@ -136,7 +138,7 @@
             <a:srgbClr val="A4A3A4"/>
           </p15:clr>
         </p15:guide>
-        <p15:guide id="3" orient="horz" pos="2999" userDrawn="1">
+        <p15:guide id="3" orient="horz" pos="3022" userDrawn="1">
           <p15:clr>
             <a:srgbClr val="A4A3A4"/>
           </p15:clr>
@@ -7555,16 +7557,14 @@
           </a:prstGeom>
         </p:spPr>
         <p:style>
-          <a:lnRef idx="2">
-            <a:schemeClr val="accent4">
-              <a:shade val="50000"/>
-            </a:schemeClr>
+          <a:lnRef idx="3">
+            <a:schemeClr val="lt1"/>
           </a:lnRef>
           <a:fillRef idx="1">
-            <a:schemeClr val="accent4"/>
+            <a:schemeClr val="accent1"/>
           </a:fillRef>
-          <a:effectRef idx="0">
-            <a:schemeClr val="accent4"/>
+          <a:effectRef idx="1">
+            <a:schemeClr val="accent1"/>
           </a:effectRef>
           <a:fontRef idx="minor">
             <a:schemeClr val="lt1"/>
@@ -7605,16 +7605,14 @@
           </a:prstGeom>
         </p:spPr>
         <p:style>
-          <a:lnRef idx="2">
-            <a:schemeClr val="accent3">
-              <a:shade val="50000"/>
-            </a:schemeClr>
+          <a:lnRef idx="3">
+            <a:schemeClr val="lt1"/>
           </a:lnRef>
           <a:fillRef idx="1">
-            <a:schemeClr val="accent3"/>
+            <a:schemeClr val="accent1"/>
           </a:fillRef>
-          <a:effectRef idx="0">
-            <a:schemeClr val="accent3"/>
+          <a:effectRef idx="1">
+            <a:schemeClr val="accent1"/>
           </a:effectRef>
           <a:fontRef idx="minor">
             <a:schemeClr val="lt1"/>
@@ -7827,7 +7825,7 @@
             <a:pPr algn="ctr"/>
             <a:r>
               <a:rPr lang="en-US" dirty="0"/>
-              <a:t>Numeric</a:t>
+              <a:t>Numeric (Integer, Double)</a:t>
             </a:r>
             <a:endParaRPr lang="en-IL" dirty="0"/>
           </a:p>
@@ -7905,16 +7903,14 @@
           </a:prstGeom>
         </p:spPr>
         <p:style>
-          <a:lnRef idx="2">
-            <a:schemeClr val="accent3">
-              <a:shade val="50000"/>
-            </a:schemeClr>
+          <a:lnRef idx="3">
+            <a:schemeClr val="lt1"/>
           </a:lnRef>
           <a:fillRef idx="1">
-            <a:schemeClr val="accent3"/>
+            <a:schemeClr val="accent1"/>
           </a:fillRef>
-          <a:effectRef idx="0">
-            <a:schemeClr val="accent3"/>
+          <a:effectRef idx="1">
+            <a:schemeClr val="accent1"/>
           </a:effectRef>
           <a:fontRef idx="minor">
             <a:schemeClr val="lt1"/>
@@ -8457,7 +8453,7 @@
     </p:spTree>
     <p:extLst>
       <p:ext uri="{BB962C8B-B14F-4D97-AF65-F5344CB8AC3E}">
-        <p14:creationId xmlns:p14="http://schemas.microsoft.com/office/powerpoint/2010/main" val="3886156383"/>
+        <p14:creationId xmlns:p14="http://schemas.microsoft.com/office/powerpoint/2010/main" val="1042401825"/>
       </p:ext>
     </p:extLst>
   </p:cSld>
@@ -9942,6 +9938,1205 @@
     <p:extLst>
       <p:ext uri="{BB962C8B-B14F-4D97-AF65-F5344CB8AC3E}">
         <p14:creationId xmlns:p14="http://schemas.microsoft.com/office/powerpoint/2010/main" val="580401401"/>
+      </p:ext>
+    </p:extLst>
+  </p:cSld>
+  <p:clrMapOvr>
+    <a:masterClrMapping/>
+  </p:clrMapOvr>
+</p:sld>
+</file>
+
+<file path=ppt/slides/slide18.xml><?xml version="1.0" encoding="utf-8"?>
+<p:sld xmlns:a="http://schemas.openxmlformats.org/drawingml/2006/main" xmlns:r="http://schemas.openxmlformats.org/officeDocument/2006/relationships" xmlns:p="http://schemas.openxmlformats.org/presentationml/2006/main">
+  <p:cSld>
+    <p:spTree>
+      <p:nvGrpSpPr>
+        <p:cNvPr id="1" name=""/>
+        <p:cNvGrpSpPr/>
+        <p:nvPr/>
+      </p:nvGrpSpPr>
+      <p:grpSpPr>
+        <a:xfrm>
+          <a:off x="0" y="0"/>
+          <a:ext cx="0" cy="0"/>
+          <a:chOff x="0" y="0"/>
+          <a:chExt cx="0" cy="0"/>
+        </a:xfrm>
+      </p:grpSpPr>
+      <p:sp>
+        <p:nvSpPr>
+          <p:cNvPr id="2" name="Title 1">
+            <a:extLst>
+              <a:ext uri="{FF2B5EF4-FFF2-40B4-BE49-F238E27FC236}">
+                <a16:creationId xmlns:a16="http://schemas.microsoft.com/office/drawing/2014/main" id="{017DFCFB-90CE-43A7-A3BD-029951D8DD47}"/>
+              </a:ext>
+            </a:extLst>
+          </p:cNvPr>
+          <p:cNvSpPr>
+            <a:spLocks noGrp="1"/>
+          </p:cNvSpPr>
+          <p:nvPr>
+            <p:ph type="title"/>
+          </p:nvPr>
+        </p:nvSpPr>
+        <p:spPr/>
+        <p:txBody>
+          <a:bodyPr/>
+          <a:lstStyle/>
+          <a:p>
+            <a:r>
+              <a:rPr lang="en-US" dirty="0"/>
+              <a:t>Contents for Today</a:t>
+            </a:r>
+            <a:endParaRPr lang="en-IL" dirty="0"/>
+          </a:p>
+        </p:txBody>
+      </p:sp>
+      <p:sp>
+        <p:nvSpPr>
+          <p:cNvPr id="4" name="Footer Placeholder 3">
+            <a:extLst>
+              <a:ext uri="{FF2B5EF4-FFF2-40B4-BE49-F238E27FC236}">
+                <a16:creationId xmlns:a16="http://schemas.microsoft.com/office/drawing/2014/main" id="{5BC5E7C8-8793-496A-8953-AA062970EFF5}"/>
+              </a:ext>
+            </a:extLst>
+          </p:cNvPr>
+          <p:cNvSpPr>
+            <a:spLocks noGrp="1"/>
+          </p:cNvSpPr>
+          <p:nvPr>
+            <p:ph type="ftr" sz="quarter" idx="11"/>
+          </p:nvPr>
+        </p:nvSpPr>
+        <p:spPr/>
+        <p:txBody>
+          <a:bodyPr/>
+          <a:lstStyle/>
+          <a:p>
+            <a:r>
+              <a:rPr lang="en-US"/>
+              <a:t>Materials by Adi Sarid https://adisarid.github.io and http://www.sarid-ins.com</a:t>
+            </a:r>
+            <a:endParaRPr lang="en-US" dirty="0"/>
+          </a:p>
+        </p:txBody>
+      </p:sp>
+      <p:sp>
+        <p:nvSpPr>
+          <p:cNvPr id="5" name="Slide Number Placeholder 4">
+            <a:extLst>
+              <a:ext uri="{FF2B5EF4-FFF2-40B4-BE49-F238E27FC236}">
+                <a16:creationId xmlns:a16="http://schemas.microsoft.com/office/drawing/2014/main" id="{C0FE4A99-DE2C-4DA1-BE5E-5E038D908D2E}"/>
+              </a:ext>
+            </a:extLst>
+          </p:cNvPr>
+          <p:cNvSpPr>
+            <a:spLocks noGrp="1"/>
+          </p:cNvSpPr>
+          <p:nvPr>
+            <p:ph type="sldNum" sz="quarter" idx="12"/>
+          </p:nvPr>
+        </p:nvSpPr>
+        <p:spPr/>
+        <p:txBody>
+          <a:bodyPr/>
+          <a:lstStyle/>
+          <a:p>
+            <a:fld id="{4FAB73BC-B049-4115-A692-8D63A059BFB8}" type="slidenum">
+              <a:rPr lang="en-US" smtClean="0"/>
+              <a:t>18</a:t>
+            </a:fld>
+            <a:endParaRPr lang="en-US" dirty="0"/>
+          </a:p>
+        </p:txBody>
+      </p:sp>
+      <p:sp>
+        <p:nvSpPr>
+          <p:cNvPr id="6" name="Rectangle: Rounded Corners 5">
+            <a:extLst>
+              <a:ext uri="{FF2B5EF4-FFF2-40B4-BE49-F238E27FC236}">
+                <a16:creationId xmlns:a16="http://schemas.microsoft.com/office/drawing/2014/main" id="{0788BB0A-9599-4291-8466-FB7B8264E6D5}"/>
+              </a:ext>
+            </a:extLst>
+          </p:cNvPr>
+          <p:cNvSpPr/>
+          <p:nvPr/>
+        </p:nvSpPr>
+        <p:spPr>
+          <a:xfrm>
+            <a:off x="4688840" y="3130550"/>
+            <a:ext cx="2143760" cy="777240"/>
+          </a:xfrm>
+          <a:prstGeom prst="roundRect">
+            <a:avLst/>
+          </a:prstGeom>
+        </p:spPr>
+        <p:style>
+          <a:lnRef idx="3">
+            <a:schemeClr val="lt1"/>
+          </a:lnRef>
+          <a:fillRef idx="1">
+            <a:schemeClr val="accent5"/>
+          </a:fillRef>
+          <a:effectRef idx="1">
+            <a:schemeClr val="accent5"/>
+          </a:effectRef>
+          <a:fontRef idx="minor">
+            <a:schemeClr val="lt1"/>
+          </a:fontRef>
+        </p:style>
+        <p:txBody>
+          <a:bodyPr rtlCol="0" anchor="ctr"/>
+          <a:lstStyle/>
+          <a:p>
+            <a:pPr algn="ctr"/>
+            <a:r>
+              <a:rPr lang="en-US" dirty="0"/>
+              <a:t>Data</a:t>
+            </a:r>
+            <a:endParaRPr lang="en-IL" dirty="0"/>
+          </a:p>
+        </p:txBody>
+      </p:sp>
+      <p:sp>
+        <p:nvSpPr>
+          <p:cNvPr id="7" name="Rectangle: Rounded Corners 6">
+            <a:extLst>
+              <a:ext uri="{FF2B5EF4-FFF2-40B4-BE49-F238E27FC236}">
+                <a16:creationId xmlns:a16="http://schemas.microsoft.com/office/drawing/2014/main" id="{8083DA9A-C622-47C1-BE75-77FC6EA58A1B}"/>
+              </a:ext>
+            </a:extLst>
+          </p:cNvPr>
+          <p:cNvSpPr/>
+          <p:nvPr/>
+        </p:nvSpPr>
+        <p:spPr>
+          <a:xfrm>
+            <a:off x="6431281" y="2093976"/>
+            <a:ext cx="2143760" cy="777240"/>
+          </a:xfrm>
+          <a:prstGeom prst="roundRect">
+            <a:avLst/>
+          </a:prstGeom>
+        </p:spPr>
+        <p:style>
+          <a:lnRef idx="3">
+            <a:schemeClr val="lt1"/>
+          </a:lnRef>
+          <a:fillRef idx="1">
+            <a:schemeClr val="accent5"/>
+          </a:fillRef>
+          <a:effectRef idx="1">
+            <a:schemeClr val="accent5"/>
+          </a:effectRef>
+          <a:fontRef idx="minor">
+            <a:schemeClr val="lt1"/>
+          </a:fontRef>
+        </p:style>
+        <p:txBody>
+          <a:bodyPr rtlCol="0" anchor="ctr"/>
+          <a:lstStyle/>
+          <a:p>
+            <a:pPr algn="ctr"/>
+            <a:r>
+              <a:rPr lang="en-US" dirty="0"/>
+              <a:t>The tidy philosophy</a:t>
+            </a:r>
+            <a:endParaRPr lang="en-IL" dirty="0"/>
+          </a:p>
+        </p:txBody>
+      </p:sp>
+      <p:sp>
+        <p:nvSpPr>
+          <p:cNvPr id="8" name="Rectangle: Rounded Corners 7">
+            <a:extLst>
+              <a:ext uri="{FF2B5EF4-FFF2-40B4-BE49-F238E27FC236}">
+                <a16:creationId xmlns:a16="http://schemas.microsoft.com/office/drawing/2014/main" id="{29601989-F448-4769-BB61-973B97FE1120}"/>
+              </a:ext>
+            </a:extLst>
+          </p:cNvPr>
+          <p:cNvSpPr/>
+          <p:nvPr/>
+        </p:nvSpPr>
+        <p:spPr>
+          <a:xfrm>
+            <a:off x="9167368" y="1563243"/>
+            <a:ext cx="2143760" cy="777240"/>
+          </a:xfrm>
+          <a:prstGeom prst="roundRect">
+            <a:avLst/>
+          </a:prstGeom>
+        </p:spPr>
+        <p:style>
+          <a:lnRef idx="3">
+            <a:schemeClr val="lt1"/>
+          </a:lnRef>
+          <a:fillRef idx="1">
+            <a:schemeClr val="accent5"/>
+          </a:fillRef>
+          <a:effectRef idx="1">
+            <a:schemeClr val="accent5"/>
+          </a:effectRef>
+          <a:fontRef idx="minor">
+            <a:schemeClr val="lt1"/>
+          </a:fontRef>
+        </p:style>
+        <p:txBody>
+          <a:bodyPr rtlCol="0" anchor="ctr"/>
+          <a:lstStyle/>
+          <a:p>
+            <a:pPr algn="ctr"/>
+            <a:r>
+              <a:rPr lang="en-US" dirty="0"/>
+              <a:t>Rows (observations)</a:t>
+            </a:r>
+            <a:endParaRPr lang="en-IL" dirty="0"/>
+          </a:p>
+        </p:txBody>
+      </p:sp>
+      <p:sp>
+        <p:nvSpPr>
+          <p:cNvPr id="9" name="Rectangle: Rounded Corners 8">
+            <a:extLst>
+              <a:ext uri="{FF2B5EF4-FFF2-40B4-BE49-F238E27FC236}">
+                <a16:creationId xmlns:a16="http://schemas.microsoft.com/office/drawing/2014/main" id="{7C74014E-828A-4077-A824-687F08241CC4}"/>
+              </a:ext>
+            </a:extLst>
+          </p:cNvPr>
+          <p:cNvSpPr/>
+          <p:nvPr/>
+        </p:nvSpPr>
+        <p:spPr>
+          <a:xfrm>
+            <a:off x="9167368" y="2651760"/>
+            <a:ext cx="2143760" cy="777240"/>
+          </a:xfrm>
+          <a:prstGeom prst="roundRect">
+            <a:avLst/>
+          </a:prstGeom>
+        </p:spPr>
+        <p:style>
+          <a:lnRef idx="3">
+            <a:schemeClr val="lt1"/>
+          </a:lnRef>
+          <a:fillRef idx="1">
+            <a:schemeClr val="accent5"/>
+          </a:fillRef>
+          <a:effectRef idx="1">
+            <a:schemeClr val="accent5"/>
+          </a:effectRef>
+          <a:fontRef idx="minor">
+            <a:schemeClr val="lt1"/>
+          </a:fontRef>
+        </p:style>
+        <p:txBody>
+          <a:bodyPr rtlCol="0" anchor="ctr"/>
+          <a:lstStyle/>
+          <a:p>
+            <a:pPr algn="ctr"/>
+            <a:r>
+              <a:rPr lang="en-US" dirty="0"/>
+              <a:t>Columns (variables)</a:t>
+            </a:r>
+            <a:endParaRPr lang="en-IL" dirty="0"/>
+          </a:p>
+        </p:txBody>
+      </p:sp>
+      <p:sp>
+        <p:nvSpPr>
+          <p:cNvPr id="10" name="Rectangle: Rounded Corners 9">
+            <a:extLst>
+              <a:ext uri="{FF2B5EF4-FFF2-40B4-BE49-F238E27FC236}">
+                <a16:creationId xmlns:a16="http://schemas.microsoft.com/office/drawing/2014/main" id="{4402F498-01E6-4296-B552-29183ADEF948}"/>
+              </a:ext>
+            </a:extLst>
+          </p:cNvPr>
+          <p:cNvSpPr/>
+          <p:nvPr/>
+        </p:nvSpPr>
+        <p:spPr>
+          <a:xfrm>
+            <a:off x="8547608" y="4104640"/>
+            <a:ext cx="2143760" cy="777240"/>
+          </a:xfrm>
+          <a:prstGeom prst="roundRect">
+            <a:avLst/>
+          </a:prstGeom>
+        </p:spPr>
+        <p:style>
+          <a:lnRef idx="3">
+            <a:schemeClr val="lt1"/>
+          </a:lnRef>
+          <a:fillRef idx="1">
+            <a:schemeClr val="accent5"/>
+          </a:fillRef>
+          <a:effectRef idx="1">
+            <a:schemeClr val="accent5"/>
+          </a:effectRef>
+          <a:fontRef idx="minor">
+            <a:schemeClr val="lt1"/>
+          </a:fontRef>
+        </p:style>
+        <p:txBody>
+          <a:bodyPr rtlCol="0" anchor="ctr"/>
+          <a:lstStyle/>
+          <a:p>
+            <a:pPr algn="ctr"/>
+            <a:r>
+              <a:rPr lang="en-US" dirty="0"/>
+              <a:t>Variable types</a:t>
+            </a:r>
+            <a:endParaRPr lang="en-IL" dirty="0"/>
+          </a:p>
+        </p:txBody>
+      </p:sp>
+      <p:sp>
+        <p:nvSpPr>
+          <p:cNvPr id="11" name="Rectangle: Rounded Corners 10">
+            <a:extLst>
+              <a:ext uri="{FF2B5EF4-FFF2-40B4-BE49-F238E27FC236}">
+                <a16:creationId xmlns:a16="http://schemas.microsoft.com/office/drawing/2014/main" id="{3DE5D964-9E79-4B62-8D7C-F8BE3A1F1544}"/>
+              </a:ext>
+            </a:extLst>
+          </p:cNvPr>
+          <p:cNvSpPr/>
+          <p:nvPr/>
+        </p:nvSpPr>
+        <p:spPr>
+          <a:xfrm>
+            <a:off x="7023608" y="5321810"/>
+            <a:ext cx="2143760" cy="777240"/>
+          </a:xfrm>
+          <a:prstGeom prst="roundRect">
+            <a:avLst/>
+          </a:prstGeom>
+        </p:spPr>
+        <p:style>
+          <a:lnRef idx="3">
+            <a:schemeClr val="lt1"/>
+          </a:lnRef>
+          <a:fillRef idx="1">
+            <a:schemeClr val="accent5"/>
+          </a:fillRef>
+          <a:effectRef idx="1">
+            <a:schemeClr val="accent5"/>
+          </a:effectRef>
+          <a:fontRef idx="minor">
+            <a:schemeClr val="lt1"/>
+          </a:fontRef>
+        </p:style>
+        <p:txBody>
+          <a:bodyPr rtlCol="0" anchor="ctr"/>
+          <a:lstStyle/>
+          <a:p>
+            <a:pPr algn="ctr"/>
+            <a:r>
+              <a:rPr lang="en-US" dirty="0"/>
+              <a:t>Numeric (Integer, Double)</a:t>
+            </a:r>
+            <a:endParaRPr lang="en-IL" dirty="0"/>
+          </a:p>
+        </p:txBody>
+      </p:sp>
+      <p:sp>
+        <p:nvSpPr>
+          <p:cNvPr id="12" name="Rectangle: Rounded Corners 11">
+            <a:extLst>
+              <a:ext uri="{FF2B5EF4-FFF2-40B4-BE49-F238E27FC236}">
+                <a16:creationId xmlns:a16="http://schemas.microsoft.com/office/drawing/2014/main" id="{0D43B608-E3E8-489D-BA50-BA522DA0E014}"/>
+              </a:ext>
+            </a:extLst>
+          </p:cNvPr>
+          <p:cNvSpPr/>
+          <p:nvPr/>
+        </p:nvSpPr>
+        <p:spPr>
+          <a:xfrm>
+            <a:off x="9619487" y="5321810"/>
+            <a:ext cx="2296159" cy="777240"/>
+          </a:xfrm>
+          <a:prstGeom prst="roundRect">
+            <a:avLst/>
+          </a:prstGeom>
+        </p:spPr>
+        <p:style>
+          <a:lnRef idx="3">
+            <a:schemeClr val="lt1"/>
+          </a:lnRef>
+          <a:fillRef idx="1">
+            <a:schemeClr val="accent5"/>
+          </a:fillRef>
+          <a:effectRef idx="1">
+            <a:schemeClr val="accent5"/>
+          </a:effectRef>
+          <a:fontRef idx="minor">
+            <a:schemeClr val="lt1"/>
+          </a:fontRef>
+        </p:style>
+        <p:txBody>
+          <a:bodyPr rtlCol="0" anchor="ctr"/>
+          <a:lstStyle/>
+          <a:p>
+            <a:pPr algn="ctr"/>
+            <a:r>
+              <a:rPr lang="en-US" dirty="0"/>
+              <a:t>Factor (categorial, ordinal)</a:t>
+            </a:r>
+            <a:endParaRPr lang="en-IL" dirty="0"/>
+          </a:p>
+        </p:txBody>
+      </p:sp>
+      <p:sp>
+        <p:nvSpPr>
+          <p:cNvPr id="13" name="Rectangle: Rounded Corners 12">
+            <a:extLst>
+              <a:ext uri="{FF2B5EF4-FFF2-40B4-BE49-F238E27FC236}">
+                <a16:creationId xmlns:a16="http://schemas.microsoft.com/office/drawing/2014/main" id="{48AE1A91-813F-419F-8999-1FF991883229}"/>
+              </a:ext>
+            </a:extLst>
+          </p:cNvPr>
+          <p:cNvSpPr/>
+          <p:nvPr/>
+        </p:nvSpPr>
+        <p:spPr>
+          <a:xfrm>
+            <a:off x="1393952" y="3712210"/>
+            <a:ext cx="2143760" cy="777240"/>
+          </a:xfrm>
+          <a:prstGeom prst="roundRect">
+            <a:avLst/>
+          </a:prstGeom>
+        </p:spPr>
+        <p:style>
+          <a:lnRef idx="3">
+            <a:schemeClr val="lt1"/>
+          </a:lnRef>
+          <a:fillRef idx="1">
+            <a:schemeClr val="accent1"/>
+          </a:fillRef>
+          <a:effectRef idx="1">
+            <a:schemeClr val="accent1"/>
+          </a:effectRef>
+          <a:fontRef idx="minor">
+            <a:schemeClr val="lt1"/>
+          </a:fontRef>
+        </p:style>
+        <p:txBody>
+          <a:bodyPr rtlCol="0" anchor="ctr"/>
+          <a:lstStyle/>
+          <a:p>
+            <a:pPr algn="ctr"/>
+            <a:r>
+              <a:rPr lang="en-US" dirty="0"/>
+              <a:t>Working with data</a:t>
+            </a:r>
+            <a:endParaRPr lang="en-IL" dirty="0"/>
+          </a:p>
+        </p:txBody>
+      </p:sp>
+      <p:sp>
+        <p:nvSpPr>
+          <p:cNvPr id="14" name="Rectangle: Rounded Corners 13">
+            <a:extLst>
+              <a:ext uri="{FF2B5EF4-FFF2-40B4-BE49-F238E27FC236}">
+                <a16:creationId xmlns:a16="http://schemas.microsoft.com/office/drawing/2014/main" id="{5F5F7571-1981-4BAA-BC16-11C2247A15D5}"/>
+              </a:ext>
+            </a:extLst>
+          </p:cNvPr>
+          <p:cNvSpPr/>
+          <p:nvPr/>
+        </p:nvSpPr>
+        <p:spPr>
+          <a:xfrm>
+            <a:off x="2545081" y="5306567"/>
+            <a:ext cx="2143760" cy="777240"/>
+          </a:xfrm>
+          <a:prstGeom prst="roundRect">
+            <a:avLst/>
+          </a:prstGeom>
+        </p:spPr>
+        <p:style>
+          <a:lnRef idx="2">
+            <a:schemeClr val="accent1">
+              <a:shade val="50000"/>
+            </a:schemeClr>
+          </a:lnRef>
+          <a:fillRef idx="1">
+            <a:schemeClr val="accent1"/>
+          </a:fillRef>
+          <a:effectRef idx="0">
+            <a:schemeClr val="accent1"/>
+          </a:effectRef>
+          <a:fontRef idx="minor">
+            <a:schemeClr val="lt1"/>
+          </a:fontRef>
+        </p:style>
+        <p:txBody>
+          <a:bodyPr rtlCol="0" anchor="ctr"/>
+          <a:lstStyle/>
+          <a:p>
+            <a:pPr algn="ctr"/>
+            <a:r>
+              <a:rPr lang="en-US" dirty="0"/>
+              <a:t>Summarizing</a:t>
+            </a:r>
+            <a:endParaRPr lang="en-IL" dirty="0"/>
+          </a:p>
+        </p:txBody>
+      </p:sp>
+      <p:sp>
+        <p:nvSpPr>
+          <p:cNvPr id="15" name="Rectangle: Rounded Corners 14">
+            <a:extLst>
+              <a:ext uri="{FF2B5EF4-FFF2-40B4-BE49-F238E27FC236}">
+                <a16:creationId xmlns:a16="http://schemas.microsoft.com/office/drawing/2014/main" id="{D0BE313E-1876-4E29-995D-23C0361BEB9F}"/>
+              </a:ext>
+            </a:extLst>
+          </p:cNvPr>
+          <p:cNvSpPr/>
+          <p:nvPr/>
+        </p:nvSpPr>
+        <p:spPr>
+          <a:xfrm>
+            <a:off x="238761" y="5298693"/>
+            <a:ext cx="2143760" cy="777240"/>
+          </a:xfrm>
+          <a:prstGeom prst="roundRect">
+            <a:avLst/>
+          </a:prstGeom>
+        </p:spPr>
+        <p:style>
+          <a:lnRef idx="2">
+            <a:schemeClr val="accent1">
+              <a:shade val="50000"/>
+            </a:schemeClr>
+          </a:lnRef>
+          <a:fillRef idx="1">
+            <a:schemeClr val="accent1"/>
+          </a:fillRef>
+          <a:effectRef idx="0">
+            <a:schemeClr val="accent1"/>
+          </a:effectRef>
+          <a:fontRef idx="minor">
+            <a:schemeClr val="lt1"/>
+          </a:fontRef>
+        </p:style>
+        <p:txBody>
+          <a:bodyPr rtlCol="0" anchor="ctr"/>
+          <a:lstStyle/>
+          <a:p>
+            <a:pPr algn="ctr"/>
+            <a:r>
+              <a:rPr lang="en-US" dirty="0"/>
+              <a:t>Visualizing</a:t>
+            </a:r>
+            <a:endParaRPr lang="en-IL" dirty="0"/>
+          </a:p>
+        </p:txBody>
+      </p:sp>
+      <p:cxnSp>
+        <p:nvCxnSpPr>
+          <p:cNvPr id="19" name="Connector: Curved 18">
+            <a:extLst>
+              <a:ext uri="{FF2B5EF4-FFF2-40B4-BE49-F238E27FC236}">
+                <a16:creationId xmlns:a16="http://schemas.microsoft.com/office/drawing/2014/main" id="{CB83E36E-4DD6-440C-AFEE-B992CCD8C929}"/>
+              </a:ext>
+            </a:extLst>
+          </p:cNvPr>
+          <p:cNvCxnSpPr>
+            <a:stCxn id="6" idx="0"/>
+            <a:endCxn id="7" idx="1"/>
+          </p:cNvCxnSpPr>
+          <p:nvPr/>
+        </p:nvCxnSpPr>
+        <p:spPr>
+          <a:xfrm rot="5400000" flipH="1" flipV="1">
+            <a:off x="5772023" y="2471293"/>
+            <a:ext cx="647954" cy="670561"/>
+          </a:xfrm>
+          <a:prstGeom prst="curvedConnector2">
+            <a:avLst/>
+          </a:prstGeom>
+          <a:ln>
+            <a:tailEnd type="triangle"/>
+          </a:ln>
+        </p:spPr>
+        <p:style>
+          <a:lnRef idx="2">
+            <a:schemeClr val="dk1"/>
+          </a:lnRef>
+          <a:fillRef idx="0">
+            <a:schemeClr val="dk1"/>
+          </a:fillRef>
+          <a:effectRef idx="1">
+            <a:schemeClr val="dk1"/>
+          </a:effectRef>
+          <a:fontRef idx="minor">
+            <a:schemeClr val="tx1"/>
+          </a:fontRef>
+        </p:style>
+      </p:cxnSp>
+      <p:cxnSp>
+        <p:nvCxnSpPr>
+          <p:cNvPr id="21" name="Connector: Curved 20">
+            <a:extLst>
+              <a:ext uri="{FF2B5EF4-FFF2-40B4-BE49-F238E27FC236}">
+                <a16:creationId xmlns:a16="http://schemas.microsoft.com/office/drawing/2014/main" id="{B4DFFDB4-C6BF-4901-93DF-67509C409FEE}"/>
+              </a:ext>
+            </a:extLst>
+          </p:cNvPr>
+          <p:cNvCxnSpPr>
+            <a:stCxn id="7" idx="3"/>
+            <a:endCxn id="8" idx="1"/>
+          </p:cNvCxnSpPr>
+          <p:nvPr/>
+        </p:nvCxnSpPr>
+        <p:spPr>
+          <a:xfrm flipV="1">
+            <a:off x="8575041" y="1951863"/>
+            <a:ext cx="592327" cy="530733"/>
+          </a:xfrm>
+          <a:prstGeom prst="curvedConnector3">
+            <a:avLst/>
+          </a:prstGeom>
+          <a:ln>
+            <a:tailEnd type="triangle"/>
+          </a:ln>
+        </p:spPr>
+        <p:style>
+          <a:lnRef idx="2">
+            <a:schemeClr val="dk1"/>
+          </a:lnRef>
+          <a:fillRef idx="0">
+            <a:schemeClr val="dk1"/>
+          </a:fillRef>
+          <a:effectRef idx="1">
+            <a:schemeClr val="dk1"/>
+          </a:effectRef>
+          <a:fontRef idx="minor">
+            <a:schemeClr val="tx1"/>
+          </a:fontRef>
+        </p:style>
+      </p:cxnSp>
+      <p:cxnSp>
+        <p:nvCxnSpPr>
+          <p:cNvPr id="23" name="Connector: Curved 22">
+            <a:extLst>
+              <a:ext uri="{FF2B5EF4-FFF2-40B4-BE49-F238E27FC236}">
+                <a16:creationId xmlns:a16="http://schemas.microsoft.com/office/drawing/2014/main" id="{64E7756F-8A43-48A6-B801-FEABB245B8A8}"/>
+              </a:ext>
+            </a:extLst>
+          </p:cNvPr>
+          <p:cNvCxnSpPr>
+            <a:stCxn id="7" idx="3"/>
+            <a:endCxn id="9" idx="1"/>
+          </p:cNvCxnSpPr>
+          <p:nvPr/>
+        </p:nvCxnSpPr>
+        <p:spPr>
+          <a:xfrm>
+            <a:off x="8575041" y="2482596"/>
+            <a:ext cx="592327" cy="557784"/>
+          </a:xfrm>
+          <a:prstGeom prst="curvedConnector3">
+            <a:avLst/>
+          </a:prstGeom>
+          <a:ln>
+            <a:tailEnd type="triangle"/>
+          </a:ln>
+        </p:spPr>
+        <p:style>
+          <a:lnRef idx="2">
+            <a:schemeClr val="dk1"/>
+          </a:lnRef>
+          <a:fillRef idx="0">
+            <a:schemeClr val="dk1"/>
+          </a:fillRef>
+          <a:effectRef idx="1">
+            <a:schemeClr val="dk1"/>
+          </a:effectRef>
+          <a:fontRef idx="minor">
+            <a:schemeClr val="tx1"/>
+          </a:fontRef>
+        </p:style>
+      </p:cxnSp>
+      <p:cxnSp>
+        <p:nvCxnSpPr>
+          <p:cNvPr id="25" name="Connector: Curved 24">
+            <a:extLst>
+              <a:ext uri="{FF2B5EF4-FFF2-40B4-BE49-F238E27FC236}">
+                <a16:creationId xmlns:a16="http://schemas.microsoft.com/office/drawing/2014/main" id="{08C46F5A-ED2A-4286-9F23-3392FBDCD003}"/>
+              </a:ext>
+            </a:extLst>
+          </p:cNvPr>
+          <p:cNvCxnSpPr>
+            <a:stCxn id="9" idx="2"/>
+            <a:endCxn id="10" idx="0"/>
+          </p:cNvCxnSpPr>
+          <p:nvPr/>
+        </p:nvCxnSpPr>
+        <p:spPr>
+          <a:xfrm rot="5400000">
+            <a:off x="9591548" y="3456940"/>
+            <a:ext cx="675640" cy="619760"/>
+          </a:xfrm>
+          <a:prstGeom prst="curvedConnector3">
+            <a:avLst/>
+          </a:prstGeom>
+          <a:ln>
+            <a:tailEnd type="triangle"/>
+          </a:ln>
+        </p:spPr>
+        <p:style>
+          <a:lnRef idx="2">
+            <a:schemeClr val="dk1"/>
+          </a:lnRef>
+          <a:fillRef idx="0">
+            <a:schemeClr val="dk1"/>
+          </a:fillRef>
+          <a:effectRef idx="1">
+            <a:schemeClr val="dk1"/>
+          </a:effectRef>
+          <a:fontRef idx="minor">
+            <a:schemeClr val="tx1"/>
+          </a:fontRef>
+        </p:style>
+      </p:cxnSp>
+      <p:cxnSp>
+        <p:nvCxnSpPr>
+          <p:cNvPr id="27" name="Connector: Curved 26">
+            <a:extLst>
+              <a:ext uri="{FF2B5EF4-FFF2-40B4-BE49-F238E27FC236}">
+                <a16:creationId xmlns:a16="http://schemas.microsoft.com/office/drawing/2014/main" id="{BCD93185-3EAE-4176-B472-9A5F42E3F20B}"/>
+              </a:ext>
+            </a:extLst>
+          </p:cNvPr>
+          <p:cNvCxnSpPr>
+            <a:stCxn id="10" idx="2"/>
+            <a:endCxn id="12" idx="0"/>
+          </p:cNvCxnSpPr>
+          <p:nvPr/>
+        </p:nvCxnSpPr>
+        <p:spPr>
+          <a:xfrm rot="16200000" flipH="1">
+            <a:off x="9973562" y="4527805"/>
+            <a:ext cx="439930" cy="1148079"/>
+          </a:xfrm>
+          <a:prstGeom prst="curvedConnector3">
+            <a:avLst/>
+          </a:prstGeom>
+          <a:ln>
+            <a:tailEnd type="triangle"/>
+          </a:ln>
+        </p:spPr>
+        <p:style>
+          <a:lnRef idx="2">
+            <a:schemeClr val="dk1"/>
+          </a:lnRef>
+          <a:fillRef idx="0">
+            <a:schemeClr val="dk1"/>
+          </a:fillRef>
+          <a:effectRef idx="1">
+            <a:schemeClr val="dk1"/>
+          </a:effectRef>
+          <a:fontRef idx="minor">
+            <a:schemeClr val="tx1"/>
+          </a:fontRef>
+        </p:style>
+      </p:cxnSp>
+      <p:cxnSp>
+        <p:nvCxnSpPr>
+          <p:cNvPr id="29" name="Connector: Curved 28">
+            <a:extLst>
+              <a:ext uri="{FF2B5EF4-FFF2-40B4-BE49-F238E27FC236}">
+                <a16:creationId xmlns:a16="http://schemas.microsoft.com/office/drawing/2014/main" id="{95425051-2F55-4E1D-9A04-089BCCF2DCD6}"/>
+              </a:ext>
+            </a:extLst>
+          </p:cNvPr>
+          <p:cNvCxnSpPr>
+            <a:stCxn id="10" idx="2"/>
+            <a:endCxn id="11" idx="0"/>
+          </p:cNvCxnSpPr>
+          <p:nvPr/>
+        </p:nvCxnSpPr>
+        <p:spPr>
+          <a:xfrm rot="5400000">
+            <a:off x="8637523" y="4339845"/>
+            <a:ext cx="439930" cy="1524000"/>
+          </a:xfrm>
+          <a:prstGeom prst="curvedConnector3">
+            <a:avLst/>
+          </a:prstGeom>
+          <a:ln>
+            <a:tailEnd type="triangle"/>
+          </a:ln>
+        </p:spPr>
+        <p:style>
+          <a:lnRef idx="2">
+            <a:schemeClr val="dk1"/>
+          </a:lnRef>
+          <a:fillRef idx="0">
+            <a:schemeClr val="dk1"/>
+          </a:fillRef>
+          <a:effectRef idx="1">
+            <a:schemeClr val="dk1"/>
+          </a:effectRef>
+          <a:fontRef idx="minor">
+            <a:schemeClr val="tx1"/>
+          </a:fontRef>
+        </p:style>
+      </p:cxnSp>
+      <p:cxnSp>
+        <p:nvCxnSpPr>
+          <p:cNvPr id="31" name="Connector: Curved 30">
+            <a:extLst>
+              <a:ext uri="{FF2B5EF4-FFF2-40B4-BE49-F238E27FC236}">
+                <a16:creationId xmlns:a16="http://schemas.microsoft.com/office/drawing/2014/main" id="{8C32605E-583C-461C-86B9-BA24E82F7F52}"/>
+              </a:ext>
+            </a:extLst>
+          </p:cNvPr>
+          <p:cNvCxnSpPr>
+            <a:stCxn id="6" idx="1"/>
+            <a:endCxn id="13" idx="3"/>
+          </p:cNvCxnSpPr>
+          <p:nvPr/>
+        </p:nvCxnSpPr>
+        <p:spPr>
+          <a:xfrm rot="10800000" flipV="1">
+            <a:off x="3537712" y="3519170"/>
+            <a:ext cx="1151128" cy="581660"/>
+          </a:xfrm>
+          <a:prstGeom prst="curvedConnector3">
+            <a:avLst/>
+          </a:prstGeom>
+          <a:ln>
+            <a:tailEnd type="triangle"/>
+          </a:ln>
+        </p:spPr>
+        <p:style>
+          <a:lnRef idx="2">
+            <a:schemeClr val="dk1"/>
+          </a:lnRef>
+          <a:fillRef idx="0">
+            <a:schemeClr val="dk1"/>
+          </a:fillRef>
+          <a:effectRef idx="1">
+            <a:schemeClr val="dk1"/>
+          </a:effectRef>
+          <a:fontRef idx="minor">
+            <a:schemeClr val="tx1"/>
+          </a:fontRef>
+        </p:style>
+      </p:cxnSp>
+      <p:cxnSp>
+        <p:nvCxnSpPr>
+          <p:cNvPr id="36" name="Connector: Curved 35">
+            <a:extLst>
+              <a:ext uri="{FF2B5EF4-FFF2-40B4-BE49-F238E27FC236}">
+                <a16:creationId xmlns:a16="http://schemas.microsoft.com/office/drawing/2014/main" id="{9FA5010F-CE85-4F54-A930-3A861C0EABC0}"/>
+              </a:ext>
+            </a:extLst>
+          </p:cNvPr>
+          <p:cNvCxnSpPr>
+            <a:stCxn id="13" idx="2"/>
+            <a:endCxn id="14" idx="0"/>
+          </p:cNvCxnSpPr>
+          <p:nvPr/>
+        </p:nvCxnSpPr>
+        <p:spPr>
+          <a:xfrm rot="16200000" flipH="1">
+            <a:off x="2632838" y="4322443"/>
+            <a:ext cx="817117" cy="1151129"/>
+          </a:xfrm>
+          <a:prstGeom prst="curvedConnector3">
+            <a:avLst/>
+          </a:prstGeom>
+          <a:ln>
+            <a:tailEnd type="triangle"/>
+          </a:ln>
+        </p:spPr>
+        <p:style>
+          <a:lnRef idx="2">
+            <a:schemeClr val="dk1"/>
+          </a:lnRef>
+          <a:fillRef idx="0">
+            <a:schemeClr val="dk1"/>
+          </a:fillRef>
+          <a:effectRef idx="1">
+            <a:schemeClr val="dk1"/>
+          </a:effectRef>
+          <a:fontRef idx="minor">
+            <a:schemeClr val="tx1"/>
+          </a:fontRef>
+        </p:style>
+      </p:cxnSp>
+      <p:cxnSp>
+        <p:nvCxnSpPr>
+          <p:cNvPr id="38" name="Connector: Curved 37">
+            <a:extLst>
+              <a:ext uri="{FF2B5EF4-FFF2-40B4-BE49-F238E27FC236}">
+                <a16:creationId xmlns:a16="http://schemas.microsoft.com/office/drawing/2014/main" id="{FD6C69B6-55B1-43C2-97CE-C7C39C1789EC}"/>
+              </a:ext>
+            </a:extLst>
+          </p:cNvPr>
+          <p:cNvCxnSpPr>
+            <a:stCxn id="13" idx="2"/>
+            <a:endCxn id="15" idx="0"/>
+          </p:cNvCxnSpPr>
+          <p:nvPr/>
+        </p:nvCxnSpPr>
+        <p:spPr>
+          <a:xfrm rot="5400000">
+            <a:off x="1483616" y="4316476"/>
+            <a:ext cx="809243" cy="1155191"/>
+          </a:xfrm>
+          <a:prstGeom prst="curvedConnector3">
+            <a:avLst/>
+          </a:prstGeom>
+          <a:ln>
+            <a:tailEnd type="triangle"/>
+          </a:ln>
+        </p:spPr>
+        <p:style>
+          <a:lnRef idx="2">
+            <a:schemeClr val="dk1"/>
+          </a:lnRef>
+          <a:fillRef idx="0">
+            <a:schemeClr val="dk1"/>
+          </a:fillRef>
+          <a:effectRef idx="1">
+            <a:schemeClr val="dk1"/>
+          </a:effectRef>
+          <a:fontRef idx="minor">
+            <a:schemeClr val="tx1"/>
+          </a:fontRef>
+        </p:style>
+      </p:cxnSp>
+      <p:cxnSp>
+        <p:nvCxnSpPr>
+          <p:cNvPr id="40" name="Connector: Curved 39">
+            <a:extLst>
+              <a:ext uri="{FF2B5EF4-FFF2-40B4-BE49-F238E27FC236}">
+                <a16:creationId xmlns:a16="http://schemas.microsoft.com/office/drawing/2014/main" id="{EBF6795F-1F12-4F0C-94D0-8A790E18F545}"/>
+              </a:ext>
+            </a:extLst>
+          </p:cNvPr>
+          <p:cNvCxnSpPr>
+            <a:stCxn id="10" idx="1"/>
+            <a:endCxn id="13" idx="3"/>
+          </p:cNvCxnSpPr>
+          <p:nvPr/>
+        </p:nvCxnSpPr>
+        <p:spPr>
+          <a:xfrm rot="10800000">
+            <a:off x="3537712" y="4100830"/>
+            <a:ext cx="5009896" cy="392430"/>
+          </a:xfrm>
+          <a:prstGeom prst="curvedConnector3">
+            <a:avLst/>
+          </a:prstGeom>
+          <a:ln>
+            <a:prstDash val="dash"/>
+            <a:tailEnd type="triangle"/>
+          </a:ln>
+        </p:spPr>
+        <p:style>
+          <a:lnRef idx="2">
+            <a:schemeClr val="dk1"/>
+          </a:lnRef>
+          <a:fillRef idx="0">
+            <a:schemeClr val="dk1"/>
+          </a:fillRef>
+          <a:effectRef idx="1">
+            <a:schemeClr val="dk1"/>
+          </a:effectRef>
+          <a:fontRef idx="minor">
+            <a:schemeClr val="tx1"/>
+          </a:fontRef>
+        </p:style>
+      </p:cxnSp>
+    </p:spTree>
+    <p:extLst>
+      <p:ext uri="{BB962C8B-B14F-4D97-AF65-F5344CB8AC3E}">
+        <p14:creationId xmlns:p14="http://schemas.microsoft.com/office/powerpoint/2010/main" val="454190119"/>
+      </p:ext>
+    </p:extLst>
+  </p:cSld>
+  <p:clrMapOvr>
+    <a:masterClrMapping/>
+  </p:clrMapOvr>
+</p:sld>
+</file>
+
+<file path=ppt/slides/slide19.xml><?xml version="1.0" encoding="utf-8"?>
+<p:sld xmlns:a="http://schemas.openxmlformats.org/drawingml/2006/main" xmlns:r="http://schemas.openxmlformats.org/officeDocument/2006/relationships" xmlns:p="http://schemas.openxmlformats.org/presentationml/2006/main">
+  <p:cSld>
+    <p:spTree>
+      <p:nvGrpSpPr>
+        <p:cNvPr id="1" name=""/>
+        <p:cNvGrpSpPr/>
+        <p:nvPr/>
+      </p:nvGrpSpPr>
+      <p:grpSpPr>
+        <a:xfrm>
+          <a:off x="0" y="0"/>
+          <a:ext cx="0" cy="0"/>
+          <a:chOff x="0" y="0"/>
+          <a:chExt cx="0" cy="0"/>
+        </a:xfrm>
+      </p:grpSpPr>
+      <p:sp>
+        <p:nvSpPr>
+          <p:cNvPr id="2" name="Title 1">
+            <a:extLst>
+              <a:ext uri="{FF2B5EF4-FFF2-40B4-BE49-F238E27FC236}">
+                <a16:creationId xmlns:a16="http://schemas.microsoft.com/office/drawing/2014/main" id="{B6A351EE-7D77-4547-91C7-8EBEF7526B12}"/>
+              </a:ext>
+            </a:extLst>
+          </p:cNvPr>
+          <p:cNvSpPr>
+            <a:spLocks noGrp="1"/>
+          </p:cNvSpPr>
+          <p:nvPr>
+            <p:ph type="title"/>
+          </p:nvPr>
+        </p:nvSpPr>
+        <p:spPr/>
+        <p:txBody>
+          <a:bodyPr/>
+          <a:lstStyle/>
+          <a:p>
+            <a:r>
+              <a:rPr lang="en-US" dirty="0"/>
+              <a:t>Summarizing and Visualizing Data</a:t>
+            </a:r>
+            <a:endParaRPr lang="en-IL" dirty="0"/>
+          </a:p>
+        </p:txBody>
+      </p:sp>
+      <p:sp>
+        <p:nvSpPr>
+          <p:cNvPr id="3" name="Content Placeholder 2">
+            <a:extLst>
+              <a:ext uri="{FF2B5EF4-FFF2-40B4-BE49-F238E27FC236}">
+                <a16:creationId xmlns:a16="http://schemas.microsoft.com/office/drawing/2014/main" id="{D66908B8-0BD6-433E-836C-5858BF98600D}"/>
+              </a:ext>
+            </a:extLst>
+          </p:cNvPr>
+          <p:cNvSpPr>
+            <a:spLocks noGrp="1"/>
+          </p:cNvSpPr>
+          <p:nvPr>
+            <p:ph idx="1"/>
+          </p:nvPr>
+        </p:nvSpPr>
+        <p:spPr/>
+        <p:txBody>
+          <a:bodyPr/>
+          <a:lstStyle/>
+          <a:p>
+            <a:pPr>
+              <a:lnSpc>
+                <a:spcPct val="150000"/>
+              </a:lnSpc>
+            </a:pPr>
+            <a:r>
+              <a:rPr lang="en-US" dirty="0"/>
+              <a:t>“Working with Data” will be covered in more details in the recitations and homework.</a:t>
+            </a:r>
+          </a:p>
+          <a:p>
+            <a:pPr>
+              <a:lnSpc>
+                <a:spcPct val="150000"/>
+              </a:lnSpc>
+            </a:pPr>
+            <a:r>
+              <a:rPr lang="en-US" dirty="0"/>
+              <a:t>Throughout the course we will show examples via R, specifically I’m using </a:t>
+            </a:r>
+            <a:r>
+              <a:rPr lang="en-US" dirty="0" err="1"/>
+              <a:t>tidyverse</a:t>
+            </a:r>
+            <a:r>
+              <a:rPr lang="en-US" dirty="0"/>
+              <a:t> packages (but base R is also ok)</a:t>
+            </a:r>
+          </a:p>
+          <a:p>
+            <a:pPr>
+              <a:lnSpc>
+                <a:spcPct val="150000"/>
+              </a:lnSpc>
+            </a:pPr>
+            <a:endParaRPr lang="en-US" dirty="0"/>
+          </a:p>
+        </p:txBody>
+      </p:sp>
+      <p:sp>
+        <p:nvSpPr>
+          <p:cNvPr id="4" name="Footer Placeholder 3">
+            <a:extLst>
+              <a:ext uri="{FF2B5EF4-FFF2-40B4-BE49-F238E27FC236}">
+                <a16:creationId xmlns:a16="http://schemas.microsoft.com/office/drawing/2014/main" id="{63551070-E13D-490A-986B-C6965D40B2E0}"/>
+              </a:ext>
+            </a:extLst>
+          </p:cNvPr>
+          <p:cNvSpPr>
+            <a:spLocks noGrp="1"/>
+          </p:cNvSpPr>
+          <p:nvPr>
+            <p:ph type="ftr" sz="quarter" idx="11"/>
+          </p:nvPr>
+        </p:nvSpPr>
+        <p:spPr/>
+        <p:txBody>
+          <a:bodyPr/>
+          <a:lstStyle/>
+          <a:p>
+            <a:r>
+              <a:rPr lang="en-US"/>
+              <a:t>Materials by Adi Sarid https://adisarid.github.io and http://www.sarid-ins.com</a:t>
+            </a:r>
+            <a:endParaRPr lang="en-US" dirty="0"/>
+          </a:p>
+        </p:txBody>
+      </p:sp>
+      <p:sp>
+        <p:nvSpPr>
+          <p:cNvPr id="5" name="Slide Number Placeholder 4">
+            <a:extLst>
+              <a:ext uri="{FF2B5EF4-FFF2-40B4-BE49-F238E27FC236}">
+                <a16:creationId xmlns:a16="http://schemas.microsoft.com/office/drawing/2014/main" id="{696A6F66-ECD6-46F8-B6A0-ED8192626FE2}"/>
+              </a:ext>
+            </a:extLst>
+          </p:cNvPr>
+          <p:cNvSpPr>
+            <a:spLocks noGrp="1"/>
+          </p:cNvSpPr>
+          <p:nvPr>
+            <p:ph type="sldNum" sz="quarter" idx="12"/>
+          </p:nvPr>
+        </p:nvSpPr>
+        <p:spPr/>
+        <p:txBody>
+          <a:bodyPr/>
+          <a:lstStyle/>
+          <a:p>
+            <a:fld id="{4FAB73BC-B049-4115-A692-8D63A059BFB8}" type="slidenum">
+              <a:rPr lang="en-US" smtClean="0"/>
+              <a:t>19</a:t>
+            </a:fld>
+            <a:endParaRPr lang="en-US" dirty="0"/>
+          </a:p>
+        </p:txBody>
+      </p:sp>
+    </p:spTree>
+    <p:extLst>
+      <p:ext uri="{BB962C8B-B14F-4D97-AF65-F5344CB8AC3E}">
+        <p14:creationId xmlns:p14="http://schemas.microsoft.com/office/powerpoint/2010/main" val="2894350594"/>
       </p:ext>
     </p:extLst>
   </p:cSld>

</xml_diff>

<commit_message>
Exteneded introduction lesson to Rmd with demonstration :construction:
</commit_message>
<xml_diff>
--- a/lectures/00-Introduction.pptx
+++ b/lectures/00-Introduction.pptx
@@ -9577,6 +9577,96 @@
                   <a:t>Sometimes called variables</a:t>
                 </a:r>
               </a:p>
+              <a:p>
+                <a:r>
+                  <a:rPr lang="en-US" dirty="0"/>
+                  <a:t>Explanatory/independent variables (usually noted as </a:t>
+                </a:r>
+                <a14:m>
+                  <m:oMath xmlns:m="http://schemas.openxmlformats.org/officeDocument/2006/math">
+                    <m:sSub>
+                      <m:sSubPr>
+                        <m:ctrlPr>
+                          <a:rPr lang="en-US" b="0" i="1" smtClean="0">
+                            <a:latin typeface="Cambria Math" panose="02040503050406030204" pitchFamily="18" charset="0"/>
+                          </a:rPr>
+                        </m:ctrlPr>
+                      </m:sSubPr>
+                      <m:e>
+                        <m:r>
+                          <a:rPr lang="en-US" b="0" i="1" smtClean="0">
+                            <a:latin typeface="Cambria Math" panose="02040503050406030204" pitchFamily="18" charset="0"/>
+                          </a:rPr>
+                          <m:t>𝑥</m:t>
+                        </m:r>
+                      </m:e>
+                      <m:sub>
+                        <m:r>
+                          <a:rPr lang="en-US" b="0" i="1" smtClean="0">
+                            <a:latin typeface="Cambria Math" panose="02040503050406030204" pitchFamily="18" charset="0"/>
+                          </a:rPr>
+                          <m:t>1</m:t>
+                        </m:r>
+                      </m:sub>
+                    </m:sSub>
+                    <m:r>
+                      <a:rPr lang="en-US" b="0" i="1" smtClean="0">
+                        <a:latin typeface="Cambria Math" panose="02040503050406030204" pitchFamily="18" charset="0"/>
+                      </a:rPr>
+                      <m:t>,…,</m:t>
+                    </m:r>
+                    <m:sSub>
+                      <m:sSubPr>
+                        <m:ctrlPr>
+                          <a:rPr lang="en-US" b="0" i="1" smtClean="0">
+                            <a:latin typeface="Cambria Math" panose="02040503050406030204" pitchFamily="18" charset="0"/>
+                          </a:rPr>
+                        </m:ctrlPr>
+                      </m:sSubPr>
+                      <m:e>
+                        <m:r>
+                          <a:rPr lang="en-US" b="0" i="1" smtClean="0">
+                            <a:latin typeface="Cambria Math" panose="02040503050406030204" pitchFamily="18" charset="0"/>
+                          </a:rPr>
+                          <m:t>𝑥</m:t>
+                        </m:r>
+                      </m:e>
+                      <m:sub>
+                        <m:r>
+                          <a:rPr lang="en-US" b="0" i="1" smtClean="0">
+                            <a:latin typeface="Cambria Math" panose="02040503050406030204" pitchFamily="18" charset="0"/>
+                          </a:rPr>
+                          <m:t>𝑝</m:t>
+                        </m:r>
+                      </m:sub>
+                    </m:sSub>
+                  </m:oMath>
+                </a14:m>
+                <a:r>
+                  <a:rPr lang="en-US" dirty="0"/>
+                  <a:t>)</a:t>
+                </a:r>
+              </a:p>
+              <a:p>
+                <a:r>
+                  <a:rPr lang="en-US" dirty="0"/>
+                  <a:t>Outcome/dependent variable (usually noted as </a:t>
+                </a:r>
+                <a14:m>
+                  <m:oMath xmlns:m="http://schemas.openxmlformats.org/officeDocument/2006/math">
+                    <m:r>
+                      <a:rPr lang="en-US" b="0" i="1" smtClean="0">
+                        <a:latin typeface="Cambria Math" panose="02040503050406030204" pitchFamily="18" charset="0"/>
+                      </a:rPr>
+                      <m:t>𝑦</m:t>
+                    </m:r>
+                  </m:oMath>
+                </a14:m>
+                <a:r>
+                  <a:rPr lang="en-US" dirty="0"/>
+                  <a:t>)</a:t>
+                </a:r>
+              </a:p>
             </p:txBody>
           </p:sp>
         </mc:Choice>
@@ -11071,7 +11161,24 @@
                 <a:spcPct val="150000"/>
               </a:lnSpc>
             </a:pPr>
-            <a:endParaRPr lang="en-US" dirty="0"/>
+            <a:r>
+              <a:rPr lang="en-US" dirty="0"/>
+              <a:t>Now, we’re going to demonstrate live: </a:t>
+            </a:r>
+          </a:p>
+          <a:p>
+            <a:pPr lvl="1">
+              <a:lnSpc>
+                <a:spcPct val="150000"/>
+              </a:lnSpc>
+            </a:pPr>
+            <a:r>
+              <a:rPr lang="en-US" dirty="0">
+                <a:latin typeface="Courier New" panose="02070309020205020404" pitchFamily="49" charset="0"/>
+                <a:cs typeface="Courier New" panose="02070309020205020404" pitchFamily="49" charset="0"/>
+              </a:rPr>
+              <a:t>/00-introduction/00-introduction_script.R</a:t>
+            </a:r>
           </a:p>
         </p:txBody>
       </p:sp>

</xml_diff>

<commit_message>
added a slide on sampling
</commit_message>
<xml_diff>
--- a/lectures/00-Introduction.pptx
+++ b/lectures/00-Introduction.pptx
@@ -5,7 +5,7 @@
     <p:sldMasterId id="2147483840" r:id="rId1"/>
   </p:sldMasterIdLst>
   <p:notesMasterIdLst>
-    <p:notesMasterId r:id="rId21"/>
+    <p:notesMasterId r:id="rId23"/>
   </p:notesMasterIdLst>
   <p:sldIdLst>
     <p:sldId id="256" r:id="rId2"/>
@@ -27,6 +27,8 @@
     <p:sldId id="275" r:id="rId18"/>
     <p:sldId id="277" r:id="rId19"/>
     <p:sldId id="276" r:id="rId20"/>
+    <p:sldId id="279" r:id="rId21"/>
+    <p:sldId id="280" r:id="rId22"/>
   </p:sldIdLst>
   <p:sldSz cx="12192000" cy="6858000"/>
   <p:notesSz cx="6858000" cy="9144000"/>
@@ -231,7 +233,7 @@
           <a:p>
             <a:fld id="{5C93CA8F-50F8-44B5-B48F-4C4452AC4FCB}" type="datetimeFigureOut">
               <a:rPr lang="he-IL" smtClean="0"/>
-              <a:t>י"ח/תשרי/תש"פ</a:t>
+              <a:t>כ"א/תשרי/תש"פ</a:t>
             </a:fld>
             <a:endParaRPr lang="he-IL"/>
           </a:p>
@@ -9497,8 +9499,8 @@
           </a:p>
         </p:txBody>
       </p:sp>
-      <mc:AlternateContent xmlns:mc="http://schemas.openxmlformats.org/markup-compatibility/2006">
-        <mc:Choice xmlns:a14="http://schemas.microsoft.com/office/drawing/2010/main" Requires="a14">
+      <mc:AlternateContent xmlns:mc="http://schemas.openxmlformats.org/markup-compatibility/2006" xmlns:a14="http://schemas.microsoft.com/office/drawing/2010/main">
+        <mc:Choice Requires="a14">
           <p:sp>
             <p:nvSpPr>
               <p:cNvPr id="3" name="Content Placeholder 2">
@@ -9670,7 +9672,7 @@
             </p:txBody>
           </p:sp>
         </mc:Choice>
-        <mc:Fallback>
+        <mc:Fallback xmlns="">
           <p:sp>
             <p:nvSpPr>
               <p:cNvPr id="3" name="Content Placeholder 2">
@@ -11424,6 +11426,2413 @@
   <p:clrMapOvr>
     <a:masterClrMapping/>
   </p:clrMapOvr>
+</p:sld>
+</file>
+
+<file path=ppt/slides/slide20.xml><?xml version="1.0" encoding="utf-8"?>
+<p:sld xmlns:a="http://schemas.openxmlformats.org/drawingml/2006/main" xmlns:r="http://schemas.openxmlformats.org/officeDocument/2006/relationships" xmlns:p="http://schemas.openxmlformats.org/presentationml/2006/main">
+  <p:cSld>
+    <p:spTree>
+      <p:nvGrpSpPr>
+        <p:cNvPr id="1" name=""/>
+        <p:cNvGrpSpPr/>
+        <p:nvPr/>
+      </p:nvGrpSpPr>
+      <p:grpSpPr>
+        <a:xfrm>
+          <a:off x="0" y="0"/>
+          <a:ext cx="0" cy="0"/>
+          <a:chOff x="0" y="0"/>
+          <a:chExt cx="0" cy="0"/>
+        </a:xfrm>
+      </p:grpSpPr>
+      <p:sp>
+        <p:nvSpPr>
+          <p:cNvPr id="2" name="Title 1">
+            <a:extLst>
+              <a:ext uri="{FF2B5EF4-FFF2-40B4-BE49-F238E27FC236}">
+                <a16:creationId xmlns:a16="http://schemas.microsoft.com/office/drawing/2014/main" id="{017DFCFB-90CE-43A7-A3BD-029951D8DD47}"/>
+              </a:ext>
+            </a:extLst>
+          </p:cNvPr>
+          <p:cNvSpPr>
+            <a:spLocks noGrp="1"/>
+          </p:cNvSpPr>
+          <p:nvPr>
+            <p:ph type="title"/>
+          </p:nvPr>
+        </p:nvSpPr>
+        <p:spPr/>
+        <p:txBody>
+          <a:bodyPr/>
+          <a:lstStyle/>
+          <a:p>
+            <a:r>
+              <a:rPr lang="en-US" dirty="0"/>
+              <a:t>Contents for Today</a:t>
+            </a:r>
+            <a:endParaRPr lang="en-IL" dirty="0"/>
+          </a:p>
+        </p:txBody>
+      </p:sp>
+      <p:sp>
+        <p:nvSpPr>
+          <p:cNvPr id="4" name="Footer Placeholder 3">
+            <a:extLst>
+              <a:ext uri="{FF2B5EF4-FFF2-40B4-BE49-F238E27FC236}">
+                <a16:creationId xmlns:a16="http://schemas.microsoft.com/office/drawing/2014/main" id="{5BC5E7C8-8793-496A-8953-AA062970EFF5}"/>
+              </a:ext>
+            </a:extLst>
+          </p:cNvPr>
+          <p:cNvSpPr>
+            <a:spLocks noGrp="1"/>
+          </p:cNvSpPr>
+          <p:nvPr>
+            <p:ph type="ftr" sz="quarter" idx="11"/>
+          </p:nvPr>
+        </p:nvSpPr>
+        <p:spPr/>
+        <p:txBody>
+          <a:bodyPr/>
+          <a:lstStyle/>
+          <a:p>
+            <a:r>
+              <a:rPr lang="en-US"/>
+              <a:t>Materials by Adi Sarid https://adisarid.github.io and http://www.sarid-ins.com</a:t>
+            </a:r>
+            <a:endParaRPr lang="en-US" dirty="0"/>
+          </a:p>
+        </p:txBody>
+      </p:sp>
+      <p:sp>
+        <p:nvSpPr>
+          <p:cNvPr id="5" name="Slide Number Placeholder 4">
+            <a:extLst>
+              <a:ext uri="{FF2B5EF4-FFF2-40B4-BE49-F238E27FC236}">
+                <a16:creationId xmlns:a16="http://schemas.microsoft.com/office/drawing/2014/main" id="{C0FE4A99-DE2C-4DA1-BE5E-5E038D908D2E}"/>
+              </a:ext>
+            </a:extLst>
+          </p:cNvPr>
+          <p:cNvSpPr>
+            <a:spLocks noGrp="1"/>
+          </p:cNvSpPr>
+          <p:nvPr>
+            <p:ph type="sldNum" sz="quarter" idx="12"/>
+          </p:nvPr>
+        </p:nvSpPr>
+        <p:spPr/>
+        <p:txBody>
+          <a:bodyPr/>
+          <a:lstStyle/>
+          <a:p>
+            <a:fld id="{4FAB73BC-B049-4115-A692-8D63A059BFB8}" type="slidenum">
+              <a:rPr lang="en-US" smtClean="0"/>
+              <a:t>20</a:t>
+            </a:fld>
+            <a:endParaRPr lang="en-US" dirty="0"/>
+          </a:p>
+        </p:txBody>
+      </p:sp>
+      <p:sp>
+        <p:nvSpPr>
+          <p:cNvPr id="6" name="Rectangle: Rounded Corners 5">
+            <a:extLst>
+              <a:ext uri="{FF2B5EF4-FFF2-40B4-BE49-F238E27FC236}">
+                <a16:creationId xmlns:a16="http://schemas.microsoft.com/office/drawing/2014/main" id="{0788BB0A-9599-4291-8466-FB7B8264E6D5}"/>
+              </a:ext>
+            </a:extLst>
+          </p:cNvPr>
+          <p:cNvSpPr/>
+          <p:nvPr/>
+        </p:nvSpPr>
+        <p:spPr>
+          <a:xfrm>
+            <a:off x="4688840" y="3130550"/>
+            <a:ext cx="2143760" cy="777240"/>
+          </a:xfrm>
+          <a:prstGeom prst="roundRect">
+            <a:avLst/>
+          </a:prstGeom>
+        </p:spPr>
+        <p:style>
+          <a:lnRef idx="3">
+            <a:schemeClr val="lt1"/>
+          </a:lnRef>
+          <a:fillRef idx="1">
+            <a:schemeClr val="accent5"/>
+          </a:fillRef>
+          <a:effectRef idx="1">
+            <a:schemeClr val="accent5"/>
+          </a:effectRef>
+          <a:fontRef idx="minor">
+            <a:schemeClr val="lt1"/>
+          </a:fontRef>
+        </p:style>
+        <p:txBody>
+          <a:bodyPr rtlCol="0" anchor="ctr"/>
+          <a:lstStyle/>
+          <a:p>
+            <a:pPr algn="ctr"/>
+            <a:r>
+              <a:rPr lang="en-US" dirty="0"/>
+              <a:t>Data</a:t>
+            </a:r>
+            <a:endParaRPr lang="en-IL" dirty="0"/>
+          </a:p>
+        </p:txBody>
+      </p:sp>
+      <p:sp>
+        <p:nvSpPr>
+          <p:cNvPr id="7" name="Rectangle: Rounded Corners 6">
+            <a:extLst>
+              <a:ext uri="{FF2B5EF4-FFF2-40B4-BE49-F238E27FC236}">
+                <a16:creationId xmlns:a16="http://schemas.microsoft.com/office/drawing/2014/main" id="{8083DA9A-C622-47C1-BE75-77FC6EA58A1B}"/>
+              </a:ext>
+            </a:extLst>
+          </p:cNvPr>
+          <p:cNvSpPr/>
+          <p:nvPr/>
+        </p:nvSpPr>
+        <p:spPr>
+          <a:xfrm>
+            <a:off x="6431281" y="2093976"/>
+            <a:ext cx="2143760" cy="777240"/>
+          </a:xfrm>
+          <a:prstGeom prst="roundRect">
+            <a:avLst/>
+          </a:prstGeom>
+        </p:spPr>
+        <p:style>
+          <a:lnRef idx="3">
+            <a:schemeClr val="lt1"/>
+          </a:lnRef>
+          <a:fillRef idx="1">
+            <a:schemeClr val="accent5"/>
+          </a:fillRef>
+          <a:effectRef idx="1">
+            <a:schemeClr val="accent5"/>
+          </a:effectRef>
+          <a:fontRef idx="minor">
+            <a:schemeClr val="lt1"/>
+          </a:fontRef>
+        </p:style>
+        <p:txBody>
+          <a:bodyPr rtlCol="0" anchor="ctr"/>
+          <a:lstStyle/>
+          <a:p>
+            <a:pPr algn="ctr"/>
+            <a:r>
+              <a:rPr lang="en-US" dirty="0"/>
+              <a:t>The tidy philosophy</a:t>
+            </a:r>
+            <a:endParaRPr lang="en-IL" dirty="0"/>
+          </a:p>
+        </p:txBody>
+      </p:sp>
+      <p:sp>
+        <p:nvSpPr>
+          <p:cNvPr id="8" name="Rectangle: Rounded Corners 7">
+            <a:extLst>
+              <a:ext uri="{FF2B5EF4-FFF2-40B4-BE49-F238E27FC236}">
+                <a16:creationId xmlns:a16="http://schemas.microsoft.com/office/drawing/2014/main" id="{29601989-F448-4769-BB61-973B97FE1120}"/>
+              </a:ext>
+            </a:extLst>
+          </p:cNvPr>
+          <p:cNvSpPr/>
+          <p:nvPr/>
+        </p:nvSpPr>
+        <p:spPr>
+          <a:xfrm>
+            <a:off x="9167368" y="1563243"/>
+            <a:ext cx="2143760" cy="777240"/>
+          </a:xfrm>
+          <a:prstGeom prst="roundRect">
+            <a:avLst/>
+          </a:prstGeom>
+        </p:spPr>
+        <p:style>
+          <a:lnRef idx="3">
+            <a:schemeClr val="lt1"/>
+          </a:lnRef>
+          <a:fillRef idx="1">
+            <a:schemeClr val="accent5"/>
+          </a:fillRef>
+          <a:effectRef idx="1">
+            <a:schemeClr val="accent5"/>
+          </a:effectRef>
+          <a:fontRef idx="minor">
+            <a:schemeClr val="lt1"/>
+          </a:fontRef>
+        </p:style>
+        <p:txBody>
+          <a:bodyPr rtlCol="0" anchor="ctr"/>
+          <a:lstStyle/>
+          <a:p>
+            <a:pPr algn="ctr"/>
+            <a:r>
+              <a:rPr lang="en-US" dirty="0"/>
+              <a:t>Rows (observations)</a:t>
+            </a:r>
+            <a:endParaRPr lang="en-IL" dirty="0"/>
+          </a:p>
+        </p:txBody>
+      </p:sp>
+      <p:sp>
+        <p:nvSpPr>
+          <p:cNvPr id="9" name="Rectangle: Rounded Corners 8">
+            <a:extLst>
+              <a:ext uri="{FF2B5EF4-FFF2-40B4-BE49-F238E27FC236}">
+                <a16:creationId xmlns:a16="http://schemas.microsoft.com/office/drawing/2014/main" id="{7C74014E-828A-4077-A824-687F08241CC4}"/>
+              </a:ext>
+            </a:extLst>
+          </p:cNvPr>
+          <p:cNvSpPr/>
+          <p:nvPr/>
+        </p:nvSpPr>
+        <p:spPr>
+          <a:xfrm>
+            <a:off x="9167368" y="2651760"/>
+            <a:ext cx="2143760" cy="777240"/>
+          </a:xfrm>
+          <a:prstGeom prst="roundRect">
+            <a:avLst/>
+          </a:prstGeom>
+        </p:spPr>
+        <p:style>
+          <a:lnRef idx="3">
+            <a:schemeClr val="lt1"/>
+          </a:lnRef>
+          <a:fillRef idx="1">
+            <a:schemeClr val="accent5"/>
+          </a:fillRef>
+          <a:effectRef idx="1">
+            <a:schemeClr val="accent5"/>
+          </a:effectRef>
+          <a:fontRef idx="minor">
+            <a:schemeClr val="lt1"/>
+          </a:fontRef>
+        </p:style>
+        <p:txBody>
+          <a:bodyPr rtlCol="0" anchor="ctr"/>
+          <a:lstStyle/>
+          <a:p>
+            <a:pPr algn="ctr"/>
+            <a:r>
+              <a:rPr lang="en-US" dirty="0"/>
+              <a:t>Columns (variables)</a:t>
+            </a:r>
+            <a:endParaRPr lang="en-IL" dirty="0"/>
+          </a:p>
+        </p:txBody>
+      </p:sp>
+      <p:sp>
+        <p:nvSpPr>
+          <p:cNvPr id="10" name="Rectangle: Rounded Corners 9">
+            <a:extLst>
+              <a:ext uri="{FF2B5EF4-FFF2-40B4-BE49-F238E27FC236}">
+                <a16:creationId xmlns:a16="http://schemas.microsoft.com/office/drawing/2014/main" id="{4402F498-01E6-4296-B552-29183ADEF948}"/>
+              </a:ext>
+            </a:extLst>
+          </p:cNvPr>
+          <p:cNvSpPr/>
+          <p:nvPr/>
+        </p:nvSpPr>
+        <p:spPr>
+          <a:xfrm>
+            <a:off x="8547608" y="4104640"/>
+            <a:ext cx="2143760" cy="777240"/>
+          </a:xfrm>
+          <a:prstGeom prst="roundRect">
+            <a:avLst/>
+          </a:prstGeom>
+        </p:spPr>
+        <p:style>
+          <a:lnRef idx="3">
+            <a:schemeClr val="lt1"/>
+          </a:lnRef>
+          <a:fillRef idx="1">
+            <a:schemeClr val="accent5"/>
+          </a:fillRef>
+          <a:effectRef idx="1">
+            <a:schemeClr val="accent5"/>
+          </a:effectRef>
+          <a:fontRef idx="minor">
+            <a:schemeClr val="lt1"/>
+          </a:fontRef>
+        </p:style>
+        <p:txBody>
+          <a:bodyPr rtlCol="0" anchor="ctr"/>
+          <a:lstStyle/>
+          <a:p>
+            <a:pPr algn="ctr"/>
+            <a:r>
+              <a:rPr lang="en-US" dirty="0"/>
+              <a:t>Variable types</a:t>
+            </a:r>
+            <a:endParaRPr lang="en-IL" dirty="0"/>
+          </a:p>
+        </p:txBody>
+      </p:sp>
+      <p:sp>
+        <p:nvSpPr>
+          <p:cNvPr id="11" name="Rectangle: Rounded Corners 10">
+            <a:extLst>
+              <a:ext uri="{FF2B5EF4-FFF2-40B4-BE49-F238E27FC236}">
+                <a16:creationId xmlns:a16="http://schemas.microsoft.com/office/drawing/2014/main" id="{3DE5D964-9E79-4B62-8D7C-F8BE3A1F1544}"/>
+              </a:ext>
+            </a:extLst>
+          </p:cNvPr>
+          <p:cNvSpPr/>
+          <p:nvPr/>
+        </p:nvSpPr>
+        <p:spPr>
+          <a:xfrm>
+            <a:off x="7023608" y="5321810"/>
+            <a:ext cx="2143760" cy="777240"/>
+          </a:xfrm>
+          <a:prstGeom prst="roundRect">
+            <a:avLst/>
+          </a:prstGeom>
+        </p:spPr>
+        <p:style>
+          <a:lnRef idx="3">
+            <a:schemeClr val="lt1"/>
+          </a:lnRef>
+          <a:fillRef idx="1">
+            <a:schemeClr val="accent5"/>
+          </a:fillRef>
+          <a:effectRef idx="1">
+            <a:schemeClr val="accent5"/>
+          </a:effectRef>
+          <a:fontRef idx="minor">
+            <a:schemeClr val="lt1"/>
+          </a:fontRef>
+        </p:style>
+        <p:txBody>
+          <a:bodyPr rtlCol="0" anchor="ctr"/>
+          <a:lstStyle/>
+          <a:p>
+            <a:pPr algn="ctr"/>
+            <a:r>
+              <a:rPr lang="en-US" dirty="0"/>
+              <a:t>Numeric (Integer, Double)</a:t>
+            </a:r>
+            <a:endParaRPr lang="en-IL" dirty="0"/>
+          </a:p>
+        </p:txBody>
+      </p:sp>
+      <p:sp>
+        <p:nvSpPr>
+          <p:cNvPr id="12" name="Rectangle: Rounded Corners 11">
+            <a:extLst>
+              <a:ext uri="{FF2B5EF4-FFF2-40B4-BE49-F238E27FC236}">
+                <a16:creationId xmlns:a16="http://schemas.microsoft.com/office/drawing/2014/main" id="{0D43B608-E3E8-489D-BA50-BA522DA0E014}"/>
+              </a:ext>
+            </a:extLst>
+          </p:cNvPr>
+          <p:cNvSpPr/>
+          <p:nvPr/>
+        </p:nvSpPr>
+        <p:spPr>
+          <a:xfrm>
+            <a:off x="9619487" y="5321810"/>
+            <a:ext cx="2296159" cy="777240"/>
+          </a:xfrm>
+          <a:prstGeom prst="roundRect">
+            <a:avLst/>
+          </a:prstGeom>
+        </p:spPr>
+        <p:style>
+          <a:lnRef idx="3">
+            <a:schemeClr val="lt1"/>
+          </a:lnRef>
+          <a:fillRef idx="1">
+            <a:schemeClr val="accent5"/>
+          </a:fillRef>
+          <a:effectRef idx="1">
+            <a:schemeClr val="accent5"/>
+          </a:effectRef>
+          <a:fontRef idx="minor">
+            <a:schemeClr val="lt1"/>
+          </a:fontRef>
+        </p:style>
+        <p:txBody>
+          <a:bodyPr rtlCol="0" anchor="ctr"/>
+          <a:lstStyle/>
+          <a:p>
+            <a:pPr algn="ctr"/>
+            <a:r>
+              <a:rPr lang="en-US" dirty="0"/>
+              <a:t>Factor (categorial, ordinal)</a:t>
+            </a:r>
+            <a:endParaRPr lang="en-IL" dirty="0"/>
+          </a:p>
+        </p:txBody>
+      </p:sp>
+      <p:sp>
+        <p:nvSpPr>
+          <p:cNvPr id="13" name="Rectangle: Rounded Corners 12">
+            <a:extLst>
+              <a:ext uri="{FF2B5EF4-FFF2-40B4-BE49-F238E27FC236}">
+                <a16:creationId xmlns:a16="http://schemas.microsoft.com/office/drawing/2014/main" id="{48AE1A91-813F-419F-8999-1FF991883229}"/>
+              </a:ext>
+            </a:extLst>
+          </p:cNvPr>
+          <p:cNvSpPr/>
+          <p:nvPr/>
+        </p:nvSpPr>
+        <p:spPr>
+          <a:xfrm>
+            <a:off x="1393952" y="3712210"/>
+            <a:ext cx="2143760" cy="777240"/>
+          </a:xfrm>
+          <a:prstGeom prst="roundRect">
+            <a:avLst/>
+          </a:prstGeom>
+        </p:spPr>
+        <p:style>
+          <a:lnRef idx="3">
+            <a:schemeClr val="lt1"/>
+          </a:lnRef>
+          <a:fillRef idx="1">
+            <a:schemeClr val="accent5"/>
+          </a:fillRef>
+          <a:effectRef idx="1">
+            <a:schemeClr val="accent5"/>
+          </a:effectRef>
+          <a:fontRef idx="minor">
+            <a:schemeClr val="lt1"/>
+          </a:fontRef>
+        </p:style>
+        <p:txBody>
+          <a:bodyPr rtlCol="0" anchor="ctr"/>
+          <a:lstStyle/>
+          <a:p>
+            <a:pPr algn="ctr"/>
+            <a:r>
+              <a:rPr lang="en-US" dirty="0"/>
+              <a:t>Working with data</a:t>
+            </a:r>
+            <a:endParaRPr lang="en-IL" dirty="0"/>
+          </a:p>
+        </p:txBody>
+      </p:sp>
+      <p:sp>
+        <p:nvSpPr>
+          <p:cNvPr id="14" name="Rectangle: Rounded Corners 13">
+            <a:extLst>
+              <a:ext uri="{FF2B5EF4-FFF2-40B4-BE49-F238E27FC236}">
+                <a16:creationId xmlns:a16="http://schemas.microsoft.com/office/drawing/2014/main" id="{5F5F7571-1981-4BAA-BC16-11C2247A15D5}"/>
+              </a:ext>
+            </a:extLst>
+          </p:cNvPr>
+          <p:cNvSpPr/>
+          <p:nvPr/>
+        </p:nvSpPr>
+        <p:spPr>
+          <a:xfrm>
+            <a:off x="2545081" y="5306567"/>
+            <a:ext cx="2143760" cy="777240"/>
+          </a:xfrm>
+          <a:prstGeom prst="roundRect">
+            <a:avLst/>
+          </a:prstGeom>
+        </p:spPr>
+        <p:style>
+          <a:lnRef idx="3">
+            <a:schemeClr val="lt1"/>
+          </a:lnRef>
+          <a:fillRef idx="1">
+            <a:schemeClr val="accent5"/>
+          </a:fillRef>
+          <a:effectRef idx="1">
+            <a:schemeClr val="accent5"/>
+          </a:effectRef>
+          <a:fontRef idx="minor">
+            <a:schemeClr val="lt1"/>
+          </a:fontRef>
+        </p:style>
+        <p:txBody>
+          <a:bodyPr rtlCol="0" anchor="ctr"/>
+          <a:lstStyle/>
+          <a:p>
+            <a:pPr algn="ctr"/>
+            <a:r>
+              <a:rPr lang="en-US" dirty="0"/>
+              <a:t>Summarizing</a:t>
+            </a:r>
+            <a:endParaRPr lang="en-IL" dirty="0"/>
+          </a:p>
+        </p:txBody>
+      </p:sp>
+      <p:sp>
+        <p:nvSpPr>
+          <p:cNvPr id="15" name="Rectangle: Rounded Corners 14">
+            <a:extLst>
+              <a:ext uri="{FF2B5EF4-FFF2-40B4-BE49-F238E27FC236}">
+                <a16:creationId xmlns:a16="http://schemas.microsoft.com/office/drawing/2014/main" id="{D0BE313E-1876-4E29-995D-23C0361BEB9F}"/>
+              </a:ext>
+            </a:extLst>
+          </p:cNvPr>
+          <p:cNvSpPr/>
+          <p:nvPr/>
+        </p:nvSpPr>
+        <p:spPr>
+          <a:xfrm>
+            <a:off x="238761" y="5298693"/>
+            <a:ext cx="2143760" cy="777240"/>
+          </a:xfrm>
+          <a:prstGeom prst="roundRect">
+            <a:avLst/>
+          </a:prstGeom>
+        </p:spPr>
+        <p:style>
+          <a:lnRef idx="3">
+            <a:schemeClr val="lt1"/>
+          </a:lnRef>
+          <a:fillRef idx="1">
+            <a:schemeClr val="accent5"/>
+          </a:fillRef>
+          <a:effectRef idx="1">
+            <a:schemeClr val="accent5"/>
+          </a:effectRef>
+          <a:fontRef idx="minor">
+            <a:schemeClr val="lt1"/>
+          </a:fontRef>
+        </p:style>
+        <p:txBody>
+          <a:bodyPr rtlCol="0" anchor="ctr"/>
+          <a:lstStyle/>
+          <a:p>
+            <a:pPr algn="ctr"/>
+            <a:r>
+              <a:rPr lang="en-US" dirty="0"/>
+              <a:t>Visualizing</a:t>
+            </a:r>
+            <a:endParaRPr lang="en-IL" dirty="0"/>
+          </a:p>
+        </p:txBody>
+      </p:sp>
+      <p:cxnSp>
+        <p:nvCxnSpPr>
+          <p:cNvPr id="19" name="Connector: Curved 18">
+            <a:extLst>
+              <a:ext uri="{FF2B5EF4-FFF2-40B4-BE49-F238E27FC236}">
+                <a16:creationId xmlns:a16="http://schemas.microsoft.com/office/drawing/2014/main" id="{CB83E36E-4DD6-440C-AFEE-B992CCD8C929}"/>
+              </a:ext>
+            </a:extLst>
+          </p:cNvPr>
+          <p:cNvCxnSpPr>
+            <a:stCxn id="6" idx="0"/>
+            <a:endCxn id="7" idx="1"/>
+          </p:cNvCxnSpPr>
+          <p:nvPr/>
+        </p:nvCxnSpPr>
+        <p:spPr>
+          <a:xfrm rot="5400000" flipH="1" flipV="1">
+            <a:off x="5772023" y="2471293"/>
+            <a:ext cx="647954" cy="670561"/>
+          </a:xfrm>
+          <a:prstGeom prst="curvedConnector2">
+            <a:avLst/>
+          </a:prstGeom>
+          <a:ln>
+            <a:tailEnd type="triangle"/>
+          </a:ln>
+        </p:spPr>
+        <p:style>
+          <a:lnRef idx="2">
+            <a:schemeClr val="dk1"/>
+          </a:lnRef>
+          <a:fillRef idx="0">
+            <a:schemeClr val="dk1"/>
+          </a:fillRef>
+          <a:effectRef idx="1">
+            <a:schemeClr val="dk1"/>
+          </a:effectRef>
+          <a:fontRef idx="minor">
+            <a:schemeClr val="tx1"/>
+          </a:fontRef>
+        </p:style>
+      </p:cxnSp>
+      <p:cxnSp>
+        <p:nvCxnSpPr>
+          <p:cNvPr id="21" name="Connector: Curved 20">
+            <a:extLst>
+              <a:ext uri="{FF2B5EF4-FFF2-40B4-BE49-F238E27FC236}">
+                <a16:creationId xmlns:a16="http://schemas.microsoft.com/office/drawing/2014/main" id="{B4DFFDB4-C6BF-4901-93DF-67509C409FEE}"/>
+              </a:ext>
+            </a:extLst>
+          </p:cNvPr>
+          <p:cNvCxnSpPr>
+            <a:stCxn id="7" idx="3"/>
+            <a:endCxn id="8" idx="1"/>
+          </p:cNvCxnSpPr>
+          <p:nvPr/>
+        </p:nvCxnSpPr>
+        <p:spPr>
+          <a:xfrm flipV="1">
+            <a:off x="8575041" y="1951863"/>
+            <a:ext cx="592327" cy="530733"/>
+          </a:xfrm>
+          <a:prstGeom prst="curvedConnector3">
+            <a:avLst/>
+          </a:prstGeom>
+          <a:ln>
+            <a:tailEnd type="triangle"/>
+          </a:ln>
+        </p:spPr>
+        <p:style>
+          <a:lnRef idx="2">
+            <a:schemeClr val="dk1"/>
+          </a:lnRef>
+          <a:fillRef idx="0">
+            <a:schemeClr val="dk1"/>
+          </a:fillRef>
+          <a:effectRef idx="1">
+            <a:schemeClr val="dk1"/>
+          </a:effectRef>
+          <a:fontRef idx="minor">
+            <a:schemeClr val="tx1"/>
+          </a:fontRef>
+        </p:style>
+      </p:cxnSp>
+      <p:cxnSp>
+        <p:nvCxnSpPr>
+          <p:cNvPr id="23" name="Connector: Curved 22">
+            <a:extLst>
+              <a:ext uri="{FF2B5EF4-FFF2-40B4-BE49-F238E27FC236}">
+                <a16:creationId xmlns:a16="http://schemas.microsoft.com/office/drawing/2014/main" id="{64E7756F-8A43-48A6-B801-FEABB245B8A8}"/>
+              </a:ext>
+            </a:extLst>
+          </p:cNvPr>
+          <p:cNvCxnSpPr>
+            <a:stCxn id="7" idx="3"/>
+            <a:endCxn id="9" idx="1"/>
+          </p:cNvCxnSpPr>
+          <p:nvPr/>
+        </p:nvCxnSpPr>
+        <p:spPr>
+          <a:xfrm>
+            <a:off x="8575041" y="2482596"/>
+            <a:ext cx="592327" cy="557784"/>
+          </a:xfrm>
+          <a:prstGeom prst="curvedConnector3">
+            <a:avLst/>
+          </a:prstGeom>
+          <a:ln>
+            <a:tailEnd type="triangle"/>
+          </a:ln>
+        </p:spPr>
+        <p:style>
+          <a:lnRef idx="2">
+            <a:schemeClr val="dk1"/>
+          </a:lnRef>
+          <a:fillRef idx="0">
+            <a:schemeClr val="dk1"/>
+          </a:fillRef>
+          <a:effectRef idx="1">
+            <a:schemeClr val="dk1"/>
+          </a:effectRef>
+          <a:fontRef idx="minor">
+            <a:schemeClr val="tx1"/>
+          </a:fontRef>
+        </p:style>
+      </p:cxnSp>
+      <p:cxnSp>
+        <p:nvCxnSpPr>
+          <p:cNvPr id="25" name="Connector: Curved 24">
+            <a:extLst>
+              <a:ext uri="{FF2B5EF4-FFF2-40B4-BE49-F238E27FC236}">
+                <a16:creationId xmlns:a16="http://schemas.microsoft.com/office/drawing/2014/main" id="{08C46F5A-ED2A-4286-9F23-3392FBDCD003}"/>
+              </a:ext>
+            </a:extLst>
+          </p:cNvPr>
+          <p:cNvCxnSpPr>
+            <a:stCxn id="9" idx="2"/>
+            <a:endCxn id="10" idx="0"/>
+          </p:cNvCxnSpPr>
+          <p:nvPr/>
+        </p:nvCxnSpPr>
+        <p:spPr>
+          <a:xfrm rot="5400000">
+            <a:off x="9591548" y="3456940"/>
+            <a:ext cx="675640" cy="619760"/>
+          </a:xfrm>
+          <a:prstGeom prst="curvedConnector3">
+            <a:avLst/>
+          </a:prstGeom>
+          <a:ln>
+            <a:tailEnd type="triangle"/>
+          </a:ln>
+        </p:spPr>
+        <p:style>
+          <a:lnRef idx="2">
+            <a:schemeClr val="dk1"/>
+          </a:lnRef>
+          <a:fillRef idx="0">
+            <a:schemeClr val="dk1"/>
+          </a:fillRef>
+          <a:effectRef idx="1">
+            <a:schemeClr val="dk1"/>
+          </a:effectRef>
+          <a:fontRef idx="minor">
+            <a:schemeClr val="tx1"/>
+          </a:fontRef>
+        </p:style>
+      </p:cxnSp>
+      <p:cxnSp>
+        <p:nvCxnSpPr>
+          <p:cNvPr id="27" name="Connector: Curved 26">
+            <a:extLst>
+              <a:ext uri="{FF2B5EF4-FFF2-40B4-BE49-F238E27FC236}">
+                <a16:creationId xmlns:a16="http://schemas.microsoft.com/office/drawing/2014/main" id="{BCD93185-3EAE-4176-B472-9A5F42E3F20B}"/>
+              </a:ext>
+            </a:extLst>
+          </p:cNvPr>
+          <p:cNvCxnSpPr>
+            <a:stCxn id="10" idx="2"/>
+            <a:endCxn id="12" idx="0"/>
+          </p:cNvCxnSpPr>
+          <p:nvPr/>
+        </p:nvCxnSpPr>
+        <p:spPr>
+          <a:xfrm rot="16200000" flipH="1">
+            <a:off x="9973562" y="4527805"/>
+            <a:ext cx="439930" cy="1148079"/>
+          </a:xfrm>
+          <a:prstGeom prst="curvedConnector3">
+            <a:avLst/>
+          </a:prstGeom>
+          <a:ln>
+            <a:tailEnd type="triangle"/>
+          </a:ln>
+        </p:spPr>
+        <p:style>
+          <a:lnRef idx="2">
+            <a:schemeClr val="dk1"/>
+          </a:lnRef>
+          <a:fillRef idx="0">
+            <a:schemeClr val="dk1"/>
+          </a:fillRef>
+          <a:effectRef idx="1">
+            <a:schemeClr val="dk1"/>
+          </a:effectRef>
+          <a:fontRef idx="minor">
+            <a:schemeClr val="tx1"/>
+          </a:fontRef>
+        </p:style>
+      </p:cxnSp>
+      <p:cxnSp>
+        <p:nvCxnSpPr>
+          <p:cNvPr id="29" name="Connector: Curved 28">
+            <a:extLst>
+              <a:ext uri="{FF2B5EF4-FFF2-40B4-BE49-F238E27FC236}">
+                <a16:creationId xmlns:a16="http://schemas.microsoft.com/office/drawing/2014/main" id="{95425051-2F55-4E1D-9A04-089BCCF2DCD6}"/>
+              </a:ext>
+            </a:extLst>
+          </p:cNvPr>
+          <p:cNvCxnSpPr>
+            <a:stCxn id="10" idx="2"/>
+            <a:endCxn id="11" idx="0"/>
+          </p:cNvCxnSpPr>
+          <p:nvPr/>
+        </p:nvCxnSpPr>
+        <p:spPr>
+          <a:xfrm rot="5400000">
+            <a:off x="8637523" y="4339845"/>
+            <a:ext cx="439930" cy="1524000"/>
+          </a:xfrm>
+          <a:prstGeom prst="curvedConnector3">
+            <a:avLst/>
+          </a:prstGeom>
+          <a:ln>
+            <a:tailEnd type="triangle"/>
+          </a:ln>
+        </p:spPr>
+        <p:style>
+          <a:lnRef idx="2">
+            <a:schemeClr val="dk1"/>
+          </a:lnRef>
+          <a:fillRef idx="0">
+            <a:schemeClr val="dk1"/>
+          </a:fillRef>
+          <a:effectRef idx="1">
+            <a:schemeClr val="dk1"/>
+          </a:effectRef>
+          <a:fontRef idx="minor">
+            <a:schemeClr val="tx1"/>
+          </a:fontRef>
+        </p:style>
+      </p:cxnSp>
+      <p:cxnSp>
+        <p:nvCxnSpPr>
+          <p:cNvPr id="31" name="Connector: Curved 30">
+            <a:extLst>
+              <a:ext uri="{FF2B5EF4-FFF2-40B4-BE49-F238E27FC236}">
+                <a16:creationId xmlns:a16="http://schemas.microsoft.com/office/drawing/2014/main" id="{8C32605E-583C-461C-86B9-BA24E82F7F52}"/>
+              </a:ext>
+            </a:extLst>
+          </p:cNvPr>
+          <p:cNvCxnSpPr>
+            <a:stCxn id="6" idx="1"/>
+            <a:endCxn id="13" idx="3"/>
+          </p:cNvCxnSpPr>
+          <p:nvPr/>
+        </p:nvCxnSpPr>
+        <p:spPr>
+          <a:xfrm rot="10800000" flipV="1">
+            <a:off x="3537712" y="3519170"/>
+            <a:ext cx="1151128" cy="581660"/>
+          </a:xfrm>
+          <a:prstGeom prst="curvedConnector3">
+            <a:avLst/>
+          </a:prstGeom>
+          <a:ln>
+            <a:tailEnd type="triangle"/>
+          </a:ln>
+        </p:spPr>
+        <p:style>
+          <a:lnRef idx="2">
+            <a:schemeClr val="dk1"/>
+          </a:lnRef>
+          <a:fillRef idx="0">
+            <a:schemeClr val="dk1"/>
+          </a:fillRef>
+          <a:effectRef idx="1">
+            <a:schemeClr val="dk1"/>
+          </a:effectRef>
+          <a:fontRef idx="minor">
+            <a:schemeClr val="tx1"/>
+          </a:fontRef>
+        </p:style>
+      </p:cxnSp>
+      <p:cxnSp>
+        <p:nvCxnSpPr>
+          <p:cNvPr id="36" name="Connector: Curved 35">
+            <a:extLst>
+              <a:ext uri="{FF2B5EF4-FFF2-40B4-BE49-F238E27FC236}">
+                <a16:creationId xmlns:a16="http://schemas.microsoft.com/office/drawing/2014/main" id="{9FA5010F-CE85-4F54-A930-3A861C0EABC0}"/>
+              </a:ext>
+            </a:extLst>
+          </p:cNvPr>
+          <p:cNvCxnSpPr>
+            <a:stCxn id="13" idx="2"/>
+            <a:endCxn id="14" idx="0"/>
+          </p:cNvCxnSpPr>
+          <p:nvPr/>
+        </p:nvCxnSpPr>
+        <p:spPr>
+          <a:xfrm rot="16200000" flipH="1">
+            <a:off x="2632838" y="4322443"/>
+            <a:ext cx="817117" cy="1151129"/>
+          </a:xfrm>
+          <a:prstGeom prst="curvedConnector3">
+            <a:avLst/>
+          </a:prstGeom>
+          <a:ln>
+            <a:tailEnd type="triangle"/>
+          </a:ln>
+        </p:spPr>
+        <p:style>
+          <a:lnRef idx="2">
+            <a:schemeClr val="dk1"/>
+          </a:lnRef>
+          <a:fillRef idx="0">
+            <a:schemeClr val="dk1"/>
+          </a:fillRef>
+          <a:effectRef idx="1">
+            <a:schemeClr val="dk1"/>
+          </a:effectRef>
+          <a:fontRef idx="minor">
+            <a:schemeClr val="tx1"/>
+          </a:fontRef>
+        </p:style>
+      </p:cxnSp>
+      <p:cxnSp>
+        <p:nvCxnSpPr>
+          <p:cNvPr id="38" name="Connector: Curved 37">
+            <a:extLst>
+              <a:ext uri="{FF2B5EF4-FFF2-40B4-BE49-F238E27FC236}">
+                <a16:creationId xmlns:a16="http://schemas.microsoft.com/office/drawing/2014/main" id="{FD6C69B6-55B1-43C2-97CE-C7C39C1789EC}"/>
+              </a:ext>
+            </a:extLst>
+          </p:cNvPr>
+          <p:cNvCxnSpPr>
+            <a:stCxn id="13" idx="2"/>
+            <a:endCxn id="15" idx="0"/>
+          </p:cNvCxnSpPr>
+          <p:nvPr/>
+        </p:nvCxnSpPr>
+        <p:spPr>
+          <a:xfrm rot="5400000">
+            <a:off x="1483616" y="4316476"/>
+            <a:ext cx="809243" cy="1155191"/>
+          </a:xfrm>
+          <a:prstGeom prst="curvedConnector3">
+            <a:avLst/>
+          </a:prstGeom>
+          <a:ln>
+            <a:tailEnd type="triangle"/>
+          </a:ln>
+        </p:spPr>
+        <p:style>
+          <a:lnRef idx="2">
+            <a:schemeClr val="dk1"/>
+          </a:lnRef>
+          <a:fillRef idx="0">
+            <a:schemeClr val="dk1"/>
+          </a:fillRef>
+          <a:effectRef idx="1">
+            <a:schemeClr val="dk1"/>
+          </a:effectRef>
+          <a:fontRef idx="minor">
+            <a:schemeClr val="tx1"/>
+          </a:fontRef>
+        </p:style>
+      </p:cxnSp>
+      <p:cxnSp>
+        <p:nvCxnSpPr>
+          <p:cNvPr id="40" name="Connector: Curved 39">
+            <a:extLst>
+              <a:ext uri="{FF2B5EF4-FFF2-40B4-BE49-F238E27FC236}">
+                <a16:creationId xmlns:a16="http://schemas.microsoft.com/office/drawing/2014/main" id="{EBF6795F-1F12-4F0C-94D0-8A790E18F545}"/>
+              </a:ext>
+            </a:extLst>
+          </p:cNvPr>
+          <p:cNvCxnSpPr>
+            <a:stCxn id="10" idx="1"/>
+            <a:endCxn id="13" idx="3"/>
+          </p:cNvCxnSpPr>
+          <p:nvPr/>
+        </p:nvCxnSpPr>
+        <p:spPr>
+          <a:xfrm rot="10800000">
+            <a:off x="3537712" y="4100830"/>
+            <a:ext cx="5009896" cy="392430"/>
+          </a:xfrm>
+          <a:prstGeom prst="curvedConnector3">
+            <a:avLst/>
+          </a:prstGeom>
+          <a:ln>
+            <a:prstDash val="dash"/>
+            <a:tailEnd type="triangle"/>
+          </a:ln>
+        </p:spPr>
+        <p:style>
+          <a:lnRef idx="2">
+            <a:schemeClr val="dk1"/>
+          </a:lnRef>
+          <a:fillRef idx="0">
+            <a:schemeClr val="dk1"/>
+          </a:fillRef>
+          <a:effectRef idx="1">
+            <a:schemeClr val="dk1"/>
+          </a:effectRef>
+          <a:fontRef idx="minor">
+            <a:schemeClr val="tx1"/>
+          </a:fontRef>
+        </p:style>
+      </p:cxnSp>
+      <p:sp>
+        <p:nvSpPr>
+          <p:cNvPr id="28" name="Rectangle: Rounded Corners 27">
+            <a:extLst>
+              <a:ext uri="{FF2B5EF4-FFF2-40B4-BE49-F238E27FC236}">
+                <a16:creationId xmlns:a16="http://schemas.microsoft.com/office/drawing/2014/main" id="{3016761B-DF87-4485-BAF6-7B08190E2202}"/>
+              </a:ext>
+            </a:extLst>
+          </p:cNvPr>
+          <p:cNvSpPr/>
+          <p:nvPr/>
+        </p:nvSpPr>
+        <p:spPr>
+          <a:xfrm>
+            <a:off x="1473201" y="1931543"/>
+            <a:ext cx="2143760" cy="777240"/>
+          </a:xfrm>
+          <a:prstGeom prst="roundRect">
+            <a:avLst/>
+          </a:prstGeom>
+        </p:spPr>
+        <p:style>
+          <a:lnRef idx="3">
+            <a:schemeClr val="lt1"/>
+          </a:lnRef>
+          <a:fillRef idx="1">
+            <a:schemeClr val="accent1"/>
+          </a:fillRef>
+          <a:effectRef idx="1">
+            <a:schemeClr val="accent1"/>
+          </a:effectRef>
+          <a:fontRef idx="minor">
+            <a:schemeClr val="lt1"/>
+          </a:fontRef>
+        </p:style>
+        <p:txBody>
+          <a:bodyPr rtlCol="0" anchor="ctr"/>
+          <a:lstStyle/>
+          <a:p>
+            <a:pPr algn="ctr"/>
+            <a:r>
+              <a:rPr lang="en-US" dirty="0"/>
+              <a:t>Sampling</a:t>
+            </a:r>
+            <a:endParaRPr lang="en-IL" dirty="0"/>
+          </a:p>
+        </p:txBody>
+      </p:sp>
+      <p:cxnSp>
+        <p:nvCxnSpPr>
+          <p:cNvPr id="18" name="Straight Arrow Connector 17">
+            <a:extLst>
+              <a:ext uri="{FF2B5EF4-FFF2-40B4-BE49-F238E27FC236}">
+                <a16:creationId xmlns:a16="http://schemas.microsoft.com/office/drawing/2014/main" id="{E7ECB003-9437-40BB-8AFC-29590F056DDC}"/>
+              </a:ext>
+            </a:extLst>
+          </p:cNvPr>
+          <p:cNvCxnSpPr>
+            <a:stCxn id="28" idx="3"/>
+          </p:cNvCxnSpPr>
+          <p:nvPr/>
+        </p:nvCxnSpPr>
+        <p:spPr>
+          <a:xfrm>
+            <a:off x="3616961" y="2320163"/>
+            <a:ext cx="1071879" cy="810387"/>
+          </a:xfrm>
+          <a:prstGeom prst="straightConnector1">
+            <a:avLst/>
+          </a:prstGeom>
+          <a:ln>
+            <a:headEnd type="triangle" w="med" len="med"/>
+            <a:tailEnd type="triangle" w="med" len="med"/>
+          </a:ln>
+        </p:spPr>
+        <p:style>
+          <a:lnRef idx="1">
+            <a:schemeClr val="dk1"/>
+          </a:lnRef>
+          <a:fillRef idx="0">
+            <a:schemeClr val="dk1"/>
+          </a:fillRef>
+          <a:effectRef idx="0">
+            <a:schemeClr val="dk1"/>
+          </a:effectRef>
+          <a:fontRef idx="minor">
+            <a:schemeClr val="tx1"/>
+          </a:fontRef>
+        </p:style>
+      </p:cxnSp>
+    </p:spTree>
+    <p:extLst>
+      <p:ext uri="{BB962C8B-B14F-4D97-AF65-F5344CB8AC3E}">
+        <p14:creationId xmlns:p14="http://schemas.microsoft.com/office/powerpoint/2010/main" val="4283902710"/>
+      </p:ext>
+    </p:extLst>
+  </p:cSld>
+  <p:clrMapOvr>
+    <a:masterClrMapping/>
+  </p:clrMapOvr>
+</p:sld>
+</file>
+
+<file path=ppt/slides/slide21.xml><?xml version="1.0" encoding="utf-8"?>
+<p:sld xmlns:a="http://schemas.openxmlformats.org/drawingml/2006/main" xmlns:r="http://schemas.openxmlformats.org/officeDocument/2006/relationships" xmlns:p="http://schemas.openxmlformats.org/presentationml/2006/main">
+  <p:cSld>
+    <p:spTree>
+      <p:nvGrpSpPr>
+        <p:cNvPr id="1" name=""/>
+        <p:cNvGrpSpPr/>
+        <p:nvPr/>
+      </p:nvGrpSpPr>
+      <p:grpSpPr>
+        <a:xfrm>
+          <a:off x="0" y="0"/>
+          <a:ext cx="0" cy="0"/>
+          <a:chOff x="0" y="0"/>
+          <a:chExt cx="0" cy="0"/>
+        </a:xfrm>
+      </p:grpSpPr>
+      <p:sp>
+        <p:nvSpPr>
+          <p:cNvPr id="2" name="Title 1">
+            <a:extLst>
+              <a:ext uri="{FF2B5EF4-FFF2-40B4-BE49-F238E27FC236}">
+                <a16:creationId xmlns:a16="http://schemas.microsoft.com/office/drawing/2014/main" id="{D8D76B96-F6C3-45F3-981B-89B2FE1CC0B3}"/>
+              </a:ext>
+            </a:extLst>
+          </p:cNvPr>
+          <p:cNvSpPr>
+            <a:spLocks noGrp="1"/>
+          </p:cNvSpPr>
+          <p:nvPr>
+            <p:ph type="title"/>
+          </p:nvPr>
+        </p:nvSpPr>
+        <p:spPr/>
+        <p:txBody>
+          <a:bodyPr/>
+          <a:lstStyle/>
+          <a:p>
+            <a:r>
+              <a:rPr lang="en-US" dirty="0"/>
+              <a:t>Sampling</a:t>
+            </a:r>
+            <a:endParaRPr lang="en-IL" dirty="0"/>
+          </a:p>
+        </p:txBody>
+      </p:sp>
+      <p:sp>
+        <p:nvSpPr>
+          <p:cNvPr id="3" name="Content Placeholder 2">
+            <a:extLst>
+              <a:ext uri="{FF2B5EF4-FFF2-40B4-BE49-F238E27FC236}">
+                <a16:creationId xmlns:a16="http://schemas.microsoft.com/office/drawing/2014/main" id="{3F742804-DAE9-449E-8842-801C77FDB6A7}"/>
+              </a:ext>
+            </a:extLst>
+          </p:cNvPr>
+          <p:cNvSpPr>
+            <a:spLocks noGrp="1"/>
+          </p:cNvSpPr>
+          <p:nvPr>
+            <p:ph idx="1"/>
+          </p:nvPr>
+        </p:nvSpPr>
+        <p:spPr>
+          <a:xfrm>
+            <a:off x="1069848" y="1862909"/>
+            <a:ext cx="10058400" cy="4309291"/>
+          </a:xfrm>
+        </p:spPr>
+        <p:txBody>
+          <a:bodyPr>
+            <a:normAutofit fontScale="85000" lnSpcReduction="10000"/>
+          </a:bodyPr>
+          <a:lstStyle/>
+          <a:p>
+            <a:pPr>
+              <a:lnSpc>
+                <a:spcPct val="150000"/>
+              </a:lnSpc>
+            </a:pPr>
+            <a:r>
+              <a:rPr lang="en-US" dirty="0"/>
+              <a:t>In most cases, we can’t compute measures on the “entire population” </a:t>
+            </a:r>
+          </a:p>
+          <a:p>
+            <a:pPr lvl="1">
+              <a:lnSpc>
+                <a:spcPct val="150000"/>
+              </a:lnSpc>
+            </a:pPr>
+            <a:r>
+              <a:rPr lang="en-US" dirty="0"/>
+              <a:t>e.g., that’s what a census does</a:t>
+            </a:r>
+          </a:p>
+          <a:p>
+            <a:pPr>
+              <a:lnSpc>
+                <a:spcPct val="150000"/>
+              </a:lnSpc>
+            </a:pPr>
+            <a:r>
+              <a:rPr lang="en-US" dirty="0"/>
+              <a:t>In such cases we sample the population: selecting observations out of a given population (a “sample”), which would represent the population, for statistical purposes</a:t>
+            </a:r>
+          </a:p>
+          <a:p>
+            <a:pPr>
+              <a:lnSpc>
+                <a:spcPct val="150000"/>
+              </a:lnSpc>
+            </a:pPr>
+            <a:r>
+              <a:rPr lang="en-US" dirty="0"/>
+              <a:t>Various methods for sampling, e.g.:</a:t>
+            </a:r>
+          </a:p>
+          <a:p>
+            <a:pPr lvl="1">
+              <a:lnSpc>
+                <a:spcPct val="150000"/>
+              </a:lnSpc>
+            </a:pPr>
+            <a:r>
+              <a:rPr lang="en-US" dirty="0"/>
+              <a:t>Random sampling</a:t>
+            </a:r>
+          </a:p>
+          <a:p>
+            <a:pPr lvl="1">
+              <a:lnSpc>
+                <a:spcPct val="150000"/>
+              </a:lnSpc>
+            </a:pPr>
+            <a:r>
+              <a:rPr lang="en-US" dirty="0"/>
+              <a:t>Layered sampling</a:t>
+            </a:r>
+          </a:p>
+          <a:p>
+            <a:pPr lvl="1">
+              <a:lnSpc>
+                <a:spcPct val="150000"/>
+              </a:lnSpc>
+            </a:pPr>
+            <a:r>
+              <a:rPr lang="en-US" dirty="0"/>
+              <a:t>Cluster sampling</a:t>
+            </a:r>
+          </a:p>
+          <a:p>
+            <a:pPr>
+              <a:lnSpc>
+                <a:spcPct val="150000"/>
+              </a:lnSpc>
+            </a:pPr>
+            <a:r>
+              <a:rPr lang="en-US" dirty="0"/>
+              <a:t>Important to make sure: avoid a method which causes bias in the sample </a:t>
+            </a:r>
+          </a:p>
+          <a:p>
+            <a:pPr lvl="1">
+              <a:lnSpc>
+                <a:spcPct val="150000"/>
+              </a:lnSpc>
+            </a:pPr>
+            <a:r>
+              <a:rPr lang="en-US" dirty="0"/>
+              <a:t>Garbage in-garbage out</a:t>
+            </a:r>
+            <a:endParaRPr lang="en-IL" dirty="0"/>
+          </a:p>
+        </p:txBody>
+      </p:sp>
+      <p:sp>
+        <p:nvSpPr>
+          <p:cNvPr id="4" name="Footer Placeholder 3">
+            <a:extLst>
+              <a:ext uri="{FF2B5EF4-FFF2-40B4-BE49-F238E27FC236}">
+                <a16:creationId xmlns:a16="http://schemas.microsoft.com/office/drawing/2014/main" id="{A18200EE-9126-4B70-8804-DABB0FE04E83}"/>
+              </a:ext>
+            </a:extLst>
+          </p:cNvPr>
+          <p:cNvSpPr>
+            <a:spLocks noGrp="1"/>
+          </p:cNvSpPr>
+          <p:nvPr>
+            <p:ph type="ftr" sz="quarter" idx="11"/>
+          </p:nvPr>
+        </p:nvSpPr>
+        <p:spPr/>
+        <p:txBody>
+          <a:bodyPr/>
+          <a:lstStyle/>
+          <a:p>
+            <a:r>
+              <a:rPr lang="en-US"/>
+              <a:t>Materials by Adi Sarid https://adisarid.github.io and http://www.sarid-ins.com</a:t>
+            </a:r>
+            <a:endParaRPr lang="en-US" dirty="0"/>
+          </a:p>
+        </p:txBody>
+      </p:sp>
+      <p:sp>
+        <p:nvSpPr>
+          <p:cNvPr id="5" name="Slide Number Placeholder 4">
+            <a:extLst>
+              <a:ext uri="{FF2B5EF4-FFF2-40B4-BE49-F238E27FC236}">
+                <a16:creationId xmlns:a16="http://schemas.microsoft.com/office/drawing/2014/main" id="{2E694C4C-689D-4FA4-ADD3-D1A2D32CC2C0}"/>
+              </a:ext>
+            </a:extLst>
+          </p:cNvPr>
+          <p:cNvSpPr>
+            <a:spLocks noGrp="1"/>
+          </p:cNvSpPr>
+          <p:nvPr>
+            <p:ph type="sldNum" sz="quarter" idx="12"/>
+          </p:nvPr>
+        </p:nvSpPr>
+        <p:spPr/>
+        <p:txBody>
+          <a:bodyPr/>
+          <a:lstStyle/>
+          <a:p>
+            <a:fld id="{4FAB73BC-B049-4115-A692-8D63A059BFB8}" type="slidenum">
+              <a:rPr lang="en-US" smtClean="0"/>
+              <a:t>21</a:t>
+            </a:fld>
+            <a:endParaRPr lang="en-US" dirty="0"/>
+          </a:p>
+        </p:txBody>
+      </p:sp>
+      <p:grpSp>
+        <p:nvGrpSpPr>
+          <p:cNvPr id="38" name="Group 37">
+            <a:extLst>
+              <a:ext uri="{FF2B5EF4-FFF2-40B4-BE49-F238E27FC236}">
+                <a16:creationId xmlns:a16="http://schemas.microsoft.com/office/drawing/2014/main" id="{5D901377-1A77-4F15-9D22-7E4EA3142166}"/>
+              </a:ext>
+            </a:extLst>
+          </p:cNvPr>
+          <p:cNvGrpSpPr/>
+          <p:nvPr/>
+        </p:nvGrpSpPr>
+        <p:grpSpPr>
+          <a:xfrm>
+            <a:off x="8039338" y="3821324"/>
+            <a:ext cx="3759470" cy="1592361"/>
+            <a:chOff x="8242953" y="3638525"/>
+            <a:chExt cx="3759470" cy="1592361"/>
+          </a:xfrm>
+        </p:grpSpPr>
+        <p:grpSp>
+          <p:nvGrpSpPr>
+            <p:cNvPr id="35" name="Group 34">
+              <a:extLst>
+                <a:ext uri="{FF2B5EF4-FFF2-40B4-BE49-F238E27FC236}">
+                  <a16:creationId xmlns:a16="http://schemas.microsoft.com/office/drawing/2014/main" id="{BB8F346A-4F45-4E0F-BBC4-9A1527881D73}"/>
+                </a:ext>
+              </a:extLst>
+            </p:cNvPr>
+            <p:cNvGrpSpPr/>
+            <p:nvPr/>
+          </p:nvGrpSpPr>
+          <p:grpSpPr>
+            <a:xfrm>
+              <a:off x="9152128" y="3638525"/>
+              <a:ext cx="2599944" cy="1282979"/>
+              <a:chOff x="6278880" y="4145280"/>
+              <a:chExt cx="3108960" cy="1534160"/>
+            </a:xfrm>
+          </p:grpSpPr>
+          <p:sp>
+            <p:nvSpPr>
+              <p:cNvPr id="6" name="Oval 5">
+                <a:extLst>
+                  <a:ext uri="{FF2B5EF4-FFF2-40B4-BE49-F238E27FC236}">
+                    <a16:creationId xmlns:a16="http://schemas.microsoft.com/office/drawing/2014/main" id="{8F68580B-F2E6-40E7-AECE-7662B8B23091}"/>
+                  </a:ext>
+                </a:extLst>
+              </p:cNvPr>
+              <p:cNvSpPr/>
+              <p:nvPr/>
+            </p:nvSpPr>
+            <p:spPr>
+              <a:xfrm>
+                <a:off x="6278880" y="4145280"/>
+                <a:ext cx="924560" cy="1534160"/>
+              </a:xfrm>
+              <a:prstGeom prst="ellipse">
+                <a:avLst/>
+              </a:prstGeom>
+            </p:spPr>
+            <p:style>
+              <a:lnRef idx="2">
+                <a:schemeClr val="accent1"/>
+              </a:lnRef>
+              <a:fillRef idx="1">
+                <a:schemeClr val="lt1"/>
+              </a:fillRef>
+              <a:effectRef idx="0">
+                <a:schemeClr val="accent1"/>
+              </a:effectRef>
+              <a:fontRef idx="minor">
+                <a:schemeClr val="dk1"/>
+              </a:fontRef>
+            </p:style>
+            <p:txBody>
+              <a:bodyPr rtlCol="0" anchor="ctr"/>
+              <a:lstStyle/>
+              <a:p>
+                <a:pPr algn="ctr"/>
+                <a:endParaRPr lang="en-IL"/>
+              </a:p>
+            </p:txBody>
+          </p:sp>
+          <p:sp>
+            <p:nvSpPr>
+              <p:cNvPr id="7" name="Oval 6">
+                <a:extLst>
+                  <a:ext uri="{FF2B5EF4-FFF2-40B4-BE49-F238E27FC236}">
+                    <a16:creationId xmlns:a16="http://schemas.microsoft.com/office/drawing/2014/main" id="{C85AB257-DB53-41CB-A15A-CB415C25BEBF}"/>
+                  </a:ext>
+                </a:extLst>
+              </p:cNvPr>
+              <p:cNvSpPr/>
+              <p:nvPr/>
+            </p:nvSpPr>
+            <p:spPr>
+              <a:xfrm>
+                <a:off x="6536944" y="4358640"/>
+                <a:ext cx="203200" cy="203200"/>
+              </a:xfrm>
+              <a:prstGeom prst="ellipse">
+                <a:avLst/>
+              </a:prstGeom>
+            </p:spPr>
+            <p:style>
+              <a:lnRef idx="2">
+                <a:schemeClr val="accent1">
+                  <a:shade val="50000"/>
+                </a:schemeClr>
+              </a:lnRef>
+              <a:fillRef idx="1">
+                <a:schemeClr val="accent1"/>
+              </a:fillRef>
+              <a:effectRef idx="0">
+                <a:schemeClr val="accent1"/>
+              </a:effectRef>
+              <a:fontRef idx="minor">
+                <a:schemeClr val="lt1"/>
+              </a:fontRef>
+            </p:style>
+            <p:txBody>
+              <a:bodyPr rtlCol="0" anchor="ctr"/>
+              <a:lstStyle/>
+              <a:p>
+                <a:pPr algn="ctr"/>
+                <a:endParaRPr lang="en-IL"/>
+              </a:p>
+            </p:txBody>
+          </p:sp>
+          <p:sp>
+            <p:nvSpPr>
+              <p:cNvPr id="8" name="Oval 7">
+                <a:extLst>
+                  <a:ext uri="{FF2B5EF4-FFF2-40B4-BE49-F238E27FC236}">
+                    <a16:creationId xmlns:a16="http://schemas.microsoft.com/office/drawing/2014/main" id="{A57E5773-C70B-4183-83D6-4022D2E76470}"/>
+                  </a:ext>
+                </a:extLst>
+              </p:cNvPr>
+              <p:cNvSpPr/>
+              <p:nvPr/>
+            </p:nvSpPr>
+            <p:spPr>
+              <a:xfrm>
+                <a:off x="6870192" y="4460240"/>
+                <a:ext cx="203200" cy="203200"/>
+              </a:xfrm>
+              <a:prstGeom prst="ellipse">
+                <a:avLst/>
+              </a:prstGeom>
+            </p:spPr>
+            <p:style>
+              <a:lnRef idx="2">
+                <a:schemeClr val="accent1">
+                  <a:shade val="50000"/>
+                </a:schemeClr>
+              </a:lnRef>
+              <a:fillRef idx="1">
+                <a:schemeClr val="accent1"/>
+              </a:fillRef>
+              <a:effectRef idx="0">
+                <a:schemeClr val="accent1"/>
+              </a:effectRef>
+              <a:fontRef idx="minor">
+                <a:schemeClr val="lt1"/>
+              </a:fontRef>
+            </p:style>
+            <p:txBody>
+              <a:bodyPr rtlCol="0" anchor="ctr"/>
+              <a:lstStyle/>
+              <a:p>
+                <a:pPr algn="ctr"/>
+                <a:endParaRPr lang="en-IL"/>
+              </a:p>
+            </p:txBody>
+          </p:sp>
+          <p:sp>
+            <p:nvSpPr>
+              <p:cNvPr id="9" name="Oval 8">
+                <a:extLst>
+                  <a:ext uri="{FF2B5EF4-FFF2-40B4-BE49-F238E27FC236}">
+                    <a16:creationId xmlns:a16="http://schemas.microsoft.com/office/drawing/2014/main" id="{9A613DEB-EE49-4147-AC7D-E0637C3E5555}"/>
+                  </a:ext>
+                </a:extLst>
+              </p:cNvPr>
+              <p:cNvSpPr/>
+              <p:nvPr/>
+            </p:nvSpPr>
+            <p:spPr>
+              <a:xfrm>
+                <a:off x="6536944" y="4662424"/>
+                <a:ext cx="203200" cy="203200"/>
+              </a:xfrm>
+              <a:prstGeom prst="ellipse">
+                <a:avLst/>
+              </a:prstGeom>
+            </p:spPr>
+            <p:style>
+              <a:lnRef idx="2">
+                <a:schemeClr val="accent1">
+                  <a:shade val="50000"/>
+                </a:schemeClr>
+              </a:lnRef>
+              <a:fillRef idx="1">
+                <a:schemeClr val="accent1"/>
+              </a:fillRef>
+              <a:effectRef idx="0">
+                <a:schemeClr val="accent1"/>
+              </a:effectRef>
+              <a:fontRef idx="minor">
+                <a:schemeClr val="lt1"/>
+              </a:fontRef>
+            </p:style>
+            <p:txBody>
+              <a:bodyPr rtlCol="0" anchor="ctr"/>
+              <a:lstStyle/>
+              <a:p>
+                <a:pPr algn="ctr"/>
+                <a:endParaRPr lang="en-IL"/>
+              </a:p>
+            </p:txBody>
+          </p:sp>
+          <p:sp>
+            <p:nvSpPr>
+              <p:cNvPr id="10" name="Oval 9">
+                <a:extLst>
+                  <a:ext uri="{FF2B5EF4-FFF2-40B4-BE49-F238E27FC236}">
+                    <a16:creationId xmlns:a16="http://schemas.microsoft.com/office/drawing/2014/main" id="{C612AC1B-0173-4E6E-8CBF-DF32F4D68EDC}"/>
+                  </a:ext>
+                </a:extLst>
+              </p:cNvPr>
+              <p:cNvSpPr/>
+              <p:nvPr/>
+            </p:nvSpPr>
+            <p:spPr>
+              <a:xfrm>
+                <a:off x="6536944" y="4969256"/>
+                <a:ext cx="203200" cy="203200"/>
+              </a:xfrm>
+              <a:prstGeom prst="ellipse">
+                <a:avLst/>
+              </a:prstGeom>
+            </p:spPr>
+            <p:style>
+              <a:lnRef idx="2">
+                <a:schemeClr val="accent1">
+                  <a:shade val="50000"/>
+                </a:schemeClr>
+              </a:lnRef>
+              <a:fillRef idx="1">
+                <a:schemeClr val="accent1"/>
+              </a:fillRef>
+              <a:effectRef idx="0">
+                <a:schemeClr val="accent1"/>
+              </a:effectRef>
+              <a:fontRef idx="minor">
+                <a:schemeClr val="lt1"/>
+              </a:fontRef>
+            </p:style>
+            <p:txBody>
+              <a:bodyPr rtlCol="0" anchor="ctr"/>
+              <a:lstStyle/>
+              <a:p>
+                <a:pPr algn="ctr"/>
+                <a:endParaRPr lang="en-IL"/>
+              </a:p>
+            </p:txBody>
+          </p:sp>
+          <p:sp>
+            <p:nvSpPr>
+              <p:cNvPr id="11" name="Oval 10">
+                <a:extLst>
+                  <a:ext uri="{FF2B5EF4-FFF2-40B4-BE49-F238E27FC236}">
+                    <a16:creationId xmlns:a16="http://schemas.microsoft.com/office/drawing/2014/main" id="{462D6033-B0A0-4153-855E-B3574C975903}"/>
+                  </a:ext>
+                </a:extLst>
+              </p:cNvPr>
+              <p:cNvSpPr/>
+              <p:nvPr/>
+            </p:nvSpPr>
+            <p:spPr>
+              <a:xfrm>
+                <a:off x="6870192" y="5070856"/>
+                <a:ext cx="203200" cy="203200"/>
+              </a:xfrm>
+              <a:prstGeom prst="ellipse">
+                <a:avLst/>
+              </a:prstGeom>
+            </p:spPr>
+            <p:style>
+              <a:lnRef idx="2">
+                <a:schemeClr val="accent1">
+                  <a:shade val="50000"/>
+                </a:schemeClr>
+              </a:lnRef>
+              <a:fillRef idx="1">
+                <a:schemeClr val="accent1"/>
+              </a:fillRef>
+              <a:effectRef idx="0">
+                <a:schemeClr val="accent1"/>
+              </a:effectRef>
+              <a:fontRef idx="minor">
+                <a:schemeClr val="lt1"/>
+              </a:fontRef>
+            </p:style>
+            <p:txBody>
+              <a:bodyPr rtlCol="0" anchor="ctr"/>
+              <a:lstStyle/>
+              <a:p>
+                <a:pPr algn="ctr"/>
+                <a:endParaRPr lang="en-IL"/>
+              </a:p>
+            </p:txBody>
+          </p:sp>
+          <p:sp>
+            <p:nvSpPr>
+              <p:cNvPr id="12" name="Oval 11">
+                <a:extLst>
+                  <a:ext uri="{FF2B5EF4-FFF2-40B4-BE49-F238E27FC236}">
+                    <a16:creationId xmlns:a16="http://schemas.microsoft.com/office/drawing/2014/main" id="{F3B30C48-78DE-4B75-883C-37C322EF63DF}"/>
+                  </a:ext>
+                </a:extLst>
+              </p:cNvPr>
+              <p:cNvSpPr/>
+              <p:nvPr/>
+            </p:nvSpPr>
+            <p:spPr>
+              <a:xfrm>
+                <a:off x="6536944" y="5273040"/>
+                <a:ext cx="203200" cy="203200"/>
+              </a:xfrm>
+              <a:prstGeom prst="ellipse">
+                <a:avLst/>
+              </a:prstGeom>
+            </p:spPr>
+            <p:style>
+              <a:lnRef idx="2">
+                <a:schemeClr val="accent1">
+                  <a:shade val="50000"/>
+                </a:schemeClr>
+              </a:lnRef>
+              <a:fillRef idx="1">
+                <a:schemeClr val="accent1"/>
+              </a:fillRef>
+              <a:effectRef idx="0">
+                <a:schemeClr val="accent1"/>
+              </a:effectRef>
+              <a:fontRef idx="minor">
+                <a:schemeClr val="lt1"/>
+              </a:fontRef>
+            </p:style>
+            <p:txBody>
+              <a:bodyPr rtlCol="0" anchor="ctr"/>
+              <a:lstStyle/>
+              <a:p>
+                <a:pPr algn="ctr"/>
+                <a:endParaRPr lang="en-IL"/>
+              </a:p>
+            </p:txBody>
+          </p:sp>
+          <p:sp>
+            <p:nvSpPr>
+              <p:cNvPr id="13" name="Oval 12">
+                <a:extLst>
+                  <a:ext uri="{FF2B5EF4-FFF2-40B4-BE49-F238E27FC236}">
+                    <a16:creationId xmlns:a16="http://schemas.microsoft.com/office/drawing/2014/main" id="{2A3E9C28-27C4-4D68-95A2-3BADA177E395}"/>
+                  </a:ext>
+                </a:extLst>
+              </p:cNvPr>
+              <p:cNvSpPr/>
+              <p:nvPr/>
+            </p:nvSpPr>
+            <p:spPr>
+              <a:xfrm>
+                <a:off x="6870192" y="4744720"/>
+                <a:ext cx="203200" cy="203200"/>
+              </a:xfrm>
+              <a:prstGeom prst="ellipse">
+                <a:avLst/>
+              </a:prstGeom>
+            </p:spPr>
+            <p:style>
+              <a:lnRef idx="2">
+                <a:schemeClr val="accent1">
+                  <a:shade val="50000"/>
+                </a:schemeClr>
+              </a:lnRef>
+              <a:fillRef idx="1">
+                <a:schemeClr val="accent1"/>
+              </a:fillRef>
+              <a:effectRef idx="0">
+                <a:schemeClr val="accent1"/>
+              </a:effectRef>
+              <a:fontRef idx="minor">
+                <a:schemeClr val="lt1"/>
+              </a:fontRef>
+            </p:style>
+            <p:txBody>
+              <a:bodyPr rtlCol="0" anchor="ctr"/>
+              <a:lstStyle/>
+              <a:p>
+                <a:pPr algn="ctr"/>
+                <a:endParaRPr lang="en-IL"/>
+              </a:p>
+            </p:txBody>
+          </p:sp>
+          <p:sp>
+            <p:nvSpPr>
+              <p:cNvPr id="14" name="Oval 13">
+                <a:extLst>
+                  <a:ext uri="{FF2B5EF4-FFF2-40B4-BE49-F238E27FC236}">
+                    <a16:creationId xmlns:a16="http://schemas.microsoft.com/office/drawing/2014/main" id="{48879394-C20A-4378-A192-9190BF9D66AD}"/>
+                  </a:ext>
+                </a:extLst>
+              </p:cNvPr>
+              <p:cNvSpPr/>
+              <p:nvPr/>
+            </p:nvSpPr>
+            <p:spPr>
+              <a:xfrm>
+                <a:off x="6305296" y="4810760"/>
+                <a:ext cx="203200" cy="203200"/>
+              </a:xfrm>
+              <a:prstGeom prst="ellipse">
+                <a:avLst/>
+              </a:prstGeom>
+            </p:spPr>
+            <p:style>
+              <a:lnRef idx="2">
+                <a:schemeClr val="accent1">
+                  <a:shade val="50000"/>
+                </a:schemeClr>
+              </a:lnRef>
+              <a:fillRef idx="1">
+                <a:schemeClr val="accent1"/>
+              </a:fillRef>
+              <a:effectRef idx="0">
+                <a:schemeClr val="accent1"/>
+              </a:effectRef>
+              <a:fontRef idx="minor">
+                <a:schemeClr val="lt1"/>
+              </a:fontRef>
+            </p:style>
+            <p:txBody>
+              <a:bodyPr rtlCol="0" anchor="ctr"/>
+              <a:lstStyle/>
+              <a:p>
+                <a:pPr algn="ctr"/>
+                <a:endParaRPr lang="en-IL"/>
+              </a:p>
+            </p:txBody>
+          </p:sp>
+          <p:sp>
+            <p:nvSpPr>
+              <p:cNvPr id="15" name="Oval 14">
+                <a:extLst>
+                  <a:ext uri="{FF2B5EF4-FFF2-40B4-BE49-F238E27FC236}">
+                    <a16:creationId xmlns:a16="http://schemas.microsoft.com/office/drawing/2014/main" id="{F7468C45-6A1A-4C37-B4A2-E0C3EB304408}"/>
+                  </a:ext>
+                </a:extLst>
+              </p:cNvPr>
+              <p:cNvSpPr/>
+              <p:nvPr/>
+            </p:nvSpPr>
+            <p:spPr>
+              <a:xfrm>
+                <a:off x="6768592" y="5317236"/>
+                <a:ext cx="203200" cy="203200"/>
+              </a:xfrm>
+              <a:prstGeom prst="ellipse">
+                <a:avLst/>
+              </a:prstGeom>
+            </p:spPr>
+            <p:style>
+              <a:lnRef idx="2">
+                <a:schemeClr val="accent1">
+                  <a:shade val="50000"/>
+                </a:schemeClr>
+              </a:lnRef>
+              <a:fillRef idx="1">
+                <a:schemeClr val="accent1"/>
+              </a:fillRef>
+              <a:effectRef idx="0">
+                <a:schemeClr val="accent1"/>
+              </a:effectRef>
+              <a:fontRef idx="minor">
+                <a:schemeClr val="lt1"/>
+              </a:fontRef>
+            </p:style>
+            <p:txBody>
+              <a:bodyPr rtlCol="0" anchor="ctr"/>
+              <a:lstStyle/>
+              <a:p>
+                <a:pPr algn="ctr"/>
+                <a:endParaRPr lang="en-IL"/>
+              </a:p>
+            </p:txBody>
+          </p:sp>
+          <p:sp>
+            <p:nvSpPr>
+              <p:cNvPr id="17" name="Oval 16">
+                <a:extLst>
+                  <a:ext uri="{FF2B5EF4-FFF2-40B4-BE49-F238E27FC236}">
+                    <a16:creationId xmlns:a16="http://schemas.microsoft.com/office/drawing/2014/main" id="{72B22722-2D86-42D7-B2DF-3EFF64E2F0A0}"/>
+                  </a:ext>
+                </a:extLst>
+              </p:cNvPr>
+              <p:cNvSpPr/>
+              <p:nvPr/>
+            </p:nvSpPr>
+            <p:spPr>
+              <a:xfrm>
+                <a:off x="8721726" y="4359705"/>
+                <a:ext cx="666114" cy="1105310"/>
+              </a:xfrm>
+              <a:prstGeom prst="ellipse">
+                <a:avLst/>
+              </a:prstGeom>
+            </p:spPr>
+            <p:style>
+              <a:lnRef idx="2">
+                <a:schemeClr val="accent1"/>
+              </a:lnRef>
+              <a:fillRef idx="1">
+                <a:schemeClr val="lt1"/>
+              </a:fillRef>
+              <a:effectRef idx="0">
+                <a:schemeClr val="accent1"/>
+              </a:effectRef>
+              <a:fontRef idx="minor">
+                <a:schemeClr val="dk1"/>
+              </a:fontRef>
+            </p:style>
+            <p:txBody>
+              <a:bodyPr rtlCol="0" anchor="ctr"/>
+              <a:lstStyle/>
+              <a:p>
+                <a:pPr algn="ctr"/>
+                <a:endParaRPr lang="en-IL"/>
+              </a:p>
+            </p:txBody>
+          </p:sp>
+          <p:sp>
+            <p:nvSpPr>
+              <p:cNvPr id="18" name="Oval 17">
+                <a:extLst>
+                  <a:ext uri="{FF2B5EF4-FFF2-40B4-BE49-F238E27FC236}">
+                    <a16:creationId xmlns:a16="http://schemas.microsoft.com/office/drawing/2014/main" id="{74F3B20C-2BB9-4907-A100-FE4B4BC2592C}"/>
+                  </a:ext>
+                </a:extLst>
+              </p:cNvPr>
+              <p:cNvSpPr/>
+              <p:nvPr/>
+            </p:nvSpPr>
+            <p:spPr>
+              <a:xfrm>
+                <a:off x="9045956" y="4531360"/>
+                <a:ext cx="203200" cy="203200"/>
+              </a:xfrm>
+              <a:prstGeom prst="ellipse">
+                <a:avLst/>
+              </a:prstGeom>
+            </p:spPr>
+            <p:style>
+              <a:lnRef idx="2">
+                <a:schemeClr val="accent1">
+                  <a:shade val="50000"/>
+                </a:schemeClr>
+              </a:lnRef>
+              <a:fillRef idx="1">
+                <a:schemeClr val="accent1"/>
+              </a:fillRef>
+              <a:effectRef idx="0">
+                <a:schemeClr val="accent1"/>
+              </a:effectRef>
+              <a:fontRef idx="minor">
+                <a:schemeClr val="lt1"/>
+              </a:fontRef>
+            </p:style>
+            <p:txBody>
+              <a:bodyPr rtlCol="0" anchor="ctr"/>
+              <a:lstStyle/>
+              <a:p>
+                <a:pPr algn="ctr"/>
+                <a:endParaRPr lang="en-IL"/>
+              </a:p>
+            </p:txBody>
+          </p:sp>
+          <p:sp>
+            <p:nvSpPr>
+              <p:cNvPr id="19" name="Oval 18">
+                <a:extLst>
+                  <a:ext uri="{FF2B5EF4-FFF2-40B4-BE49-F238E27FC236}">
+                    <a16:creationId xmlns:a16="http://schemas.microsoft.com/office/drawing/2014/main" id="{4B9F46AD-A994-4E32-AE9E-C3763F99C48C}"/>
+                  </a:ext>
+                </a:extLst>
+              </p:cNvPr>
+              <p:cNvSpPr/>
+              <p:nvPr/>
+            </p:nvSpPr>
+            <p:spPr>
+              <a:xfrm>
+                <a:off x="8842756" y="4764024"/>
+                <a:ext cx="203200" cy="203200"/>
+              </a:xfrm>
+              <a:prstGeom prst="ellipse">
+                <a:avLst/>
+              </a:prstGeom>
+            </p:spPr>
+            <p:style>
+              <a:lnRef idx="2">
+                <a:schemeClr val="accent1">
+                  <a:shade val="50000"/>
+                </a:schemeClr>
+              </a:lnRef>
+              <a:fillRef idx="1">
+                <a:schemeClr val="accent1"/>
+              </a:fillRef>
+              <a:effectRef idx="0">
+                <a:schemeClr val="accent1"/>
+              </a:effectRef>
+              <a:fontRef idx="minor">
+                <a:schemeClr val="lt1"/>
+              </a:fontRef>
+            </p:style>
+            <p:txBody>
+              <a:bodyPr rtlCol="0" anchor="ctr"/>
+              <a:lstStyle/>
+              <a:p>
+                <a:pPr algn="ctr"/>
+                <a:endParaRPr lang="en-IL"/>
+              </a:p>
+            </p:txBody>
+          </p:sp>
+          <p:sp>
+            <p:nvSpPr>
+              <p:cNvPr id="20" name="Oval 19">
+                <a:extLst>
+                  <a:ext uri="{FF2B5EF4-FFF2-40B4-BE49-F238E27FC236}">
+                    <a16:creationId xmlns:a16="http://schemas.microsoft.com/office/drawing/2014/main" id="{80CF7676-EDA5-45F8-B647-649BBBBCF635}"/>
+                  </a:ext>
+                </a:extLst>
+              </p:cNvPr>
+              <p:cNvSpPr/>
+              <p:nvPr/>
+            </p:nvSpPr>
+            <p:spPr>
+              <a:xfrm>
+                <a:off x="9115298" y="4846320"/>
+                <a:ext cx="203200" cy="203200"/>
+              </a:xfrm>
+              <a:prstGeom prst="ellipse">
+                <a:avLst/>
+              </a:prstGeom>
+            </p:spPr>
+            <p:style>
+              <a:lnRef idx="2">
+                <a:schemeClr val="accent1">
+                  <a:shade val="50000"/>
+                </a:schemeClr>
+              </a:lnRef>
+              <a:fillRef idx="1">
+                <a:schemeClr val="accent1"/>
+              </a:fillRef>
+              <a:effectRef idx="0">
+                <a:schemeClr val="accent1"/>
+              </a:effectRef>
+              <a:fontRef idx="minor">
+                <a:schemeClr val="lt1"/>
+              </a:fontRef>
+            </p:style>
+            <p:txBody>
+              <a:bodyPr rtlCol="0" anchor="ctr"/>
+              <a:lstStyle/>
+              <a:p>
+                <a:pPr algn="ctr"/>
+                <a:endParaRPr lang="en-IL"/>
+              </a:p>
+            </p:txBody>
+          </p:sp>
+          <p:sp>
+            <p:nvSpPr>
+              <p:cNvPr id="21" name="Oval 20">
+                <a:extLst>
+                  <a:ext uri="{FF2B5EF4-FFF2-40B4-BE49-F238E27FC236}">
+                    <a16:creationId xmlns:a16="http://schemas.microsoft.com/office/drawing/2014/main" id="{BFB961F2-F348-41B3-9E14-87320FBAFB1D}"/>
+                  </a:ext>
+                </a:extLst>
+              </p:cNvPr>
+              <p:cNvSpPr/>
+              <p:nvPr/>
+            </p:nvSpPr>
+            <p:spPr>
+              <a:xfrm>
+                <a:off x="8865108" y="5143426"/>
+                <a:ext cx="203200" cy="203200"/>
+              </a:xfrm>
+              <a:prstGeom prst="ellipse">
+                <a:avLst/>
+              </a:prstGeom>
+            </p:spPr>
+            <p:style>
+              <a:lnRef idx="2">
+                <a:schemeClr val="accent1">
+                  <a:shade val="50000"/>
+                </a:schemeClr>
+              </a:lnRef>
+              <a:fillRef idx="1">
+                <a:schemeClr val="accent1"/>
+              </a:fillRef>
+              <a:effectRef idx="0">
+                <a:schemeClr val="accent1"/>
+              </a:effectRef>
+              <a:fontRef idx="minor">
+                <a:schemeClr val="lt1"/>
+              </a:fontRef>
+            </p:style>
+            <p:txBody>
+              <a:bodyPr rtlCol="0" anchor="ctr"/>
+              <a:lstStyle/>
+              <a:p>
+                <a:pPr algn="ctr"/>
+                <a:endParaRPr lang="en-IL"/>
+              </a:p>
+            </p:txBody>
+          </p:sp>
+          <p:cxnSp>
+            <p:nvCxnSpPr>
+              <p:cNvPr id="23" name="Connector: Curved 22">
+                <a:extLst>
+                  <a:ext uri="{FF2B5EF4-FFF2-40B4-BE49-F238E27FC236}">
+                    <a16:creationId xmlns:a16="http://schemas.microsoft.com/office/drawing/2014/main" id="{1CD35406-35ED-461D-9F46-B333846EC078}"/>
+                  </a:ext>
+                </a:extLst>
+              </p:cNvPr>
+              <p:cNvCxnSpPr>
+                <a:cxnSpLocks/>
+                <a:stCxn id="8" idx="7"/>
+                <a:endCxn id="18" idx="1"/>
+              </p:cNvCxnSpPr>
+              <p:nvPr/>
+            </p:nvCxnSpPr>
+            <p:spPr>
+              <a:xfrm rot="16200000" flipH="1">
+                <a:off x="8024114" y="3509518"/>
+                <a:ext cx="71120" cy="2032080"/>
+              </a:xfrm>
+              <a:prstGeom prst="curvedConnector3">
+                <a:avLst>
+                  <a:gd name="adj1" fmla="val -363271"/>
+                </a:avLst>
+              </a:prstGeom>
+              <a:ln>
+                <a:tailEnd type="triangle"/>
+              </a:ln>
+            </p:spPr>
+            <p:style>
+              <a:lnRef idx="1">
+                <a:schemeClr val="dk1"/>
+              </a:lnRef>
+              <a:fillRef idx="0">
+                <a:schemeClr val="dk1"/>
+              </a:fillRef>
+              <a:effectRef idx="0">
+                <a:schemeClr val="dk1"/>
+              </a:effectRef>
+              <a:fontRef idx="minor">
+                <a:schemeClr val="tx1"/>
+              </a:fontRef>
+            </p:style>
+          </p:cxnSp>
+          <p:cxnSp>
+            <p:nvCxnSpPr>
+              <p:cNvPr id="26" name="Connector: Curved 25">
+                <a:extLst>
+                  <a:ext uri="{FF2B5EF4-FFF2-40B4-BE49-F238E27FC236}">
+                    <a16:creationId xmlns:a16="http://schemas.microsoft.com/office/drawing/2014/main" id="{D4940C94-7A52-457C-B7BC-668C3E91C6C9}"/>
+                  </a:ext>
+                </a:extLst>
+              </p:cNvPr>
+              <p:cNvCxnSpPr>
+                <a:stCxn id="15" idx="5"/>
+                <a:endCxn id="21" idx="3"/>
+              </p:cNvCxnSpPr>
+              <p:nvPr/>
+            </p:nvCxnSpPr>
+            <p:spPr>
+              <a:xfrm rot="5400000" flipH="1" flipV="1">
+                <a:off x="7831545" y="4427357"/>
+                <a:ext cx="173810" cy="1952832"/>
+              </a:xfrm>
+              <a:prstGeom prst="curvedConnector3">
+                <a:avLst>
+                  <a:gd name="adj1" fmla="val -148644"/>
+                </a:avLst>
+              </a:prstGeom>
+              <a:ln>
+                <a:tailEnd type="triangle"/>
+              </a:ln>
+            </p:spPr>
+            <p:style>
+              <a:lnRef idx="1">
+                <a:schemeClr val="dk1"/>
+              </a:lnRef>
+              <a:fillRef idx="0">
+                <a:schemeClr val="dk1"/>
+              </a:fillRef>
+              <a:effectRef idx="0">
+                <a:schemeClr val="dk1"/>
+              </a:effectRef>
+              <a:fontRef idx="minor">
+                <a:schemeClr val="tx1"/>
+              </a:fontRef>
+            </p:style>
+          </p:cxnSp>
+          <p:cxnSp>
+            <p:nvCxnSpPr>
+              <p:cNvPr id="28" name="Connector: Curved 27">
+                <a:extLst>
+                  <a:ext uri="{FF2B5EF4-FFF2-40B4-BE49-F238E27FC236}">
+                    <a16:creationId xmlns:a16="http://schemas.microsoft.com/office/drawing/2014/main" id="{4C9C8C07-C3A9-4C1B-832C-60C009C6FB03}"/>
+                  </a:ext>
+                </a:extLst>
+              </p:cNvPr>
+              <p:cNvCxnSpPr>
+                <a:stCxn id="13" idx="6"/>
+                <a:endCxn id="20" idx="3"/>
+              </p:cNvCxnSpPr>
+              <p:nvPr/>
+            </p:nvCxnSpPr>
+            <p:spPr>
+              <a:xfrm>
+                <a:off x="7073392" y="4846320"/>
+                <a:ext cx="2071664" cy="173442"/>
+              </a:xfrm>
+              <a:prstGeom prst="curvedConnector4">
+                <a:avLst>
+                  <a:gd name="adj1" fmla="val 21328"/>
+                  <a:gd name="adj2" fmla="val 161508"/>
+                </a:avLst>
+              </a:prstGeom>
+              <a:ln>
+                <a:tailEnd type="triangle"/>
+              </a:ln>
+            </p:spPr>
+            <p:style>
+              <a:lnRef idx="1">
+                <a:schemeClr val="dk1"/>
+              </a:lnRef>
+              <a:fillRef idx="0">
+                <a:schemeClr val="dk1"/>
+              </a:fillRef>
+              <a:effectRef idx="0">
+                <a:schemeClr val="dk1"/>
+              </a:effectRef>
+              <a:fontRef idx="minor">
+                <a:schemeClr val="tx1"/>
+              </a:fontRef>
+            </p:style>
+          </p:cxnSp>
+          <p:cxnSp>
+            <p:nvCxnSpPr>
+              <p:cNvPr id="32" name="Connector: Curved 31">
+                <a:extLst>
+                  <a:ext uri="{FF2B5EF4-FFF2-40B4-BE49-F238E27FC236}">
+                    <a16:creationId xmlns:a16="http://schemas.microsoft.com/office/drawing/2014/main" id="{DD12478F-FE3E-4499-AD6E-E1D508B424F3}"/>
+                  </a:ext>
+                </a:extLst>
+              </p:cNvPr>
+              <p:cNvCxnSpPr>
+                <a:stCxn id="14" idx="1"/>
+                <a:endCxn id="19" idx="1"/>
+              </p:cNvCxnSpPr>
+              <p:nvPr/>
+            </p:nvCxnSpPr>
+            <p:spPr>
+              <a:xfrm rot="5400000" flipH="1" flipV="1">
+                <a:off x="7580416" y="3548420"/>
+                <a:ext cx="46736" cy="2537460"/>
+              </a:xfrm>
+              <a:prstGeom prst="curvedConnector3">
+                <a:avLst>
+                  <a:gd name="adj1" fmla="val 565846"/>
+                </a:avLst>
+              </a:prstGeom>
+              <a:ln>
+                <a:tailEnd type="triangle"/>
+              </a:ln>
+            </p:spPr>
+            <p:style>
+              <a:lnRef idx="1">
+                <a:schemeClr val="dk1"/>
+              </a:lnRef>
+              <a:fillRef idx="0">
+                <a:schemeClr val="dk1"/>
+              </a:fillRef>
+              <a:effectRef idx="0">
+                <a:schemeClr val="dk1"/>
+              </a:effectRef>
+              <a:fontRef idx="minor">
+                <a:schemeClr val="tx1"/>
+              </a:fontRef>
+            </p:style>
+          </p:cxnSp>
+        </p:grpSp>
+        <p:sp>
+          <p:nvSpPr>
+            <p:cNvPr id="36" name="TextBox 35">
+              <a:extLst>
+                <a:ext uri="{FF2B5EF4-FFF2-40B4-BE49-F238E27FC236}">
+                  <a16:creationId xmlns:a16="http://schemas.microsoft.com/office/drawing/2014/main" id="{CE71A719-75FD-48FA-8B6B-F09EAE5CD687}"/>
+                </a:ext>
+              </a:extLst>
+            </p:cNvPr>
+            <p:cNvSpPr txBox="1"/>
+            <p:nvPr/>
+          </p:nvSpPr>
+          <p:spPr>
+            <a:xfrm>
+              <a:off x="8242953" y="4696574"/>
+              <a:ext cx="995785" cy="276999"/>
+            </a:xfrm>
+            <a:prstGeom prst="rect">
+              <a:avLst/>
+            </a:prstGeom>
+            <a:noFill/>
+          </p:spPr>
+          <p:txBody>
+            <a:bodyPr wrap="none" rtlCol="0">
+              <a:spAutoFit/>
+            </a:bodyPr>
+            <a:lstStyle/>
+            <a:p>
+              <a:r>
+                <a:rPr lang="en-US" sz="1200" dirty="0"/>
+                <a:t>Population</a:t>
+              </a:r>
+              <a:endParaRPr lang="en-IL" sz="1200" dirty="0"/>
+            </a:p>
+          </p:txBody>
+        </p:sp>
+        <p:sp>
+          <p:nvSpPr>
+            <p:cNvPr id="37" name="TextBox 36">
+              <a:extLst>
+                <a:ext uri="{FF2B5EF4-FFF2-40B4-BE49-F238E27FC236}">
+                  <a16:creationId xmlns:a16="http://schemas.microsoft.com/office/drawing/2014/main" id="{A1B83CC4-A522-4DD9-A6FB-1114383F5E9F}"/>
+                </a:ext>
+              </a:extLst>
+            </p:cNvPr>
+            <p:cNvSpPr txBox="1"/>
+            <p:nvPr/>
+          </p:nvSpPr>
+          <p:spPr>
+            <a:xfrm>
+              <a:off x="11259912" y="4953887"/>
+              <a:ext cx="742511" cy="276999"/>
+            </a:xfrm>
+            <a:prstGeom prst="rect">
+              <a:avLst/>
+            </a:prstGeom>
+            <a:noFill/>
+          </p:spPr>
+          <p:txBody>
+            <a:bodyPr wrap="none" rtlCol="0">
+              <a:spAutoFit/>
+            </a:bodyPr>
+            <a:lstStyle/>
+            <a:p>
+              <a:r>
+                <a:rPr lang="en-US" sz="1200" dirty="0"/>
+                <a:t>Sample</a:t>
+              </a:r>
+              <a:endParaRPr lang="en-IL" sz="1200" dirty="0"/>
+            </a:p>
+          </p:txBody>
+        </p:sp>
+      </p:grpSp>
+    </p:spTree>
+    <p:extLst>
+      <p:ext uri="{BB962C8B-B14F-4D97-AF65-F5344CB8AC3E}">
+        <p14:creationId xmlns:p14="http://schemas.microsoft.com/office/powerpoint/2010/main" val="992719083"/>
+      </p:ext>
+    </p:extLst>
+  </p:cSld>
+  <p:clrMapOvr>
+    <a:masterClrMapping/>
+  </p:clrMapOvr>
+  <p:timing>
+    <p:tnLst>
+      <p:par>
+        <p:cTn id="1" dur="indefinite" restart="never" nodeType="tmRoot">
+          <p:childTnLst>
+            <p:seq concurrent="1" nextAc="seek">
+              <p:cTn id="2" dur="indefinite" nodeType="mainSeq">
+                <p:childTnLst>
+                  <p:par>
+                    <p:cTn id="3" fill="hold">
+                      <p:stCondLst>
+                        <p:cond delay="indefinite"/>
+                      </p:stCondLst>
+                      <p:childTnLst>
+                        <p:par>
+                          <p:cTn id="4" fill="hold">
+                            <p:stCondLst>
+                              <p:cond delay="0"/>
+                            </p:stCondLst>
+                            <p:childTnLst>
+                              <p:par>
+                                <p:cTn id="5" presetID="1" presetClass="entr" presetSubtype="0" fill="hold" nodeType="clickEffect">
+                                  <p:stCondLst>
+                                    <p:cond delay="0"/>
+                                  </p:stCondLst>
+                                  <p:childTnLst>
+                                    <p:set>
+                                      <p:cBhvr>
+                                        <p:cTn id="6" dur="1" fill="hold">
+                                          <p:stCondLst>
+                                            <p:cond delay="0"/>
+                                          </p:stCondLst>
+                                        </p:cTn>
+                                        <p:tgtEl>
+                                          <p:spTgt spid="38"/>
+                                        </p:tgtEl>
+                                        <p:attrNameLst>
+                                          <p:attrName>style.visibility</p:attrName>
+                                        </p:attrNameLst>
+                                      </p:cBhvr>
+                                      <p:to>
+                                        <p:strVal val="visible"/>
+                                      </p:to>
+                                    </p:set>
+                                  </p:childTnLst>
+                                </p:cTn>
+                              </p:par>
+                            </p:childTnLst>
+                          </p:cTn>
+                        </p:par>
+                      </p:childTnLst>
+                    </p:cTn>
+                  </p:par>
+                </p:childTnLst>
+              </p:cTn>
+              <p:prevCondLst>
+                <p:cond evt="onPrev" delay="0">
+                  <p:tgtEl>
+                    <p:sldTgt/>
+                  </p:tgtEl>
+                </p:cond>
+              </p:prevCondLst>
+              <p:nextCondLst>
+                <p:cond evt="onNext" delay="0">
+                  <p:tgtEl>
+                    <p:sldTgt/>
+                  </p:tgtEl>
+                </p:cond>
+              </p:nextCondLst>
+            </p:seq>
+          </p:childTnLst>
+        </p:cTn>
+      </p:par>
+    </p:tnLst>
+  </p:timing>
 </p:sld>
 </file>
 

</xml_diff>

<commit_message>
updated first lecture (pptx)
</commit_message>
<xml_diff>
--- a/lectures/00-Introduction.pptx
+++ b/lectures/00-Introduction.pptx
@@ -245,7 +245,7 @@
           <a:p>
             <a:fld id="{5C93CA8F-50F8-44B5-B48F-4C4452AC4FCB}" type="datetimeFigureOut">
               <a:rPr lang="he-IL" smtClean="0"/>
-              <a:t>כ"ח/תשרי/תש"פ</a:t>
+              <a:t>י"ד/אדר/תש"ף</a:t>
             </a:fld>
             <a:endParaRPr lang="he-IL"/>
           </a:p>
@@ -1095,7 +1095,7 @@
           <a:p>
             <a:fld id="{808B8BE7-FA93-462E-91E9-54E26C408D98}" type="datetime6">
               <a:rPr lang="en-US" smtClean="0"/>
-              <a:t>October 19</a:t>
+              <a:t>March 20</a:t>
             </a:fld>
             <a:endParaRPr lang="en-US" dirty="0"/>
           </a:p>
@@ -1157,36 +1157,6 @@
           </a:p>
         </p:txBody>
       </p:sp>
-      <p:pic>
-        <p:nvPicPr>
-          <p:cNvPr id="13" name="Picture 12"/>
-          <p:cNvPicPr>
-            <a:picLocks noChangeAspect="1"/>
-          </p:cNvPicPr>
-          <p:nvPr userDrawn="1"/>
-        </p:nvPicPr>
-        <p:blipFill>
-          <a:blip r:embed="rId6">
-            <a:extLst>
-              <a:ext uri="{28A0092B-C50C-407E-A947-70E740481C1C}">
-                <a14:useLocalDpi xmlns:a14="http://schemas.microsoft.com/office/drawing/2010/main" val="0"/>
-              </a:ext>
-            </a:extLst>
-          </a:blip>
-          <a:stretch>
-            <a:fillRect/>
-          </a:stretch>
-        </p:blipFill>
-        <p:spPr>
-          <a:xfrm>
-            <a:off x="170264" y="6310315"/>
-            <a:ext cx="753101" cy="306262"/>
-          </a:xfrm>
-          <a:prstGeom prst="rect">
-            <a:avLst/>
-          </a:prstGeom>
-        </p:spPr>
-      </p:pic>
       <p:pic>
         <p:nvPicPr>
           <p:cNvPr id="14" name="Picture 13"/>
@@ -1196,7 +1166,7 @@
           <p:nvPr userDrawn="1"/>
         </p:nvPicPr>
         <p:blipFill>
-          <a:blip r:embed="rId7"/>
+          <a:blip r:embed="rId6"/>
           <a:stretch>
             <a:fillRect/>
           </a:stretch>
@@ -1205,6 +1175,35 @@
           <a:xfrm>
             <a:off x="172571" y="6649747"/>
             <a:ext cx="463924" cy="163428"/>
+          </a:xfrm>
+          <a:prstGeom prst="rect">
+            <a:avLst/>
+          </a:prstGeom>
+        </p:spPr>
+      </p:pic>
+      <p:pic>
+        <p:nvPicPr>
+          <p:cNvPr id="15" name="Picture 14" descr="A close up of a logo&#10;&#10;Description automatically generated">
+            <a:extLst>
+              <a:ext uri="{FF2B5EF4-FFF2-40B4-BE49-F238E27FC236}">
+                <a16:creationId xmlns:a16="http://schemas.microsoft.com/office/drawing/2014/main" id="{ADA182E8-EF5B-4580-BFE7-EAD7CFBFEA1D}"/>
+              </a:ext>
+            </a:extLst>
+          </p:cNvPr>
+          <p:cNvPicPr>
+            <a:picLocks noChangeAspect="1"/>
+          </p:cNvPicPr>
+          <p:nvPr userDrawn="1"/>
+        </p:nvPicPr>
+        <p:blipFill rotWithShape="1">
+          <a:blip r:embed="rId7"/>
+          <a:srcRect l="9329" t="38365" r="9329" b="36981"/>
+          <a:stretch/>
+        </p:blipFill>
+        <p:spPr>
+          <a:xfrm>
+            <a:off x="94937" y="6313707"/>
+            <a:ext cx="897277" cy="271958"/>
           </a:xfrm>
           <a:prstGeom prst="rect">
             <a:avLst/>
@@ -1328,7 +1327,7 @@
           <a:p>
             <a:fld id="{0D82CCDA-FC2D-4BA5-90E3-739DC6ED4C30}" type="datetime6">
               <a:rPr lang="en-US" smtClean="0"/>
-              <a:t>October 19</a:t>
+              <a:t>March 20</a:t>
             </a:fld>
             <a:endParaRPr lang="en-US" dirty="0"/>
           </a:p>
@@ -1507,7 +1506,7 @@
           <a:p>
             <a:fld id="{8F88DA83-5073-4626-B6B8-E91A24F45A53}" type="datetime6">
               <a:rPr lang="en-US" smtClean="0"/>
-              <a:t>October 19</a:t>
+              <a:t>March 20</a:t>
             </a:fld>
             <a:endParaRPr lang="en-US" dirty="0"/>
           </a:p>
@@ -1676,7 +1675,7 @@
           <a:p>
             <a:fld id="{EEBDCC4F-2BAB-4EBD-BBEA-01B8D436681A}" type="datetime6">
               <a:rPr lang="en-US" smtClean="0"/>
-              <a:t>October 19</a:t>
+              <a:t>March 20</a:t>
             </a:fld>
             <a:endParaRPr lang="en-US" dirty="0"/>
           </a:p>
@@ -2000,7 +1999,7 @@
           <a:p>
             <a:fld id="{79487F88-0456-4CDE-8B89-4A78647F618A}" type="datetime6">
               <a:rPr lang="en-US" smtClean="0"/>
-              <a:t>October 19</a:t>
+              <a:t>March 20</a:t>
             </a:fld>
             <a:endParaRPr lang="en-US" dirty="0"/>
           </a:p>
@@ -2163,28 +2162,22 @@
       </p:sp>
       <p:pic>
         <p:nvPicPr>
-          <p:cNvPr id="11" name="Picture 10"/>
+          <p:cNvPr id="12" name="Picture 11"/>
           <p:cNvPicPr>
             <a:picLocks noChangeAspect="1"/>
           </p:cNvPicPr>
           <p:nvPr userDrawn="1"/>
         </p:nvPicPr>
         <p:blipFill>
-          <a:blip r:embed="rId6">
-            <a:extLst>
-              <a:ext uri="{28A0092B-C50C-407E-A947-70E740481C1C}">
-                <a14:useLocalDpi xmlns:a14="http://schemas.microsoft.com/office/drawing/2010/main" val="0"/>
-              </a:ext>
-            </a:extLst>
-          </a:blip>
+          <a:blip r:embed="rId6"/>
           <a:stretch>
             <a:fillRect/>
           </a:stretch>
         </p:blipFill>
         <p:spPr>
           <a:xfrm>
-            <a:off x="170264" y="6310315"/>
-            <a:ext cx="753101" cy="306262"/>
+            <a:off x="172571" y="6649747"/>
+            <a:ext cx="463924" cy="163428"/>
           </a:xfrm>
           <a:prstGeom prst="rect">
             <a:avLst/>
@@ -2193,22 +2186,38 @@
       </p:pic>
       <p:pic>
         <p:nvPicPr>
-          <p:cNvPr id="12" name="Picture 11"/>
+          <p:cNvPr id="13" name="Picture 12" descr="A close up of a logo&#10;&#10;Description automatically generated">
+            <a:extLst>
+              <a:ext uri="{FF2B5EF4-FFF2-40B4-BE49-F238E27FC236}">
+                <a16:creationId xmlns:a16="http://schemas.microsoft.com/office/drawing/2014/main" id="{3CE75A18-94E1-4445-B0AD-3C07F53FF7DC}"/>
+              </a:ext>
+            </a:extLst>
+          </p:cNvPr>
           <p:cNvPicPr>
             <a:picLocks noChangeAspect="1"/>
           </p:cNvPicPr>
           <p:nvPr userDrawn="1"/>
         </p:nvPicPr>
-        <p:blipFill>
-          <a:blip r:embed="rId7"/>
-          <a:stretch>
-            <a:fillRect/>
-          </a:stretch>
+        <p:blipFill rotWithShape="1">
+          <a:blip r:embed="rId7">
+            <a:clrChange>
+              <a:clrFrom>
+                <a:srgbClr val="FFFFFF"/>
+              </a:clrFrom>
+              <a:clrTo>
+                <a:srgbClr val="FFFFFF">
+                  <a:alpha val="0"/>
+                </a:srgbClr>
+              </a:clrTo>
+            </a:clrChange>
+          </a:blip>
+          <a:srcRect l="9329" t="38365" r="9329" b="36981"/>
+          <a:stretch/>
         </p:blipFill>
         <p:spPr>
           <a:xfrm>
-            <a:off x="172571" y="6649747"/>
-            <a:ext cx="463924" cy="163428"/>
+            <a:off x="94937" y="6313707"/>
+            <a:ext cx="897277" cy="271958"/>
           </a:xfrm>
           <a:prstGeom prst="rect">
             <a:avLst/>
@@ -2450,7 +2459,7 @@
           <a:p>
             <a:fld id="{9136D32D-E4FB-4AA6-8422-EE667E33FFC1}" type="datetime6">
               <a:rPr lang="en-US" smtClean="0"/>
-              <a:t>October 19</a:t>
+              <a:t>March 20</a:t>
             </a:fld>
             <a:endParaRPr lang="en-US" dirty="0"/>
           </a:p>
@@ -2883,7 +2892,7 @@
           <a:p>
             <a:fld id="{3AB3EC8A-F822-46B6-826B-CC266009A74B}" type="datetime6">
               <a:rPr lang="en-US" smtClean="0"/>
-              <a:t>October 19</a:t>
+              <a:t>March 20</a:t>
             </a:fld>
             <a:endParaRPr lang="en-US" dirty="0"/>
           </a:p>
@@ -3000,7 +3009,7 @@
           <a:p>
             <a:fld id="{514A54EB-9E75-485B-93FC-08837C33F6A9}" type="datetime6">
               <a:rPr lang="en-US" smtClean="0"/>
-              <a:t>October 19</a:t>
+              <a:t>March 20</a:t>
             </a:fld>
             <a:endParaRPr lang="en-US" dirty="0"/>
           </a:p>
@@ -3094,7 +3103,7 @@
           <a:p>
             <a:fld id="{4187F57E-3EB2-4425-B7C6-E80F41215C16}" type="datetime6">
               <a:rPr lang="en-US" smtClean="0"/>
-              <a:t>October 19</a:t>
+              <a:t>March 20</a:t>
             </a:fld>
             <a:endParaRPr lang="en-US" dirty="0"/>
           </a:p>
@@ -3443,7 +3452,7 @@
           <a:p>
             <a:fld id="{C0AA945B-18EE-4367-BA0C-8D19048BCABE}" type="datetime6">
               <a:rPr lang="en-US" smtClean="0"/>
-              <a:t>October 19</a:t>
+              <a:t>March 20</a:t>
             </a:fld>
             <a:endParaRPr lang="en-US" dirty="0"/>
           </a:p>
@@ -3586,36 +3595,6 @@
       </p:sp>
       <p:pic>
         <p:nvPicPr>
-          <p:cNvPr id="12" name="Picture 11"/>
-          <p:cNvPicPr>
-            <a:picLocks noChangeAspect="1"/>
-          </p:cNvPicPr>
-          <p:nvPr userDrawn="1"/>
-        </p:nvPicPr>
-        <p:blipFill>
-          <a:blip r:embed="rId6">
-            <a:extLst>
-              <a:ext uri="{28A0092B-C50C-407E-A947-70E740481C1C}">
-                <a14:useLocalDpi xmlns:a14="http://schemas.microsoft.com/office/drawing/2010/main" val="0"/>
-              </a:ext>
-            </a:extLst>
-          </a:blip>
-          <a:stretch>
-            <a:fillRect/>
-          </a:stretch>
-        </p:blipFill>
-        <p:spPr>
-          <a:xfrm>
-            <a:off x="170264" y="6310315"/>
-            <a:ext cx="753101" cy="306262"/>
-          </a:xfrm>
-          <a:prstGeom prst="rect">
-            <a:avLst/>
-          </a:prstGeom>
-        </p:spPr>
-      </p:pic>
-      <p:pic>
-        <p:nvPicPr>
           <p:cNvPr id="13" name="Picture 12"/>
           <p:cNvPicPr>
             <a:picLocks noChangeAspect="1"/>
@@ -3623,7 +3602,7 @@
           <p:nvPr userDrawn="1"/>
         </p:nvPicPr>
         <p:blipFill>
-          <a:blip r:embed="rId7"/>
+          <a:blip r:embed="rId6"/>
           <a:stretch>
             <a:fillRect/>
           </a:stretch>
@@ -3931,7 +3910,7 @@
           <a:p>
             <a:fld id="{F5D71FBB-8CD4-4D0A-B8C4-65C60609C705}" type="datetime6">
               <a:rPr lang="en-US" smtClean="0"/>
-              <a:t>October 19</a:t>
+              <a:t>March 20</a:t>
             </a:fld>
             <a:endParaRPr lang="en-US" dirty="0"/>
           </a:p>
@@ -4051,36 +4030,6 @@
       </p:sp>
       <p:pic>
         <p:nvPicPr>
-          <p:cNvPr id="12" name="Picture 11"/>
-          <p:cNvPicPr>
-            <a:picLocks noChangeAspect="1"/>
-          </p:cNvPicPr>
-          <p:nvPr userDrawn="1"/>
-        </p:nvPicPr>
-        <p:blipFill>
-          <a:blip r:embed="rId6">
-            <a:extLst>
-              <a:ext uri="{28A0092B-C50C-407E-A947-70E740481C1C}">
-                <a14:useLocalDpi xmlns:a14="http://schemas.microsoft.com/office/drawing/2010/main" val="0"/>
-              </a:ext>
-            </a:extLst>
-          </a:blip>
-          <a:stretch>
-            <a:fillRect/>
-          </a:stretch>
-        </p:blipFill>
-        <p:spPr>
-          <a:xfrm>
-            <a:off x="170264" y="6310315"/>
-            <a:ext cx="753101" cy="306262"/>
-          </a:xfrm>
-          <a:prstGeom prst="rect">
-            <a:avLst/>
-          </a:prstGeom>
-        </p:spPr>
-      </p:pic>
-      <p:pic>
-        <p:nvPicPr>
           <p:cNvPr id="13" name="Picture 12"/>
           <p:cNvPicPr>
             <a:picLocks noChangeAspect="1"/>
@@ -4088,7 +4037,7 @@
           <p:nvPr userDrawn="1"/>
         </p:nvPicPr>
         <p:blipFill>
-          <a:blip r:embed="rId7"/>
+          <a:blip r:embed="rId6"/>
           <a:stretch>
             <a:fillRect/>
           </a:stretch>
@@ -4262,7 +4211,7 @@
           <a:p>
             <a:fld id="{CB7DA022-A739-4269-87CF-EB9B0BE787C4}" type="datetime6">
               <a:rPr lang="en-US" smtClean="0"/>
-              <a:t>October 19</a:t>
+              <a:t>March 20</a:t>
             </a:fld>
             <a:endParaRPr lang="en-US" dirty="0"/>
           </a:p>
@@ -4441,28 +4390,22 @@
       </p:sp>
       <p:pic>
         <p:nvPicPr>
-          <p:cNvPr id="10" name="Picture 9"/>
+          <p:cNvPr id="12" name="Picture 11"/>
           <p:cNvPicPr>
             <a:picLocks noChangeAspect="1"/>
           </p:cNvPicPr>
           <p:nvPr userDrawn="1"/>
         </p:nvPicPr>
         <p:blipFill>
-          <a:blip r:embed="rId15">
-            <a:extLst>
-              <a:ext uri="{28A0092B-C50C-407E-A947-70E740481C1C}">
-                <a14:useLocalDpi xmlns:a14="http://schemas.microsoft.com/office/drawing/2010/main" val="0"/>
-              </a:ext>
-            </a:extLst>
-          </a:blip>
+          <a:blip r:embed="rId15"/>
           <a:stretch>
             <a:fillRect/>
           </a:stretch>
         </p:blipFill>
         <p:spPr>
           <a:xfrm>
-            <a:off x="170264" y="6310315"/>
-            <a:ext cx="753101" cy="306262"/>
+            <a:off x="172571" y="6649747"/>
+            <a:ext cx="463924" cy="163428"/>
           </a:xfrm>
           <a:prstGeom prst="rect">
             <a:avLst/>
@@ -4471,22 +4414,27 @@
       </p:pic>
       <p:pic>
         <p:nvPicPr>
-          <p:cNvPr id="12" name="Picture 11"/>
+          <p:cNvPr id="13" name="Picture 12" descr="A close up of a logo&#10;&#10;Description automatically generated">
+            <a:extLst>
+              <a:ext uri="{FF2B5EF4-FFF2-40B4-BE49-F238E27FC236}">
+                <a16:creationId xmlns:a16="http://schemas.microsoft.com/office/drawing/2014/main" id="{668AD216-5ECA-4870-87E9-E61A10F097D3}"/>
+              </a:ext>
+            </a:extLst>
+          </p:cNvPr>
           <p:cNvPicPr>
             <a:picLocks noChangeAspect="1"/>
           </p:cNvPicPr>
           <p:nvPr userDrawn="1"/>
         </p:nvPicPr>
-        <p:blipFill>
+        <p:blipFill rotWithShape="1">
           <a:blip r:embed="rId16"/>
-          <a:stretch>
-            <a:fillRect/>
-          </a:stretch>
+          <a:srcRect l="9329" t="38365" r="9329" b="36981"/>
+          <a:stretch/>
         </p:blipFill>
         <p:spPr>
           <a:xfrm>
-            <a:off x="172571" y="6649747"/>
-            <a:ext cx="463924" cy="163428"/>
+            <a:off x="94937" y="6313707"/>
+            <a:ext cx="897277" cy="271958"/>
           </a:xfrm>
           <a:prstGeom prst="rect">
             <a:avLst/>
@@ -4932,7 +4880,7 @@
           <a:p>
             <a:r>
               <a:rPr lang="en-US" dirty="0"/>
-              <a:t>2019</a:t>
+              <a:t>2020</a:t>
             </a:r>
             <a:endParaRPr lang="he-IL" dirty="0"/>
           </a:p>
@@ -9375,40 +9323,10 @@
           </a:p>
         </p:txBody>
       </p:sp>
-      <p:pic>
-        <p:nvPicPr>
-          <p:cNvPr id="7" name="Picture 6" descr="A close up of text on a black surface&#10;&#10;Description automatically generated">
-            <a:extLst>
-              <a:ext uri="{FF2B5EF4-FFF2-40B4-BE49-F238E27FC236}">
-                <a16:creationId xmlns:a16="http://schemas.microsoft.com/office/drawing/2014/main" id="{AF5FC1F0-3E2F-40ED-A54B-7E873A0D6098}"/>
-              </a:ext>
-            </a:extLst>
-          </p:cNvPr>
-          <p:cNvPicPr>
-            <a:picLocks noChangeAspect="1"/>
-          </p:cNvPicPr>
-          <p:nvPr/>
-        </p:nvPicPr>
-        <p:blipFill>
-          <a:blip r:embed="rId3"/>
-          <a:stretch>
-            <a:fillRect/>
-          </a:stretch>
-        </p:blipFill>
-        <p:spPr>
-          <a:xfrm>
-            <a:off x="9346438" y="4580509"/>
-            <a:ext cx="2057400" cy="2057400"/>
-          </a:xfrm>
-          <a:prstGeom prst="rect">
-            <a:avLst/>
-          </a:prstGeom>
-        </p:spPr>
-      </p:pic>
       <p:sp>
         <p:nvSpPr>
           <p:cNvPr id="8" name="Action Button: Help 7">
-            <a:hlinkClick r:id="rId4" highlightClick="1"/>
+            <a:hlinkClick r:id="rId3" highlightClick="1"/>
             <a:extLst>
               <a:ext uri="{FF2B5EF4-FFF2-40B4-BE49-F238E27FC236}">
                 <a16:creationId xmlns:a16="http://schemas.microsoft.com/office/drawing/2014/main" id="{16E4738E-93EC-4DD7-B4CA-6CF5BBC314F0}"/>
@@ -10008,36 +9926,6 @@
           </a:p>
         </p:txBody>
       </p:sp>
-      <p:pic>
-        <p:nvPicPr>
-          <p:cNvPr id="9" name="Picture 8" descr="A close up of text on a black background&#10;&#10;Description automatically generated">
-            <a:extLst>
-              <a:ext uri="{FF2B5EF4-FFF2-40B4-BE49-F238E27FC236}">
-                <a16:creationId xmlns:a16="http://schemas.microsoft.com/office/drawing/2014/main" id="{69F63BED-ECB0-4C22-8B5C-C9A17515EA75}"/>
-              </a:ext>
-            </a:extLst>
-          </p:cNvPr>
-          <p:cNvPicPr>
-            <a:picLocks noChangeAspect="1"/>
-          </p:cNvPicPr>
-          <p:nvPr/>
-        </p:nvPicPr>
-        <p:blipFill>
-          <a:blip r:embed="rId3"/>
-          <a:stretch>
-            <a:fillRect/>
-          </a:stretch>
-        </p:blipFill>
-        <p:spPr>
-          <a:xfrm>
-            <a:off x="9358503" y="4615815"/>
-            <a:ext cx="1983105" cy="1983105"/>
-          </a:xfrm>
-          <a:prstGeom prst="rect">
-            <a:avLst/>
-          </a:prstGeom>
-        </p:spPr>
-      </p:pic>
     </p:spTree>
     <p:extLst>
       <p:ext uri="{BB962C8B-B14F-4D97-AF65-F5344CB8AC3E}">
@@ -11698,8 +11586,8 @@
           </a:p>
         </p:txBody>
       </p:sp>
-      <mc:AlternateContent xmlns:mc="http://schemas.openxmlformats.org/markup-compatibility/2006">
-        <mc:Choice xmlns:a14="http://schemas.microsoft.com/office/drawing/2010/main" Requires="a14">
+      <mc:AlternateContent xmlns:mc="http://schemas.openxmlformats.org/markup-compatibility/2006" xmlns:a14="http://schemas.microsoft.com/office/drawing/2010/main">
+        <mc:Choice Requires="a14">
           <p:sp>
             <p:nvSpPr>
               <p:cNvPr id="3" name="Content Placeholder 2">
@@ -11944,19 +11832,7 @@
                       <a:rPr lang="en-US" b="0" i="1" smtClean="0">
                         <a:latin typeface="Cambria Math" panose="02040503050406030204" pitchFamily="18" charset="0"/>
                       </a:rPr>
-                      <m:t>=</m:t>
-                    </m:r>
-                    <m:r>
-                      <a:rPr lang="en-US" b="0" i="1" smtClean="0">
-                        <a:latin typeface="Cambria Math" panose="02040503050406030204" pitchFamily="18" charset="0"/>
-                      </a:rPr>
-                      <m:t>10</m:t>
-                    </m:r>
-                    <m:r>
-                      <a:rPr lang="en-US" b="0" i="1" smtClean="0">
-                        <a:latin typeface="Cambria Math" panose="02040503050406030204" pitchFamily="18" charset="0"/>
-                      </a:rPr>
-                      <m:t>, </m:t>
+                      <m:t>=10, </m:t>
                     </m:r>
                     <m:sSub>
                       <m:sSubPr>
@@ -11987,19 +11863,7 @@
                       <a:rPr lang="en-US" b="0" i="1" smtClean="0">
                         <a:latin typeface="Cambria Math" panose="02040503050406030204" pitchFamily="18" charset="0"/>
                       </a:rPr>
-                      <m:t>=</m:t>
-                    </m:r>
-                    <m:r>
-                      <a:rPr lang="en-US" b="0" i="1" smtClean="0">
-                        <a:latin typeface="Cambria Math" panose="02040503050406030204" pitchFamily="18" charset="0"/>
-                      </a:rPr>
-                      <m:t>20</m:t>
-                    </m:r>
-                    <m:r>
-                      <a:rPr lang="en-US" b="0" i="1" smtClean="0">
-                        <a:latin typeface="Cambria Math" panose="02040503050406030204" pitchFamily="18" charset="0"/>
-                      </a:rPr>
-                      <m:t>, </m:t>
+                      <m:t>=20, </m:t>
                     </m:r>
                     <m:sSub>
                       <m:sSubPr>
@@ -12030,13 +11894,7 @@
                       <a:rPr lang="en-US" b="0" i="1" smtClean="0">
                         <a:latin typeface="Cambria Math" panose="02040503050406030204" pitchFamily="18" charset="0"/>
                       </a:rPr>
-                      <m:t>=</m:t>
-                    </m:r>
-                    <m:r>
-                      <a:rPr lang="en-US" b="0" i="1" smtClean="0">
-                        <a:latin typeface="Cambria Math" panose="02040503050406030204" pitchFamily="18" charset="0"/>
-                      </a:rPr>
-                      <m:t>30</m:t>
+                      <m:t>=30</m:t>
                     </m:r>
                   </m:oMath>
                 </a14:m>
@@ -12302,13 +12160,7 @@
                       <a:rPr lang="en-US" b="0" i="1" dirty="0" smtClean="0">
                         <a:latin typeface="Cambria Math" panose="02040503050406030204" pitchFamily="18" charset="0"/>
                       </a:rPr>
-                      <m:t>=</m:t>
-                    </m:r>
-                    <m:r>
-                      <a:rPr lang="en-US" b="0" i="1" dirty="0" smtClean="0">
-                        <a:latin typeface="Cambria Math" panose="02040503050406030204" pitchFamily="18" charset="0"/>
-                      </a:rPr>
-                      <m:t>20</m:t>
+                      <m:t>=20</m:t>
                     </m:r>
                   </m:oMath>
                 </a14:m>
@@ -12317,7 +12169,7 @@
             </p:txBody>
           </p:sp>
         </mc:Choice>
-        <mc:Fallback>
+        <mc:Fallback xmlns="">
           <p:sp>
             <p:nvSpPr>
               <p:cNvPr id="3" name="Content Placeholder 2">
@@ -12523,8 +12375,8 @@
           </a:p>
         </p:txBody>
       </p:sp>
-      <mc:AlternateContent xmlns:mc="http://schemas.openxmlformats.org/markup-compatibility/2006">
-        <mc:Choice xmlns:a14="http://schemas.microsoft.com/office/drawing/2010/main" Requires="a14">
+      <mc:AlternateContent xmlns:mc="http://schemas.openxmlformats.org/markup-compatibility/2006" xmlns:a14="http://schemas.microsoft.com/office/drawing/2010/main">
+        <mc:Choice Requires="a14">
           <p:sp>
             <p:nvSpPr>
               <p:cNvPr id="3" name="Content Placeholder 2">
@@ -12707,13 +12559,7 @@
                       <a:rPr lang="en-US" b="0" i="1" dirty="0" smtClean="0">
                         <a:latin typeface="Cambria Math" panose="02040503050406030204" pitchFamily="18" charset="0"/>
                       </a:rPr>
-                      <m:t>=</m:t>
-                    </m:r>
-                    <m:r>
-                      <a:rPr lang="en-US" b="0" i="1" dirty="0" smtClean="0">
-                        <a:latin typeface="Cambria Math" panose="02040503050406030204" pitchFamily="18" charset="0"/>
-                      </a:rPr>
-                      <m:t>0</m:t>
+                      <m:t>=0</m:t>
                     </m:r>
                   </m:oMath>
                 </a14:m>
@@ -12740,7 +12586,7 @@
             </p:txBody>
           </p:sp>
         </mc:Choice>
-        <mc:Fallback>
+        <mc:Fallback xmlns="">
           <p:sp>
             <p:nvSpPr>
               <p:cNvPr id="3" name="Content Placeholder 2">
@@ -13024,8 +12870,8 @@
           </a:p>
         </p:txBody>
       </p:sp>
-      <mc:AlternateContent xmlns:mc="http://schemas.openxmlformats.org/markup-compatibility/2006">
-        <mc:Choice xmlns:a14="http://schemas.microsoft.com/office/drawing/2010/main" Requires="a14">
+      <mc:AlternateContent xmlns:mc="http://schemas.openxmlformats.org/markup-compatibility/2006" xmlns:a14="http://schemas.microsoft.com/office/drawing/2010/main">
+        <mc:Choice Requires="a14">
           <p:sp>
             <p:nvSpPr>
               <p:cNvPr id="3" name="Content Placeholder 2">
@@ -13322,7 +13168,7 @@
             </p:txBody>
           </p:sp>
         </mc:Choice>
-        <mc:Fallback>
+        <mc:Fallback xmlns="">
           <p:sp>
             <p:nvSpPr>
               <p:cNvPr id="3" name="Content Placeholder 2">
@@ -13557,8 +13403,8 @@
           </a:p>
         </p:txBody>
       </p:sp>
-      <mc:AlternateContent xmlns:mc="http://schemas.openxmlformats.org/markup-compatibility/2006">
-        <mc:Choice xmlns:a14="http://schemas.microsoft.com/office/drawing/2010/main" Requires="a14">
+      <mc:AlternateContent xmlns:mc="http://schemas.openxmlformats.org/markup-compatibility/2006" xmlns:a14="http://schemas.microsoft.com/office/drawing/2010/main">
+        <mc:Choice Requires="a14">
           <p:sp>
             <p:nvSpPr>
               <p:cNvPr id="3" name="Content Placeholder 2">
@@ -13984,7 +13830,7 @@
             </p:txBody>
           </p:sp>
         </mc:Choice>
-        <mc:Fallback>
+        <mc:Fallback xmlns="">
           <p:sp>
             <p:nvSpPr>
               <p:cNvPr id="3" name="Content Placeholder 2">
@@ -20522,12 +20368,6 @@
           <a:p>
             <a:r>
               <a:rPr lang="en-US" dirty="0"/>
-              <a:t>Analysis of variance (ANOVA)</a:t>
-            </a:r>
-          </a:p>
-          <a:p>
-            <a:r>
-              <a:rPr lang="en-US" dirty="0"/>
               <a:t>Experiment design</a:t>
             </a:r>
           </a:p>
@@ -20540,7 +20380,13 @@
           <a:p>
             <a:r>
               <a:rPr lang="en-US" dirty="0"/>
-              <a:t>Logistic regression</a:t>
+              <a:t>Analysis of variance (ANOVA)</a:t>
+            </a:r>
+          </a:p>
+          <a:p>
+            <a:r>
+              <a:rPr lang="en-US" dirty="0"/>
+              <a:t>Logistic regression(?)</a:t>
             </a:r>
           </a:p>
           <a:p>
@@ -20750,6 +20596,45 @@
             <a:r>
               <a:rPr lang="en-US" dirty="0"/>
               <a:t>)</a:t>
+            </a:r>
+          </a:p>
+          <a:p>
+            <a:pPr lvl="1"/>
+            <a:r>
+              <a:rPr lang="en-US" dirty="0"/>
+              <a:t>The </a:t>
+            </a:r>
+            <a:r>
+              <a:rPr lang="en-US" dirty="0" err="1"/>
+              <a:t>tidyverse</a:t>
+            </a:r>
+            <a:r>
+              <a:rPr lang="en-US" dirty="0"/>
+              <a:t> package (</a:t>
+            </a:r>
+            <a:r>
+              <a:rPr lang="en-US" dirty="0" err="1"/>
+              <a:t>install.packages</a:t>
+            </a:r>
+            <a:r>
+              <a:rPr lang="en-US" dirty="0"/>
+              <a:t>(</a:t>
+            </a:r>
+            <a:r>
+              <a:rPr lang="he-IL" dirty="0"/>
+              <a:t>'</a:t>
+            </a:r>
+            <a:r>
+              <a:rPr lang="en-US" dirty="0" err="1"/>
+              <a:t>tidyverse</a:t>
+            </a:r>
+            <a:r>
+              <a:rPr lang="he-IL" dirty="0"/>
+              <a:t>'</a:t>
+            </a:r>
+            <a:r>
+              <a:rPr lang="en-US" dirty="0"/>
+              <a:t>))</a:t>
             </a:r>
           </a:p>
           <a:p>

</xml_diff>